<commit_message>
corrected minor build errors
</commit_message>
<xml_diff>
--- a/chap01.pptx
+++ b/chap01.pptx
@@ -5,25 +5,27 @@
     <p:sldMasterId id="2147483648" r:id="rId1"/>
   </p:sldMasterIdLst>
   <p:notesMasterIdLst>
-    <p:notesMasterId r:id="rId18"/>
+    <p:notesMasterId r:id="rId20"/>
   </p:notesMasterIdLst>
   <p:sldIdLst>
     <p:sldId id="256" r:id="rId2"/>
     <p:sldId id="301" r:id="rId3"/>
-    <p:sldId id="258" r:id="rId4"/>
-    <p:sldId id="259" r:id="rId5"/>
-    <p:sldId id="260" r:id="rId6"/>
-    <p:sldId id="261" r:id="rId7"/>
-    <p:sldId id="262" r:id="rId8"/>
-    <p:sldId id="263" r:id="rId9"/>
-    <p:sldId id="264" r:id="rId10"/>
-    <p:sldId id="266" r:id="rId11"/>
-    <p:sldId id="265" r:id="rId12"/>
-    <p:sldId id="267" r:id="rId13"/>
-    <p:sldId id="268" r:id="rId14"/>
-    <p:sldId id="269" r:id="rId15"/>
-    <p:sldId id="271" r:id="rId16"/>
-    <p:sldId id="302" r:id="rId17"/>
+    <p:sldId id="303" r:id="rId4"/>
+    <p:sldId id="304" r:id="rId5"/>
+    <p:sldId id="258" r:id="rId6"/>
+    <p:sldId id="259" r:id="rId7"/>
+    <p:sldId id="260" r:id="rId8"/>
+    <p:sldId id="261" r:id="rId9"/>
+    <p:sldId id="262" r:id="rId10"/>
+    <p:sldId id="263" r:id="rId11"/>
+    <p:sldId id="264" r:id="rId12"/>
+    <p:sldId id="266" r:id="rId13"/>
+    <p:sldId id="265" r:id="rId14"/>
+    <p:sldId id="267" r:id="rId15"/>
+    <p:sldId id="268" r:id="rId16"/>
+    <p:sldId id="269" r:id="rId17"/>
+    <p:sldId id="271" r:id="rId18"/>
+    <p:sldId id="302" r:id="rId19"/>
   </p:sldIdLst>
   <p:sldSz cx="12192000" cy="6858000"/>
   <p:notesSz cx="6858000" cy="9144000"/>
@@ -212,7 +214,7 @@
           <a:p>
             <a:fld id="{F22450E9-715D-42D8-9747-C0402EEB663B}" type="datetimeFigureOut">
               <a:rPr lang="en-US" smtClean="0"/>
-              <a:t>5/21/21</a:t>
+              <a:t>8/23/21</a:t>
             </a:fld>
             <a:endParaRPr lang="en-US"/>
           </a:p>
@@ -547,7 +549,7 @@
           <a:p>
             <a:fld id="{B451C161-4068-4B77-B93E-241C90510927}" type="slidenum">
               <a:rPr lang="en-US" smtClean="0"/>
-              <a:t>15</a:t>
+              <a:t>17</a:t>
             </a:fld>
             <a:endParaRPr lang="en-US"/>
           </a:p>
@@ -817,7 +819,7 @@
           <a:p>
             <a:fld id="{085D2B30-53B0-FF44-AD2E-D4C00B5F0D07}" type="datetime1">
               <a:rPr lang="en-US" smtClean="0"/>
-              <a:t>5/21/21</a:t>
+              <a:t>8/23/21</a:t>
             </a:fld>
             <a:endParaRPr lang="en-US"/>
           </a:p>
@@ -989,7 +991,7 @@
           <a:p>
             <a:fld id="{D9BC79DF-1E81-8E43-818F-0368D173919E}" type="datetime1">
               <a:rPr lang="en-US" smtClean="0"/>
-              <a:t>5/21/21</a:t>
+              <a:t>8/23/21</a:t>
             </a:fld>
             <a:endParaRPr lang="en-US"/>
           </a:p>
@@ -1253,7 +1255,7 @@
           <a:p>
             <a:fld id="{26F2BF60-4963-D247-82AD-5F0039621502}" type="datetime1">
               <a:rPr lang="en-US" smtClean="0"/>
-              <a:t>5/21/21</a:t>
+              <a:t>8/23/21</a:t>
             </a:fld>
             <a:endParaRPr lang="en-US"/>
           </a:p>
@@ -1650,7 +1652,7 @@
           <a:p>
             <a:fld id="{892056E5-B551-3347-86B6-60A1CDFCD73F}" type="datetime1">
               <a:rPr lang="en-US" smtClean="0"/>
-              <a:t>5/21/21</a:t>
+              <a:t>8/23/21</a:t>
             </a:fld>
             <a:endParaRPr lang="en-US"/>
           </a:p>
@@ -2069,7 +2071,7 @@
           <a:p>
             <a:fld id="{0EB98D53-3742-E34B-BFE8-2899DEF3906D}" type="datetime1">
               <a:rPr lang="en-US" smtClean="0"/>
-              <a:t>5/21/21</a:t>
+              <a:t>8/23/21</a:t>
             </a:fld>
             <a:endParaRPr lang="en-US"/>
           </a:p>
@@ -2241,7 +2243,7 @@
           <a:p>
             <a:fld id="{D7741631-EBCE-024F-9D78-CF06A260D182}" type="datetime1">
               <a:rPr lang="en-US" smtClean="0"/>
-              <a:t>5/21/21</a:t>
+              <a:t>8/23/21</a:t>
             </a:fld>
             <a:endParaRPr lang="en-US"/>
           </a:p>
@@ -2391,7 +2393,7 @@
           <a:p>
             <a:fld id="{27BB9E86-5687-1A40-8327-458B60AB9A4C}" type="datetime1">
               <a:rPr lang="en-US" smtClean="0"/>
-              <a:t>5/21/21</a:t>
+              <a:t>8/23/21</a:t>
             </a:fld>
             <a:endParaRPr lang="en-US"/>
           </a:p>
@@ -2721,7 +2723,7 @@
           <a:p>
             <a:fld id="{035049FA-2FE8-F14F-A250-6231AACB4152}" type="datetime1">
               <a:rPr lang="en-US" smtClean="0"/>
-              <a:t>5/21/21</a:t>
+              <a:t>8/23/21</a:t>
             </a:fld>
             <a:endParaRPr lang="en-US"/>
           </a:p>
@@ -3028,7 +3030,7 @@
           <a:p>
             <a:fld id="{CABEF1DE-0106-6945-9FDC-9F265DADF1B8}" type="datetime1">
               <a:rPr lang="en-US" smtClean="0"/>
-              <a:t>5/21/21</a:t>
+              <a:t>8/23/21</a:t>
             </a:fld>
             <a:endParaRPr lang="en-US"/>
           </a:p>
@@ -3483,7 +3485,7 @@
           <a:p>
             <a:fld id="{490BEB36-C871-9444-8A7B-5727C7452DEF}" type="datetime1">
               <a:rPr lang="en-US" smtClean="0"/>
-              <a:t>5/21/21</a:t>
+              <a:t>8/23/21</a:t>
             </a:fld>
             <a:endParaRPr lang="en-US"/>
           </a:p>
@@ -4016,6 +4018,864 @@
           <a:chExt cx="0" cy="0"/>
         </a:xfrm>
       </p:grpSpPr>
+      <p:sp>
+        <p:nvSpPr>
+          <p:cNvPr id="2" name="Title 1"/>
+          <p:cNvSpPr>
+            <a:spLocks noGrp="1"/>
+          </p:cNvSpPr>
+          <p:nvPr>
+            <p:ph type="title"/>
+          </p:nvPr>
+        </p:nvSpPr>
+        <p:spPr/>
+        <p:txBody>
+          <a:bodyPr/>
+          <a:lstStyle/>
+          <a:p>
+            <a:r>
+              <a:rPr lang="en-US" dirty="0"/>
+              <a:t>Planned lessons</a:t>
+            </a:r>
+          </a:p>
+        </p:txBody>
+      </p:sp>
+      <p:sp>
+        <p:nvSpPr>
+          <p:cNvPr id="7" name="Content Placeholder 6"/>
+          <p:cNvSpPr>
+            <a:spLocks noGrp="1"/>
+          </p:cNvSpPr>
+          <p:nvPr>
+            <p:ph sz="half" idx="1"/>
+          </p:nvPr>
+        </p:nvSpPr>
+        <p:spPr/>
+        <p:txBody>
+          <a:bodyPr/>
+          <a:lstStyle/>
+          <a:p>
+            <a:r>
+              <a:rPr lang="en-US" dirty="0">
+                <a:solidFill>
+                  <a:schemeClr val="bg1">
+                    <a:lumMod val="65000"/>
+                  </a:schemeClr>
+                </a:solidFill>
+              </a:rPr>
+              <a:t>Data representation &amp; arithmetic</a:t>
+            </a:r>
+          </a:p>
+          <a:p>
+            <a:r>
+              <a:rPr lang="en-US" dirty="0"/>
+              <a:t>Assembly language</a:t>
+            </a:r>
+          </a:p>
+        </p:txBody>
+      </p:sp>
+      <p:sp>
+        <p:nvSpPr>
+          <p:cNvPr id="8" name="Content Placeholder 7"/>
+          <p:cNvSpPr>
+            <a:spLocks noGrp="1"/>
+          </p:cNvSpPr>
+          <p:nvPr>
+            <p:ph sz="half" idx="2"/>
+          </p:nvPr>
+        </p:nvSpPr>
+        <p:spPr/>
+        <p:txBody>
+          <a:bodyPr>
+            <a:normAutofit/>
+          </a:bodyPr>
+          <a:lstStyle/>
+          <a:p>
+            <a:r>
+              <a:rPr lang="en-US" dirty="0"/>
+              <a:t>ALGOL, BASIC, COBOL, FORTRAN, Pascal, and PL/I</a:t>
+            </a:r>
+            <a:br>
+              <a:rPr lang="en-US" dirty="0"/>
+            </a:br>
+            <a:r>
+              <a:rPr lang="en-US" dirty="0"/>
+              <a:t>count 1,2,3…</a:t>
+            </a:r>
+            <a:br>
+              <a:rPr lang="en-US" dirty="0"/>
+            </a:br>
+            <a:r>
+              <a:rPr lang="en-US" sz="2000" dirty="0"/>
+              <a:t>(or allow arbitrary array ranges)</a:t>
+            </a:r>
+            <a:endParaRPr lang="en-US" dirty="0"/>
+          </a:p>
+          <a:p>
+            <a:r>
+              <a:rPr lang="en-US" dirty="0"/>
+              <a:t>Why does C count 0,1,2…?</a:t>
+            </a:r>
+          </a:p>
+          <a:p>
+            <a:r>
+              <a:rPr lang="en-US" dirty="0"/>
+              <a:t>Why do C strings end in </a:t>
+            </a:r>
+            <a:r>
+              <a:rPr lang="en-US" b="1" dirty="0"/>
+              <a:t>\0</a:t>
+            </a:r>
+            <a:r>
+              <a:rPr lang="en-US" dirty="0"/>
+              <a:t> ?</a:t>
+            </a:r>
+          </a:p>
+          <a:p>
+            <a:r>
+              <a:rPr lang="en-US" dirty="0"/>
+              <a:t>Why does C have an increment operator (</a:t>
+            </a:r>
+            <a:r>
+              <a:rPr lang="en-US" b="1" dirty="0" err="1"/>
+              <a:t>i</a:t>
+            </a:r>
+            <a:r>
+              <a:rPr lang="en-US" b="1" dirty="0"/>
+              <a:t>++</a:t>
+            </a:r>
+            <a:r>
+              <a:rPr lang="en-US" dirty="0"/>
+              <a:t>)?</a:t>
+            </a:r>
+          </a:p>
+          <a:p>
+            <a:r>
+              <a:rPr lang="en-US" dirty="0"/>
+              <a:t>Why does C have the ternary operator? (</a:t>
+            </a:r>
+            <a:r>
+              <a:rPr lang="en-US" b="1" dirty="0"/>
+              <a:t>x = x&lt;y ? x : y</a:t>
+            </a:r>
+            <a:r>
+              <a:rPr lang="en-US" dirty="0"/>
+              <a:t>)</a:t>
+            </a:r>
+          </a:p>
+        </p:txBody>
+      </p:sp>
+      <p:sp>
+        <p:nvSpPr>
+          <p:cNvPr id="4" name="Footer Placeholder 3"/>
+          <p:cNvSpPr>
+            <a:spLocks noGrp="1"/>
+          </p:cNvSpPr>
+          <p:nvPr>
+            <p:ph type="ftr" sz="quarter" idx="11"/>
+          </p:nvPr>
+        </p:nvSpPr>
+        <p:spPr/>
+        <p:txBody>
+          <a:bodyPr/>
+          <a:lstStyle/>
+          <a:p>
+            <a:r>
+              <a:rPr lang="en-US"/>
+              <a:t>Programming at the Hardware/Software Interface</a:t>
+            </a:r>
+            <a:endParaRPr lang="en-US" dirty="0"/>
+          </a:p>
+        </p:txBody>
+      </p:sp>
+      <p:sp>
+        <p:nvSpPr>
+          <p:cNvPr id="5" name="Slide Number Placeholder 4"/>
+          <p:cNvSpPr>
+            <a:spLocks noGrp="1"/>
+          </p:cNvSpPr>
+          <p:nvPr>
+            <p:ph type="sldNum" sz="quarter" idx="12"/>
+          </p:nvPr>
+        </p:nvSpPr>
+        <p:spPr/>
+        <p:txBody>
+          <a:bodyPr/>
+          <a:lstStyle/>
+          <a:p>
+            <a:fld id="{B30C84D9-7A41-4FEB-892B-80917372DB87}" type="slidenum">
+              <a:rPr lang="en-US" smtClean="0"/>
+              <a:t>10</a:t>
+            </a:fld>
+            <a:endParaRPr lang="en-US"/>
+          </a:p>
+        </p:txBody>
+      </p:sp>
+      <p:sp>
+        <p:nvSpPr>
+          <p:cNvPr id="9" name="Text Placeholder 8"/>
+          <p:cNvSpPr>
+            <a:spLocks noGrp="1"/>
+          </p:cNvSpPr>
+          <p:nvPr>
+            <p:ph type="body" sz="quarter" idx="13"/>
+          </p:nvPr>
+        </p:nvSpPr>
+        <p:spPr/>
+        <p:txBody>
+          <a:bodyPr/>
+          <a:lstStyle/>
+          <a:p>
+            <a:r>
+              <a:rPr lang="en-US" dirty="0"/>
+              <a:t>Slide by Bohn</a:t>
+            </a:r>
+          </a:p>
+        </p:txBody>
+      </p:sp>
+    </p:spTree>
+    <p:extLst>
+      <p:ext uri="{BB962C8B-B14F-4D97-AF65-F5344CB8AC3E}">
+        <p14:creationId xmlns:p14="http://schemas.microsoft.com/office/powerpoint/2010/main" val="1737821417"/>
+      </p:ext>
+    </p:extLst>
+  </p:cSld>
+  <p:clrMapOvr>
+    <a:masterClrMapping/>
+  </p:clrMapOvr>
+  <p:timing>
+    <p:tnLst>
+      <p:par>
+        <p:cTn id="1" dur="indefinite" restart="never" nodeType="tmRoot">
+          <p:childTnLst>
+            <p:seq concurrent="1" nextAc="seek">
+              <p:cTn id="2" dur="indefinite" nodeType="mainSeq">
+                <p:childTnLst>
+                  <p:par>
+                    <p:cTn id="3" fill="hold">
+                      <p:stCondLst>
+                        <p:cond delay="indefinite"/>
+                      </p:stCondLst>
+                      <p:childTnLst>
+                        <p:par>
+                          <p:cTn id="4" fill="hold">
+                            <p:stCondLst>
+                              <p:cond delay="0"/>
+                            </p:stCondLst>
+                            <p:childTnLst>
+                              <p:par>
+                                <p:cTn id="5" presetID="10" presetClass="entr" presetSubtype="0" fill="hold" grpId="0" nodeType="clickEffect">
+                                  <p:stCondLst>
+                                    <p:cond delay="0"/>
+                                  </p:stCondLst>
+                                  <p:childTnLst>
+                                    <p:set>
+                                      <p:cBhvr>
+                                        <p:cTn id="6" dur="1" fill="hold">
+                                          <p:stCondLst>
+                                            <p:cond delay="0"/>
+                                          </p:stCondLst>
+                                        </p:cTn>
+                                        <p:tgtEl>
+                                          <p:spTgt spid="8">
+                                            <p:txEl>
+                                              <p:pRg st="0" end="0"/>
+                                            </p:txEl>
+                                          </p:spTgt>
+                                        </p:tgtEl>
+                                        <p:attrNameLst>
+                                          <p:attrName>style.visibility</p:attrName>
+                                        </p:attrNameLst>
+                                      </p:cBhvr>
+                                      <p:to>
+                                        <p:strVal val="visible"/>
+                                      </p:to>
+                                    </p:set>
+                                    <p:animEffect transition="in" filter="fade">
+                                      <p:cBhvr>
+                                        <p:cTn id="7" dur="500"/>
+                                        <p:tgtEl>
+                                          <p:spTgt spid="8">
+                                            <p:txEl>
+                                              <p:pRg st="0" end="0"/>
+                                            </p:txEl>
+                                          </p:spTgt>
+                                        </p:tgtEl>
+                                      </p:cBhvr>
+                                    </p:animEffect>
+                                  </p:childTnLst>
+                                </p:cTn>
+                              </p:par>
+                              <p:par>
+                                <p:cTn id="8" presetID="10" presetClass="entr" presetSubtype="0" fill="hold" grpId="0" nodeType="withEffect">
+                                  <p:stCondLst>
+                                    <p:cond delay="0"/>
+                                  </p:stCondLst>
+                                  <p:childTnLst>
+                                    <p:set>
+                                      <p:cBhvr>
+                                        <p:cTn id="9" dur="1" fill="hold">
+                                          <p:stCondLst>
+                                            <p:cond delay="0"/>
+                                          </p:stCondLst>
+                                        </p:cTn>
+                                        <p:tgtEl>
+                                          <p:spTgt spid="8">
+                                            <p:txEl>
+                                              <p:pRg st="1" end="1"/>
+                                            </p:txEl>
+                                          </p:spTgt>
+                                        </p:tgtEl>
+                                        <p:attrNameLst>
+                                          <p:attrName>style.visibility</p:attrName>
+                                        </p:attrNameLst>
+                                      </p:cBhvr>
+                                      <p:to>
+                                        <p:strVal val="visible"/>
+                                      </p:to>
+                                    </p:set>
+                                    <p:animEffect transition="in" filter="fade">
+                                      <p:cBhvr>
+                                        <p:cTn id="10" dur="500"/>
+                                        <p:tgtEl>
+                                          <p:spTgt spid="8">
+                                            <p:txEl>
+                                              <p:pRg st="1" end="1"/>
+                                            </p:txEl>
+                                          </p:spTgt>
+                                        </p:tgtEl>
+                                      </p:cBhvr>
+                                    </p:animEffect>
+                                  </p:childTnLst>
+                                </p:cTn>
+                              </p:par>
+                            </p:childTnLst>
+                          </p:cTn>
+                        </p:par>
+                      </p:childTnLst>
+                    </p:cTn>
+                  </p:par>
+                  <p:par>
+                    <p:cTn id="11" fill="hold">
+                      <p:stCondLst>
+                        <p:cond delay="indefinite"/>
+                      </p:stCondLst>
+                      <p:childTnLst>
+                        <p:par>
+                          <p:cTn id="12" fill="hold">
+                            <p:stCondLst>
+                              <p:cond delay="0"/>
+                            </p:stCondLst>
+                            <p:childTnLst>
+                              <p:par>
+                                <p:cTn id="13" presetID="10" presetClass="entr" presetSubtype="0" fill="hold" grpId="0" nodeType="clickEffect">
+                                  <p:stCondLst>
+                                    <p:cond delay="0"/>
+                                  </p:stCondLst>
+                                  <p:childTnLst>
+                                    <p:set>
+                                      <p:cBhvr>
+                                        <p:cTn id="14" dur="1" fill="hold">
+                                          <p:stCondLst>
+                                            <p:cond delay="0"/>
+                                          </p:stCondLst>
+                                        </p:cTn>
+                                        <p:tgtEl>
+                                          <p:spTgt spid="8">
+                                            <p:txEl>
+                                              <p:pRg st="2" end="2"/>
+                                            </p:txEl>
+                                          </p:spTgt>
+                                        </p:tgtEl>
+                                        <p:attrNameLst>
+                                          <p:attrName>style.visibility</p:attrName>
+                                        </p:attrNameLst>
+                                      </p:cBhvr>
+                                      <p:to>
+                                        <p:strVal val="visible"/>
+                                      </p:to>
+                                    </p:set>
+                                    <p:animEffect transition="in" filter="fade">
+                                      <p:cBhvr>
+                                        <p:cTn id="15" dur="500"/>
+                                        <p:tgtEl>
+                                          <p:spTgt spid="8">
+                                            <p:txEl>
+                                              <p:pRg st="2" end="2"/>
+                                            </p:txEl>
+                                          </p:spTgt>
+                                        </p:tgtEl>
+                                      </p:cBhvr>
+                                    </p:animEffect>
+                                  </p:childTnLst>
+                                </p:cTn>
+                              </p:par>
+                            </p:childTnLst>
+                          </p:cTn>
+                        </p:par>
+                      </p:childTnLst>
+                    </p:cTn>
+                  </p:par>
+                  <p:par>
+                    <p:cTn id="16" fill="hold">
+                      <p:stCondLst>
+                        <p:cond delay="indefinite"/>
+                      </p:stCondLst>
+                      <p:childTnLst>
+                        <p:par>
+                          <p:cTn id="17" fill="hold">
+                            <p:stCondLst>
+                              <p:cond delay="0"/>
+                            </p:stCondLst>
+                            <p:childTnLst>
+                              <p:par>
+                                <p:cTn id="18" presetID="10" presetClass="entr" presetSubtype="0" fill="hold" grpId="0" nodeType="clickEffect">
+                                  <p:stCondLst>
+                                    <p:cond delay="0"/>
+                                  </p:stCondLst>
+                                  <p:childTnLst>
+                                    <p:set>
+                                      <p:cBhvr>
+                                        <p:cTn id="19" dur="1" fill="hold">
+                                          <p:stCondLst>
+                                            <p:cond delay="0"/>
+                                          </p:stCondLst>
+                                        </p:cTn>
+                                        <p:tgtEl>
+                                          <p:spTgt spid="8">
+                                            <p:txEl>
+                                              <p:pRg st="3" end="3"/>
+                                            </p:txEl>
+                                          </p:spTgt>
+                                        </p:tgtEl>
+                                        <p:attrNameLst>
+                                          <p:attrName>style.visibility</p:attrName>
+                                        </p:attrNameLst>
+                                      </p:cBhvr>
+                                      <p:to>
+                                        <p:strVal val="visible"/>
+                                      </p:to>
+                                    </p:set>
+                                    <p:animEffect transition="in" filter="fade">
+                                      <p:cBhvr>
+                                        <p:cTn id="20" dur="500"/>
+                                        <p:tgtEl>
+                                          <p:spTgt spid="8">
+                                            <p:txEl>
+                                              <p:pRg st="3" end="3"/>
+                                            </p:txEl>
+                                          </p:spTgt>
+                                        </p:tgtEl>
+                                      </p:cBhvr>
+                                    </p:animEffect>
+                                  </p:childTnLst>
+                                </p:cTn>
+                              </p:par>
+                            </p:childTnLst>
+                          </p:cTn>
+                        </p:par>
+                      </p:childTnLst>
+                    </p:cTn>
+                  </p:par>
+                  <p:par>
+                    <p:cTn id="21" fill="hold">
+                      <p:stCondLst>
+                        <p:cond delay="indefinite"/>
+                      </p:stCondLst>
+                      <p:childTnLst>
+                        <p:par>
+                          <p:cTn id="22" fill="hold">
+                            <p:stCondLst>
+                              <p:cond delay="0"/>
+                            </p:stCondLst>
+                            <p:childTnLst>
+                              <p:par>
+                                <p:cTn id="23" presetID="10" presetClass="entr" presetSubtype="0" fill="hold" grpId="0" nodeType="clickEffect">
+                                  <p:stCondLst>
+                                    <p:cond delay="0"/>
+                                  </p:stCondLst>
+                                  <p:childTnLst>
+                                    <p:set>
+                                      <p:cBhvr>
+                                        <p:cTn id="24" dur="1" fill="hold">
+                                          <p:stCondLst>
+                                            <p:cond delay="0"/>
+                                          </p:stCondLst>
+                                        </p:cTn>
+                                        <p:tgtEl>
+                                          <p:spTgt spid="8">
+                                            <p:txEl>
+                                              <p:pRg st="4" end="4"/>
+                                            </p:txEl>
+                                          </p:spTgt>
+                                        </p:tgtEl>
+                                        <p:attrNameLst>
+                                          <p:attrName>style.visibility</p:attrName>
+                                        </p:attrNameLst>
+                                      </p:cBhvr>
+                                      <p:to>
+                                        <p:strVal val="visible"/>
+                                      </p:to>
+                                    </p:set>
+                                    <p:animEffect transition="in" filter="fade">
+                                      <p:cBhvr>
+                                        <p:cTn id="25" dur="500"/>
+                                        <p:tgtEl>
+                                          <p:spTgt spid="8">
+                                            <p:txEl>
+                                              <p:pRg st="4" end="4"/>
+                                            </p:txEl>
+                                          </p:spTgt>
+                                        </p:tgtEl>
+                                      </p:cBhvr>
+                                    </p:animEffect>
+                                  </p:childTnLst>
+                                </p:cTn>
+                              </p:par>
+                            </p:childTnLst>
+                          </p:cTn>
+                        </p:par>
+                      </p:childTnLst>
+                    </p:cTn>
+                  </p:par>
+                </p:childTnLst>
+              </p:cTn>
+              <p:prevCondLst>
+                <p:cond evt="onPrev" delay="0">
+                  <p:tgtEl>
+                    <p:sldTgt/>
+                  </p:tgtEl>
+                </p:cond>
+              </p:prevCondLst>
+              <p:nextCondLst>
+                <p:cond evt="onNext" delay="0">
+                  <p:tgtEl>
+                    <p:sldTgt/>
+                  </p:tgtEl>
+                </p:cond>
+              </p:nextCondLst>
+            </p:seq>
+          </p:childTnLst>
+        </p:cTn>
+      </p:par>
+    </p:tnLst>
+    <p:bldLst>
+      <p:bldP spid="8" grpId="0" build="p"/>
+    </p:bldLst>
+  </p:timing>
+</p:sld>
+</file>
+
+<file path=ppt/slides/slide11.xml><?xml version="1.0" encoding="utf-8"?>
+<p:sld xmlns:a="http://schemas.openxmlformats.org/drawingml/2006/main" xmlns:r="http://schemas.openxmlformats.org/officeDocument/2006/relationships" xmlns:p="http://schemas.openxmlformats.org/presentationml/2006/main">
+  <p:cSld>
+    <p:spTree>
+      <p:nvGrpSpPr>
+        <p:cNvPr id="1" name=""/>
+        <p:cNvGrpSpPr/>
+        <p:nvPr/>
+      </p:nvGrpSpPr>
+      <p:grpSpPr>
+        <a:xfrm>
+          <a:off x="0" y="0"/>
+          <a:ext cx="0" cy="0"/>
+          <a:chOff x="0" y="0"/>
+          <a:chExt cx="0" cy="0"/>
+        </a:xfrm>
+      </p:grpSpPr>
+      <p:sp>
+        <p:nvSpPr>
+          <p:cNvPr id="2" name="Title 1"/>
+          <p:cNvSpPr>
+            <a:spLocks noGrp="1"/>
+          </p:cNvSpPr>
+          <p:nvPr>
+            <p:ph type="title"/>
+          </p:nvPr>
+        </p:nvSpPr>
+        <p:spPr/>
+        <p:txBody>
+          <a:bodyPr/>
+          <a:lstStyle/>
+          <a:p>
+            <a:r>
+              <a:rPr lang="en-US" dirty="0"/>
+              <a:t>Planned lessons</a:t>
+            </a:r>
+          </a:p>
+        </p:txBody>
+      </p:sp>
+      <p:sp>
+        <p:nvSpPr>
+          <p:cNvPr id="7" name="Content Placeholder 6"/>
+          <p:cNvSpPr>
+            <a:spLocks noGrp="1"/>
+          </p:cNvSpPr>
+          <p:nvPr>
+            <p:ph sz="half" idx="1"/>
+          </p:nvPr>
+        </p:nvSpPr>
+        <p:spPr/>
+        <p:txBody>
+          <a:bodyPr/>
+          <a:lstStyle/>
+          <a:p>
+            <a:r>
+              <a:rPr lang="en-US" dirty="0">
+                <a:solidFill>
+                  <a:schemeClr val="bg1">
+                    <a:lumMod val="65000"/>
+                  </a:schemeClr>
+                </a:solidFill>
+              </a:rPr>
+              <a:t>Data representation &amp; arithmetic</a:t>
+            </a:r>
+          </a:p>
+          <a:p>
+            <a:r>
+              <a:rPr lang="en-US" dirty="0">
+                <a:solidFill>
+                  <a:schemeClr val="bg1">
+                    <a:lumMod val="65000"/>
+                  </a:schemeClr>
+                </a:solidFill>
+              </a:rPr>
+              <a:t>Assembly language</a:t>
+            </a:r>
+          </a:p>
+          <a:p>
+            <a:r>
+              <a:rPr lang="en-US" dirty="0"/>
+              <a:t>Processor architecture</a:t>
+            </a:r>
+          </a:p>
+        </p:txBody>
+      </p:sp>
+      <p:sp>
+        <p:nvSpPr>
+          <p:cNvPr id="8" name="Content Placeholder 7"/>
+          <p:cNvSpPr>
+            <a:spLocks noGrp="1"/>
+          </p:cNvSpPr>
+          <p:nvPr>
+            <p:ph sz="half" idx="2"/>
+          </p:nvPr>
+        </p:nvSpPr>
+        <p:spPr/>
+        <p:txBody>
+          <a:bodyPr>
+            <a:normAutofit/>
+          </a:bodyPr>
+          <a:lstStyle/>
+          <a:p>
+            <a:r>
+              <a:rPr lang="en-US" dirty="0"/>
+              <a:t>Why is clock speed a poor measure of processor performance?</a:t>
+            </a:r>
+          </a:p>
+          <a:p>
+            <a:endParaRPr lang="en-US" dirty="0"/>
+          </a:p>
+          <a:p>
+            <a:endParaRPr lang="en-US" dirty="0"/>
+          </a:p>
+          <a:p>
+            <a:endParaRPr lang="en-US" dirty="0"/>
+          </a:p>
+          <a:p>
+            <a:endParaRPr lang="en-US" sz="4000" dirty="0"/>
+          </a:p>
+        </p:txBody>
+      </p:sp>
+      <p:sp>
+        <p:nvSpPr>
+          <p:cNvPr id="4" name="Footer Placeholder 3"/>
+          <p:cNvSpPr>
+            <a:spLocks noGrp="1"/>
+          </p:cNvSpPr>
+          <p:nvPr>
+            <p:ph type="ftr" sz="quarter" idx="11"/>
+          </p:nvPr>
+        </p:nvSpPr>
+        <p:spPr/>
+        <p:txBody>
+          <a:bodyPr/>
+          <a:lstStyle/>
+          <a:p>
+            <a:r>
+              <a:rPr lang="en-US"/>
+              <a:t>Programming at the Hardware/Software Interface</a:t>
+            </a:r>
+            <a:endParaRPr lang="en-US" dirty="0"/>
+          </a:p>
+        </p:txBody>
+      </p:sp>
+      <p:sp>
+        <p:nvSpPr>
+          <p:cNvPr id="5" name="Slide Number Placeholder 4"/>
+          <p:cNvSpPr>
+            <a:spLocks noGrp="1"/>
+          </p:cNvSpPr>
+          <p:nvPr>
+            <p:ph type="sldNum" sz="quarter" idx="12"/>
+          </p:nvPr>
+        </p:nvSpPr>
+        <p:spPr/>
+        <p:txBody>
+          <a:bodyPr/>
+          <a:lstStyle/>
+          <a:p>
+            <a:fld id="{B30C84D9-7A41-4FEB-892B-80917372DB87}" type="slidenum">
+              <a:rPr lang="en-US" smtClean="0"/>
+              <a:t>11</a:t>
+            </a:fld>
+            <a:endParaRPr lang="en-US"/>
+          </a:p>
+        </p:txBody>
+      </p:sp>
+      <p:sp>
+        <p:nvSpPr>
+          <p:cNvPr id="9" name="Text Placeholder 8"/>
+          <p:cNvSpPr>
+            <a:spLocks noGrp="1"/>
+          </p:cNvSpPr>
+          <p:nvPr>
+            <p:ph type="body" sz="quarter" idx="13"/>
+          </p:nvPr>
+        </p:nvSpPr>
+        <p:spPr/>
+        <p:txBody>
+          <a:bodyPr/>
+          <a:lstStyle/>
+          <a:p>
+            <a:r>
+              <a:rPr lang="en-US" dirty="0"/>
+              <a:t>Slide by Bohn</a:t>
+            </a:r>
+          </a:p>
+        </p:txBody>
+      </p:sp>
+    </p:spTree>
+    <p:extLst>
+      <p:ext uri="{BB962C8B-B14F-4D97-AF65-F5344CB8AC3E}">
+        <p14:creationId xmlns:p14="http://schemas.microsoft.com/office/powerpoint/2010/main" val="98335725"/>
+      </p:ext>
+    </p:extLst>
+  </p:cSld>
+  <p:clrMapOvr>
+    <a:masterClrMapping/>
+  </p:clrMapOvr>
+  <p:timing>
+    <p:tnLst>
+      <p:par>
+        <p:cTn id="1" dur="indefinite" restart="never" nodeType="tmRoot">
+          <p:childTnLst>
+            <p:seq concurrent="1" nextAc="seek">
+              <p:cTn id="2" dur="indefinite" nodeType="mainSeq">
+                <p:childTnLst>
+                  <p:par>
+                    <p:cTn id="3" fill="hold">
+                      <p:stCondLst>
+                        <p:cond delay="indefinite"/>
+                      </p:stCondLst>
+                      <p:childTnLst>
+                        <p:par>
+                          <p:cTn id="4" fill="hold">
+                            <p:stCondLst>
+                              <p:cond delay="0"/>
+                            </p:stCondLst>
+                            <p:childTnLst>
+                              <p:par>
+                                <p:cTn id="5" presetID="10" presetClass="entr" presetSubtype="0" fill="hold" nodeType="clickEffect">
+                                  <p:stCondLst>
+                                    <p:cond delay="0"/>
+                                  </p:stCondLst>
+                                  <p:childTnLst>
+                                    <p:set>
+                                      <p:cBhvr>
+                                        <p:cTn id="6" dur="1" fill="hold">
+                                          <p:stCondLst>
+                                            <p:cond delay="0"/>
+                                          </p:stCondLst>
+                                        </p:cTn>
+                                        <p:tgtEl>
+                                          <p:spTgt spid="8">
+                                            <p:txEl>
+                                              <p:pRg st="0" end="0"/>
+                                            </p:txEl>
+                                          </p:spTgt>
+                                        </p:tgtEl>
+                                        <p:attrNameLst>
+                                          <p:attrName>style.visibility</p:attrName>
+                                        </p:attrNameLst>
+                                      </p:cBhvr>
+                                      <p:to>
+                                        <p:strVal val="visible"/>
+                                      </p:to>
+                                    </p:set>
+                                    <p:animEffect transition="in" filter="fade">
+                                      <p:cBhvr>
+                                        <p:cTn id="7" dur="500"/>
+                                        <p:tgtEl>
+                                          <p:spTgt spid="8">
+                                            <p:txEl>
+                                              <p:pRg st="0" end="0"/>
+                                            </p:txEl>
+                                          </p:spTgt>
+                                        </p:tgtEl>
+                                      </p:cBhvr>
+                                    </p:animEffect>
+                                  </p:childTnLst>
+                                </p:cTn>
+                              </p:par>
+                            </p:childTnLst>
+                          </p:cTn>
+                        </p:par>
+                      </p:childTnLst>
+                    </p:cTn>
+                  </p:par>
+                </p:childTnLst>
+              </p:cTn>
+              <p:prevCondLst>
+                <p:cond evt="onPrev" delay="0">
+                  <p:tgtEl>
+                    <p:sldTgt/>
+                  </p:tgtEl>
+                </p:cond>
+              </p:prevCondLst>
+              <p:nextCondLst>
+                <p:cond evt="onNext" delay="0">
+                  <p:tgtEl>
+                    <p:sldTgt/>
+                  </p:tgtEl>
+                </p:cond>
+              </p:nextCondLst>
+            </p:seq>
+          </p:childTnLst>
+        </p:cTn>
+      </p:par>
+    </p:tnLst>
+  </p:timing>
+</p:sld>
+</file>
+
+<file path=ppt/slides/slide12.xml><?xml version="1.0" encoding="utf-8"?>
+<p:sld xmlns:a="http://schemas.openxmlformats.org/drawingml/2006/main" xmlns:r="http://schemas.openxmlformats.org/officeDocument/2006/relationships" xmlns:p="http://schemas.openxmlformats.org/presentationml/2006/main">
+  <p:cSld>
+    <p:spTree>
+      <p:nvGrpSpPr>
+        <p:cNvPr id="1" name=""/>
+        <p:cNvGrpSpPr/>
+        <p:nvPr/>
+      </p:nvGrpSpPr>
+      <p:grpSpPr>
+        <a:xfrm>
+          <a:off x="0" y="0"/>
+          <a:ext cx="0" cy="0"/>
+          <a:chOff x="0" y="0"/>
+          <a:chExt cx="0" cy="0"/>
+        </a:xfrm>
+      </p:grpSpPr>
       <p:pic>
         <p:nvPicPr>
           <p:cNvPr id="17" name="Content Placeholder 16">
@@ -4168,7 +5028,7 @@
           <a:p>
             <a:fld id="{B30C84D9-7A41-4FEB-892B-80917372DB87}" type="slidenum">
               <a:rPr lang="en-US" smtClean="0"/>
-              <a:t>10</a:t>
+              <a:t>12</a:t>
             </a:fld>
             <a:endParaRPr lang="en-US"/>
           </a:p>
@@ -4808,7 +5668,7 @@
 </p:sld>
 </file>
 
-<file path=ppt/slides/slide11.xml><?xml version="1.0" encoding="utf-8"?>
+<file path=ppt/slides/slide13.xml><?xml version="1.0" encoding="utf-8"?>
 <p:sld xmlns:a="http://schemas.openxmlformats.org/drawingml/2006/main" xmlns:r="http://schemas.openxmlformats.org/officeDocument/2006/relationships" xmlns:p="http://schemas.openxmlformats.org/presentationml/2006/main">
   <p:cSld>
     <p:spTree>
@@ -5017,7 +5877,7 @@
           <a:p>
             <a:fld id="{B30C84D9-7A41-4FEB-892B-80917372DB87}" type="slidenum">
               <a:rPr lang="en-US" smtClean="0"/>
-              <a:t>11</a:t>
+              <a:t>13</a:t>
             </a:fld>
             <a:endParaRPr lang="en-US"/>
           </a:p>
@@ -5299,7 +6159,7 @@
 </p:sld>
 </file>
 
-<file path=ppt/slides/slide12.xml><?xml version="1.0" encoding="utf-8"?>
+<file path=ppt/slides/slide14.xml><?xml version="1.0" encoding="utf-8"?>
 <p:sld xmlns:a="http://schemas.openxmlformats.org/drawingml/2006/main" xmlns:r="http://schemas.openxmlformats.org/officeDocument/2006/relationships" xmlns:p="http://schemas.openxmlformats.org/presentationml/2006/main">
   <p:cSld>
     <p:spTree>
@@ -5517,7 +6377,7 @@
           <a:p>
             <a:fld id="{B30C84D9-7A41-4FEB-892B-80917372DB87}" type="slidenum">
               <a:rPr lang="en-US" smtClean="0"/>
-              <a:t>12</a:t>
+              <a:t>14</a:t>
             </a:fld>
             <a:endParaRPr lang="en-US"/>
           </a:p>
@@ -5867,7 +6727,7 @@
 </p:sld>
 </file>
 
-<file path=ppt/slides/slide13.xml><?xml version="1.0" encoding="utf-8"?>
+<file path=ppt/slides/slide15.xml><?xml version="1.0" encoding="utf-8"?>
 <p:sld xmlns:a="http://schemas.openxmlformats.org/drawingml/2006/main" xmlns:r="http://schemas.openxmlformats.org/officeDocument/2006/relationships" xmlns:p="http://schemas.openxmlformats.org/presentationml/2006/main">
   <p:cSld>
     <p:spTree>
@@ -6509,7 +7369,7 @@
           <a:p>
             <a:fld id="{B30C84D9-7A41-4FEB-892B-80917372DB87}" type="slidenum">
               <a:rPr lang="en-US" smtClean="0"/>
-              <a:t>13</a:t>
+              <a:t>15</a:t>
             </a:fld>
             <a:endParaRPr lang="en-US"/>
           </a:p>
@@ -7074,7 +7934,7 @@
 </p:sld>
 </file>
 
-<file path=ppt/slides/slide14.xml><?xml version="1.0" encoding="utf-8"?>
+<file path=ppt/slides/slide16.xml><?xml version="1.0" encoding="utf-8"?>
 <p:sld xmlns:a="http://schemas.openxmlformats.org/drawingml/2006/main" xmlns:r="http://schemas.openxmlformats.org/officeDocument/2006/relationships" xmlns:p="http://schemas.openxmlformats.org/presentationml/2006/main">
   <p:cSld>
     <p:spTree>
@@ -7316,7 +8176,7 @@
           <a:p>
             <a:fld id="{B30C84D9-7A41-4FEB-892B-80917372DB87}" type="slidenum">
               <a:rPr lang="en-US" smtClean="0"/>
-              <a:t>14</a:t>
+              <a:t>16</a:t>
             </a:fld>
             <a:endParaRPr lang="en-US"/>
           </a:p>
@@ -7555,7 +8415,7 @@
 </p:sld>
 </file>
 
-<file path=ppt/slides/slide15.xml><?xml version="1.0" encoding="utf-8"?>
+<file path=ppt/slides/slide17.xml><?xml version="1.0" encoding="utf-8"?>
 <p:sld xmlns:a="http://schemas.openxmlformats.org/drawingml/2006/main" xmlns:r="http://schemas.openxmlformats.org/officeDocument/2006/relationships" xmlns:p="http://schemas.openxmlformats.org/presentationml/2006/main">
   <p:cSld>
     <p:spTree>
@@ -7768,7 +8628,7 @@
           <a:p>
             <a:fld id="{B30C84D9-7A41-4FEB-892B-80917372DB87}" type="slidenum">
               <a:rPr lang="en-US" smtClean="0"/>
-              <a:t>15</a:t>
+              <a:t>17</a:t>
             </a:fld>
             <a:endParaRPr lang="en-US"/>
           </a:p>
@@ -7787,7 +8647,7 @@
 </p:sld>
 </file>
 
-<file path=ppt/slides/slide16.xml><?xml version="1.0" encoding="utf-8"?>
+<file path=ppt/slides/slide18.xml><?xml version="1.0" encoding="utf-8"?>
 <p:sld xmlns:a="http://schemas.openxmlformats.org/drawingml/2006/main" xmlns:r="http://schemas.openxmlformats.org/officeDocument/2006/relationships" xmlns:p="http://schemas.openxmlformats.org/presentationml/2006/main">
   <p:cSld>
     <p:spTree>
@@ -7930,7 +8790,7 @@
           <a:p>
             <a:fld id="{B30C84D9-7A41-4FEB-892B-80917372DB87}" type="slidenum">
               <a:rPr lang="en-US" smtClean="0"/>
-              <a:t>16</a:t>
+              <a:t>18</a:t>
             </a:fld>
             <a:endParaRPr lang="en-US"/>
           </a:p>
@@ -8406,7 +9266,13 @@
       </p:grpSpPr>
       <p:sp>
         <p:nvSpPr>
-          <p:cNvPr id="2" name="Title 1"/>
+          <p:cNvPr id="8" name="Title 7">
+            <a:extLst>
+              <a:ext uri="{FF2B5EF4-FFF2-40B4-BE49-F238E27FC236}">
+                <a16:creationId xmlns:a16="http://schemas.microsoft.com/office/drawing/2014/main" id="{7D1DC6DC-2784-8541-AF1D-7586AA985A77}"/>
+              </a:ext>
+            </a:extLst>
+          </p:cNvPr>
           <p:cNvSpPr>
             <a:spLocks noGrp="1"/>
           </p:cNvSpPr>
@@ -8421,14 +9287,45 @@
           <a:p>
             <a:r>
               <a:rPr lang="en-US" dirty="0"/>
-              <a:t>Why are you taking this course?</a:t>
-            </a:r>
-          </a:p>
-        </p:txBody>
-      </p:sp>
-      <p:sp>
-        <p:nvSpPr>
-          <p:cNvPr id="4" name="Footer Placeholder 3"/>
+              <a:t>Course Structure, Syllabus Review</a:t>
+            </a:r>
+          </a:p>
+        </p:txBody>
+      </p:sp>
+      <p:sp>
+        <p:nvSpPr>
+          <p:cNvPr id="9" name="Content Placeholder 8">
+            <a:extLst>
+              <a:ext uri="{FF2B5EF4-FFF2-40B4-BE49-F238E27FC236}">
+                <a16:creationId xmlns:a16="http://schemas.microsoft.com/office/drawing/2014/main" id="{F0311056-E350-234B-9E75-5CBCCE51E7E6}"/>
+              </a:ext>
+            </a:extLst>
+          </p:cNvPr>
+          <p:cNvSpPr>
+            <a:spLocks noGrp="1"/>
+          </p:cNvSpPr>
+          <p:nvPr>
+            <p:ph idx="1"/>
+          </p:nvPr>
+        </p:nvSpPr>
+        <p:spPr/>
+        <p:txBody>
+          <a:bodyPr/>
+          <a:lstStyle/>
+          <a:p>
+            <a:endParaRPr lang="en-US"/>
+          </a:p>
+        </p:txBody>
+      </p:sp>
+      <p:sp>
+        <p:nvSpPr>
+          <p:cNvPr id="5" name="Footer Placeholder 4">
+            <a:extLst>
+              <a:ext uri="{FF2B5EF4-FFF2-40B4-BE49-F238E27FC236}">
+                <a16:creationId xmlns:a16="http://schemas.microsoft.com/office/drawing/2014/main" id="{AECABF7E-C358-8B43-8BBF-7B5570EF476F}"/>
+              </a:ext>
+            </a:extLst>
+          </p:cNvPr>
           <p:cNvSpPr>
             <a:spLocks noGrp="1"/>
           </p:cNvSpPr>
@@ -8451,7 +9348,13 @@
       </p:sp>
       <p:sp>
         <p:nvSpPr>
-          <p:cNvPr id="5" name="Slide Number Placeholder 4"/>
+          <p:cNvPr id="6" name="Slide Number Placeholder 5">
+            <a:extLst>
+              <a:ext uri="{FF2B5EF4-FFF2-40B4-BE49-F238E27FC236}">
+                <a16:creationId xmlns:a16="http://schemas.microsoft.com/office/drawing/2014/main" id="{3493CFBF-F92C-434D-8D13-4470505DB459}"/>
+              </a:ext>
+            </a:extLst>
+          </p:cNvPr>
           <p:cNvSpPr>
             <a:spLocks noGrp="1"/>
           </p:cNvSpPr>
@@ -8467,6 +9370,322 @@
             <a:fld id="{B30C84D9-7A41-4FEB-892B-80917372DB87}" type="slidenum">
               <a:rPr lang="en-US" smtClean="0"/>
               <a:t>3</a:t>
+            </a:fld>
+            <a:endParaRPr lang="en-US"/>
+          </a:p>
+        </p:txBody>
+      </p:sp>
+      <p:sp>
+        <p:nvSpPr>
+          <p:cNvPr id="7" name="Text Placeholder 6">
+            <a:extLst>
+              <a:ext uri="{FF2B5EF4-FFF2-40B4-BE49-F238E27FC236}">
+                <a16:creationId xmlns:a16="http://schemas.microsoft.com/office/drawing/2014/main" id="{55002C55-4F0E-7D43-A8CE-3DBDC7636302}"/>
+              </a:ext>
+            </a:extLst>
+          </p:cNvPr>
+          <p:cNvSpPr>
+            <a:spLocks noGrp="1"/>
+          </p:cNvSpPr>
+          <p:nvPr>
+            <p:ph type="body" sz="quarter" idx="13"/>
+          </p:nvPr>
+        </p:nvSpPr>
+        <p:spPr/>
+        <p:txBody>
+          <a:bodyPr/>
+          <a:lstStyle/>
+          <a:p>
+            <a:r>
+              <a:rPr lang="en-US" dirty="0"/>
+              <a:t>Slide by Bohn</a:t>
+            </a:r>
+          </a:p>
+        </p:txBody>
+      </p:sp>
+    </p:spTree>
+    <p:extLst>
+      <p:ext uri="{BB962C8B-B14F-4D97-AF65-F5344CB8AC3E}">
+        <p14:creationId xmlns:p14="http://schemas.microsoft.com/office/powerpoint/2010/main" val="2238747940"/>
+      </p:ext>
+    </p:extLst>
+  </p:cSld>
+  <p:clrMapOvr>
+    <a:masterClrMapping/>
+  </p:clrMapOvr>
+</p:sld>
+</file>
+
+<file path=ppt/slides/slide4.xml><?xml version="1.0" encoding="utf-8"?>
+<p:sld xmlns:a="http://schemas.openxmlformats.org/drawingml/2006/main" xmlns:r="http://schemas.openxmlformats.org/officeDocument/2006/relationships" xmlns:p="http://schemas.openxmlformats.org/presentationml/2006/main">
+  <p:cSld>
+    <p:spTree>
+      <p:nvGrpSpPr>
+        <p:cNvPr id="1" name=""/>
+        <p:cNvGrpSpPr/>
+        <p:nvPr/>
+      </p:nvGrpSpPr>
+      <p:grpSpPr>
+        <a:xfrm>
+          <a:off x="0" y="0"/>
+          <a:ext cx="0" cy="0"/>
+          <a:chOff x="0" y="0"/>
+          <a:chExt cx="0" cy="0"/>
+        </a:xfrm>
+      </p:grpSpPr>
+      <p:sp>
+        <p:nvSpPr>
+          <p:cNvPr id="2" name="Title 1">
+            <a:extLst>
+              <a:ext uri="{FF2B5EF4-FFF2-40B4-BE49-F238E27FC236}">
+                <a16:creationId xmlns:a16="http://schemas.microsoft.com/office/drawing/2014/main" id="{E54522FE-CB06-D049-819C-3F6594B20FCE}"/>
+              </a:ext>
+            </a:extLst>
+          </p:cNvPr>
+          <p:cNvSpPr>
+            <a:spLocks noGrp="1"/>
+          </p:cNvSpPr>
+          <p:nvPr>
+            <p:ph type="title"/>
+          </p:nvPr>
+        </p:nvSpPr>
+        <p:spPr/>
+        <p:txBody>
+          <a:bodyPr/>
+          <a:lstStyle/>
+          <a:p>
+            <a:r>
+              <a:rPr lang="en-US" dirty="0"/>
+              <a:t>COVID-19 Notes</a:t>
+            </a:r>
+          </a:p>
+        </p:txBody>
+      </p:sp>
+      <p:sp>
+        <p:nvSpPr>
+          <p:cNvPr id="3" name="Content Placeholder 2">
+            <a:extLst>
+              <a:ext uri="{FF2B5EF4-FFF2-40B4-BE49-F238E27FC236}">
+                <a16:creationId xmlns:a16="http://schemas.microsoft.com/office/drawing/2014/main" id="{494697D4-F3A9-3C41-84A4-99AA50C3EDF0}"/>
+              </a:ext>
+            </a:extLst>
+          </p:cNvPr>
+          <p:cNvSpPr>
+            <a:spLocks noGrp="1"/>
+          </p:cNvSpPr>
+          <p:nvPr>
+            <p:ph idx="1"/>
+          </p:nvPr>
+        </p:nvSpPr>
+        <p:spPr/>
+        <p:txBody>
+          <a:bodyPr/>
+          <a:lstStyle/>
+          <a:p>
+            <a:r>
+              <a:rPr lang="en-US" dirty="0"/>
+              <a:t>This course does not have an approved requirement for mandatory face coverings</a:t>
+            </a:r>
+          </a:p>
+          <a:p>
+            <a:endParaRPr lang="en-US" dirty="0"/>
+          </a:p>
+          <a:p>
+            <a:r>
+              <a:rPr lang="en-US" dirty="0"/>
+              <a:t>If your circumstances necessitate mandatory face coverings (family member who cannot be vaccinated or with health condition that makes vaccines less effective), contact me ASAP</a:t>
+            </a:r>
+          </a:p>
+          <a:p>
+            <a:endParaRPr lang="en-US" dirty="0"/>
+          </a:p>
+          <a:p>
+            <a:r>
+              <a:rPr lang="en-US" dirty="0"/>
+              <a:t>I will accommodate students who cannot attend class due to health issues</a:t>
+            </a:r>
+          </a:p>
+        </p:txBody>
+      </p:sp>
+      <p:sp>
+        <p:nvSpPr>
+          <p:cNvPr id="4" name="Footer Placeholder 3">
+            <a:extLst>
+              <a:ext uri="{FF2B5EF4-FFF2-40B4-BE49-F238E27FC236}">
+                <a16:creationId xmlns:a16="http://schemas.microsoft.com/office/drawing/2014/main" id="{1D81375A-459D-1648-BDAD-A9D9FD0F6EF0}"/>
+              </a:ext>
+            </a:extLst>
+          </p:cNvPr>
+          <p:cNvSpPr>
+            <a:spLocks noGrp="1"/>
+          </p:cNvSpPr>
+          <p:nvPr>
+            <p:ph type="ftr" sz="quarter" idx="11"/>
+          </p:nvPr>
+        </p:nvSpPr>
+        <p:spPr/>
+        <p:txBody>
+          <a:bodyPr/>
+          <a:lstStyle/>
+          <a:p>
+            <a:r>
+              <a:rPr lang="en-US"/>
+              <a:t>Programming at the Hardware/Software Interface</a:t>
+            </a:r>
+            <a:endParaRPr lang="en-US" dirty="0"/>
+          </a:p>
+        </p:txBody>
+      </p:sp>
+      <p:sp>
+        <p:nvSpPr>
+          <p:cNvPr id="5" name="Slide Number Placeholder 4">
+            <a:extLst>
+              <a:ext uri="{FF2B5EF4-FFF2-40B4-BE49-F238E27FC236}">
+                <a16:creationId xmlns:a16="http://schemas.microsoft.com/office/drawing/2014/main" id="{842F4E4A-5783-B948-AC41-16C887FACC82}"/>
+              </a:ext>
+            </a:extLst>
+          </p:cNvPr>
+          <p:cNvSpPr>
+            <a:spLocks noGrp="1"/>
+          </p:cNvSpPr>
+          <p:nvPr>
+            <p:ph type="sldNum" sz="quarter" idx="12"/>
+          </p:nvPr>
+        </p:nvSpPr>
+        <p:spPr/>
+        <p:txBody>
+          <a:bodyPr/>
+          <a:lstStyle/>
+          <a:p>
+            <a:fld id="{B30C84D9-7A41-4FEB-892B-80917372DB87}" type="slidenum">
+              <a:rPr lang="en-US" smtClean="0"/>
+              <a:t>4</a:t>
+            </a:fld>
+            <a:endParaRPr lang="en-US"/>
+          </a:p>
+        </p:txBody>
+      </p:sp>
+      <p:sp>
+        <p:nvSpPr>
+          <p:cNvPr id="6" name="Text Placeholder 5">
+            <a:extLst>
+              <a:ext uri="{FF2B5EF4-FFF2-40B4-BE49-F238E27FC236}">
+                <a16:creationId xmlns:a16="http://schemas.microsoft.com/office/drawing/2014/main" id="{83AE8B4C-A08A-4442-A5DA-C1FA0801A231}"/>
+              </a:ext>
+            </a:extLst>
+          </p:cNvPr>
+          <p:cNvSpPr>
+            <a:spLocks noGrp="1"/>
+          </p:cNvSpPr>
+          <p:nvPr>
+            <p:ph type="body" sz="quarter" idx="13"/>
+          </p:nvPr>
+        </p:nvSpPr>
+        <p:spPr/>
+        <p:txBody>
+          <a:bodyPr/>
+          <a:lstStyle/>
+          <a:p>
+            <a:r>
+              <a:rPr lang="en-US" dirty="0"/>
+              <a:t>Slide by Bohn</a:t>
+            </a:r>
+          </a:p>
+        </p:txBody>
+      </p:sp>
+    </p:spTree>
+    <p:extLst>
+      <p:ext uri="{BB962C8B-B14F-4D97-AF65-F5344CB8AC3E}">
+        <p14:creationId xmlns:p14="http://schemas.microsoft.com/office/powerpoint/2010/main" val="2662494157"/>
+      </p:ext>
+    </p:extLst>
+  </p:cSld>
+  <p:clrMapOvr>
+    <a:masterClrMapping/>
+  </p:clrMapOvr>
+</p:sld>
+</file>
+
+<file path=ppt/slides/slide5.xml><?xml version="1.0" encoding="utf-8"?>
+<p:sld xmlns:a="http://schemas.openxmlformats.org/drawingml/2006/main" xmlns:r="http://schemas.openxmlformats.org/officeDocument/2006/relationships" xmlns:p="http://schemas.openxmlformats.org/presentationml/2006/main">
+  <p:cSld>
+    <p:spTree>
+      <p:nvGrpSpPr>
+        <p:cNvPr id="1" name=""/>
+        <p:cNvGrpSpPr/>
+        <p:nvPr/>
+      </p:nvGrpSpPr>
+      <p:grpSpPr>
+        <a:xfrm>
+          <a:off x="0" y="0"/>
+          <a:ext cx="0" cy="0"/>
+          <a:chOff x="0" y="0"/>
+          <a:chExt cx="0" cy="0"/>
+        </a:xfrm>
+      </p:grpSpPr>
+      <p:sp>
+        <p:nvSpPr>
+          <p:cNvPr id="2" name="Title 1"/>
+          <p:cNvSpPr>
+            <a:spLocks noGrp="1"/>
+          </p:cNvSpPr>
+          <p:nvPr>
+            <p:ph type="title"/>
+          </p:nvPr>
+        </p:nvSpPr>
+        <p:spPr/>
+        <p:txBody>
+          <a:bodyPr/>
+          <a:lstStyle/>
+          <a:p>
+            <a:r>
+              <a:rPr lang="en-US" dirty="0"/>
+              <a:t>Why are you taking this course?</a:t>
+            </a:r>
+          </a:p>
+        </p:txBody>
+      </p:sp>
+      <p:sp>
+        <p:nvSpPr>
+          <p:cNvPr id="4" name="Footer Placeholder 3"/>
+          <p:cNvSpPr>
+            <a:spLocks noGrp="1"/>
+          </p:cNvSpPr>
+          <p:nvPr>
+            <p:ph type="ftr" sz="quarter" idx="11"/>
+          </p:nvPr>
+        </p:nvSpPr>
+        <p:spPr/>
+        <p:txBody>
+          <a:bodyPr/>
+          <a:lstStyle/>
+          <a:p>
+            <a:r>
+              <a:rPr lang="en-US"/>
+              <a:t>Programming at the Hardware/Software Interface</a:t>
+            </a:r>
+            <a:endParaRPr lang="en-US" dirty="0"/>
+          </a:p>
+        </p:txBody>
+      </p:sp>
+      <p:sp>
+        <p:nvSpPr>
+          <p:cNvPr id="5" name="Slide Number Placeholder 4"/>
+          <p:cNvSpPr>
+            <a:spLocks noGrp="1"/>
+          </p:cNvSpPr>
+          <p:nvPr>
+            <p:ph type="sldNum" sz="quarter" idx="12"/>
+          </p:nvPr>
+        </p:nvSpPr>
+        <p:spPr/>
+        <p:txBody>
+          <a:bodyPr/>
+          <a:lstStyle/>
+          <a:p>
+            <a:fld id="{B30C84D9-7A41-4FEB-892B-80917372DB87}" type="slidenum">
+              <a:rPr lang="en-US" smtClean="0"/>
+              <a:t>5</a:t>
             </a:fld>
             <a:endParaRPr lang="en-US"/>
           </a:p>
@@ -8925,7 +10144,7 @@
 </p:sld>
 </file>
 
-<file path=ppt/slides/slide4.xml><?xml version="1.0" encoding="utf-8"?>
+<file path=ppt/slides/slide6.xml><?xml version="1.0" encoding="utf-8"?>
 <p:sld xmlns:a="http://schemas.openxmlformats.org/drawingml/2006/main" xmlns:r="http://schemas.openxmlformats.org/officeDocument/2006/relationships" xmlns:p="http://schemas.openxmlformats.org/presentationml/2006/main">
   <p:cSld>
     <p:spTree>
@@ -9056,7 +10275,7 @@
           <a:p>
             <a:fld id="{B30C84D9-7A41-4FEB-892B-80917372DB87}" type="slidenum">
               <a:rPr lang="en-US" smtClean="0"/>
-              <a:t>4</a:t>
+              <a:t>6</a:t>
             </a:fld>
             <a:endParaRPr lang="en-US"/>
           </a:p>
@@ -9432,7 +10651,7 @@
 </p:sld>
 </file>
 
-<file path=ppt/slides/slide5.xml><?xml version="1.0" encoding="utf-8"?>
+<file path=ppt/slides/slide7.xml><?xml version="1.0" encoding="utf-8"?>
 <p:sld xmlns:a="http://schemas.openxmlformats.org/drawingml/2006/main" xmlns:r="http://schemas.openxmlformats.org/officeDocument/2006/relationships" xmlns:p="http://schemas.openxmlformats.org/presentationml/2006/main">
   <p:cSld>
     <p:spTree>
@@ -9572,7 +10791,7 @@
           <a:p>
             <a:fld id="{B30C84D9-7A41-4FEB-892B-80917372DB87}" type="slidenum">
               <a:rPr lang="en-US" smtClean="0"/>
-              <a:t>5</a:t>
+              <a:t>7</a:t>
             </a:fld>
             <a:endParaRPr lang="en-US"/>
           </a:p>
@@ -9991,7 +11210,7 @@
 </p:sld>
 </file>
 
-<file path=ppt/slides/slide6.xml><?xml version="1.0" encoding="utf-8"?>
+<file path=ppt/slides/slide8.xml><?xml version="1.0" encoding="utf-8"?>
 <p:sld xmlns:a="http://schemas.openxmlformats.org/drawingml/2006/main" xmlns:r="http://schemas.openxmlformats.org/officeDocument/2006/relationships" xmlns:p="http://schemas.openxmlformats.org/presentationml/2006/main">
   <p:cSld>
     <p:spTree>
@@ -10107,7 +11326,7 @@
           <a:p>
             <a:fld id="{B30C84D9-7A41-4FEB-892B-80917372DB87}" type="slidenum">
               <a:rPr lang="en-US" smtClean="0"/>
-              <a:t>6</a:t>
+              <a:t>8</a:t>
             </a:fld>
             <a:endParaRPr lang="en-US"/>
           </a:p>
@@ -10148,7 +11367,7 @@
 </p:sld>
 </file>
 
-<file path=ppt/slides/slide7.xml><?xml version="1.0" encoding="utf-8"?>
+<file path=ppt/slides/slide9.xml><?xml version="1.0" encoding="utf-8"?>
 <p:sld xmlns:a="http://schemas.openxmlformats.org/drawingml/2006/main" xmlns:r="http://schemas.openxmlformats.org/officeDocument/2006/relationships" xmlns:p="http://schemas.openxmlformats.org/presentationml/2006/main">
   <p:cSld>
     <p:spTree>
@@ -10281,7 +11500,7 @@
           <a:p>
             <a:fld id="{B30C84D9-7A41-4FEB-892B-80917372DB87}" type="slidenum">
               <a:rPr lang="en-US" smtClean="0"/>
-              <a:t>7</a:t>
+              <a:t>9</a:t>
             </a:fld>
             <a:endParaRPr lang="en-US"/>
           </a:p>
@@ -10900,864 +12119,6 @@
       <p:bldP spid="14" grpId="0"/>
       <p:bldP spid="15" grpId="0"/>
     </p:bldLst>
-  </p:timing>
-</p:sld>
-</file>
-
-<file path=ppt/slides/slide8.xml><?xml version="1.0" encoding="utf-8"?>
-<p:sld xmlns:a="http://schemas.openxmlformats.org/drawingml/2006/main" xmlns:r="http://schemas.openxmlformats.org/officeDocument/2006/relationships" xmlns:p="http://schemas.openxmlformats.org/presentationml/2006/main">
-  <p:cSld>
-    <p:spTree>
-      <p:nvGrpSpPr>
-        <p:cNvPr id="1" name=""/>
-        <p:cNvGrpSpPr/>
-        <p:nvPr/>
-      </p:nvGrpSpPr>
-      <p:grpSpPr>
-        <a:xfrm>
-          <a:off x="0" y="0"/>
-          <a:ext cx="0" cy="0"/>
-          <a:chOff x="0" y="0"/>
-          <a:chExt cx="0" cy="0"/>
-        </a:xfrm>
-      </p:grpSpPr>
-      <p:sp>
-        <p:nvSpPr>
-          <p:cNvPr id="2" name="Title 1"/>
-          <p:cNvSpPr>
-            <a:spLocks noGrp="1"/>
-          </p:cNvSpPr>
-          <p:nvPr>
-            <p:ph type="title"/>
-          </p:nvPr>
-        </p:nvSpPr>
-        <p:spPr/>
-        <p:txBody>
-          <a:bodyPr/>
-          <a:lstStyle/>
-          <a:p>
-            <a:r>
-              <a:rPr lang="en-US" dirty="0"/>
-              <a:t>Planned lessons</a:t>
-            </a:r>
-          </a:p>
-        </p:txBody>
-      </p:sp>
-      <p:sp>
-        <p:nvSpPr>
-          <p:cNvPr id="7" name="Content Placeholder 6"/>
-          <p:cNvSpPr>
-            <a:spLocks noGrp="1"/>
-          </p:cNvSpPr>
-          <p:nvPr>
-            <p:ph sz="half" idx="1"/>
-          </p:nvPr>
-        </p:nvSpPr>
-        <p:spPr/>
-        <p:txBody>
-          <a:bodyPr/>
-          <a:lstStyle/>
-          <a:p>
-            <a:r>
-              <a:rPr lang="en-US" dirty="0">
-                <a:solidFill>
-                  <a:schemeClr val="bg1">
-                    <a:lumMod val="65000"/>
-                  </a:schemeClr>
-                </a:solidFill>
-              </a:rPr>
-              <a:t>Data representation &amp; arithmetic</a:t>
-            </a:r>
-          </a:p>
-          <a:p>
-            <a:r>
-              <a:rPr lang="en-US" dirty="0"/>
-              <a:t>Assembly language</a:t>
-            </a:r>
-          </a:p>
-        </p:txBody>
-      </p:sp>
-      <p:sp>
-        <p:nvSpPr>
-          <p:cNvPr id="8" name="Content Placeholder 7"/>
-          <p:cNvSpPr>
-            <a:spLocks noGrp="1"/>
-          </p:cNvSpPr>
-          <p:nvPr>
-            <p:ph sz="half" idx="2"/>
-          </p:nvPr>
-        </p:nvSpPr>
-        <p:spPr/>
-        <p:txBody>
-          <a:bodyPr>
-            <a:normAutofit/>
-          </a:bodyPr>
-          <a:lstStyle/>
-          <a:p>
-            <a:r>
-              <a:rPr lang="en-US" dirty="0"/>
-              <a:t>ALGOL, BASIC, COBOL, FORTRAN, Pascal, and PL/I</a:t>
-            </a:r>
-            <a:br>
-              <a:rPr lang="en-US" dirty="0"/>
-            </a:br>
-            <a:r>
-              <a:rPr lang="en-US" dirty="0"/>
-              <a:t>count 1,2,3…</a:t>
-            </a:r>
-            <a:br>
-              <a:rPr lang="en-US" dirty="0"/>
-            </a:br>
-            <a:r>
-              <a:rPr lang="en-US" sz="2000" dirty="0"/>
-              <a:t>(or allow arbitrary array ranges)</a:t>
-            </a:r>
-            <a:endParaRPr lang="en-US" dirty="0"/>
-          </a:p>
-          <a:p>
-            <a:r>
-              <a:rPr lang="en-US" dirty="0"/>
-              <a:t>Why does C count 0,1,2…?</a:t>
-            </a:r>
-          </a:p>
-          <a:p>
-            <a:r>
-              <a:rPr lang="en-US" dirty="0"/>
-              <a:t>Why do C strings end in </a:t>
-            </a:r>
-            <a:r>
-              <a:rPr lang="en-US" b="1" dirty="0"/>
-              <a:t>\0</a:t>
-            </a:r>
-            <a:r>
-              <a:rPr lang="en-US" dirty="0"/>
-              <a:t> ?</a:t>
-            </a:r>
-          </a:p>
-          <a:p>
-            <a:r>
-              <a:rPr lang="en-US" dirty="0"/>
-              <a:t>Why does C have an increment operator (</a:t>
-            </a:r>
-            <a:r>
-              <a:rPr lang="en-US" b="1" dirty="0" err="1"/>
-              <a:t>i</a:t>
-            </a:r>
-            <a:r>
-              <a:rPr lang="en-US" b="1" dirty="0"/>
-              <a:t>++</a:t>
-            </a:r>
-            <a:r>
-              <a:rPr lang="en-US" dirty="0"/>
-              <a:t>)?</a:t>
-            </a:r>
-          </a:p>
-          <a:p>
-            <a:r>
-              <a:rPr lang="en-US" dirty="0"/>
-              <a:t>Why does C have the ternary operator? (</a:t>
-            </a:r>
-            <a:r>
-              <a:rPr lang="en-US" b="1" dirty="0"/>
-              <a:t>x = x&lt;y ? x : y</a:t>
-            </a:r>
-            <a:r>
-              <a:rPr lang="en-US" dirty="0"/>
-              <a:t>)</a:t>
-            </a:r>
-          </a:p>
-        </p:txBody>
-      </p:sp>
-      <p:sp>
-        <p:nvSpPr>
-          <p:cNvPr id="4" name="Footer Placeholder 3"/>
-          <p:cNvSpPr>
-            <a:spLocks noGrp="1"/>
-          </p:cNvSpPr>
-          <p:nvPr>
-            <p:ph type="ftr" sz="quarter" idx="11"/>
-          </p:nvPr>
-        </p:nvSpPr>
-        <p:spPr/>
-        <p:txBody>
-          <a:bodyPr/>
-          <a:lstStyle/>
-          <a:p>
-            <a:r>
-              <a:rPr lang="en-US"/>
-              <a:t>Programming at the Hardware/Software Interface</a:t>
-            </a:r>
-            <a:endParaRPr lang="en-US" dirty="0"/>
-          </a:p>
-        </p:txBody>
-      </p:sp>
-      <p:sp>
-        <p:nvSpPr>
-          <p:cNvPr id="5" name="Slide Number Placeholder 4"/>
-          <p:cNvSpPr>
-            <a:spLocks noGrp="1"/>
-          </p:cNvSpPr>
-          <p:nvPr>
-            <p:ph type="sldNum" sz="quarter" idx="12"/>
-          </p:nvPr>
-        </p:nvSpPr>
-        <p:spPr/>
-        <p:txBody>
-          <a:bodyPr/>
-          <a:lstStyle/>
-          <a:p>
-            <a:fld id="{B30C84D9-7A41-4FEB-892B-80917372DB87}" type="slidenum">
-              <a:rPr lang="en-US" smtClean="0"/>
-              <a:t>8</a:t>
-            </a:fld>
-            <a:endParaRPr lang="en-US"/>
-          </a:p>
-        </p:txBody>
-      </p:sp>
-      <p:sp>
-        <p:nvSpPr>
-          <p:cNvPr id="9" name="Text Placeholder 8"/>
-          <p:cNvSpPr>
-            <a:spLocks noGrp="1"/>
-          </p:cNvSpPr>
-          <p:nvPr>
-            <p:ph type="body" sz="quarter" idx="13"/>
-          </p:nvPr>
-        </p:nvSpPr>
-        <p:spPr/>
-        <p:txBody>
-          <a:bodyPr/>
-          <a:lstStyle/>
-          <a:p>
-            <a:r>
-              <a:rPr lang="en-US" dirty="0"/>
-              <a:t>Slide by Bohn</a:t>
-            </a:r>
-          </a:p>
-        </p:txBody>
-      </p:sp>
-    </p:spTree>
-    <p:extLst>
-      <p:ext uri="{BB962C8B-B14F-4D97-AF65-F5344CB8AC3E}">
-        <p14:creationId xmlns:p14="http://schemas.microsoft.com/office/powerpoint/2010/main" val="1737821417"/>
-      </p:ext>
-    </p:extLst>
-  </p:cSld>
-  <p:clrMapOvr>
-    <a:masterClrMapping/>
-  </p:clrMapOvr>
-  <p:timing>
-    <p:tnLst>
-      <p:par>
-        <p:cTn id="1" dur="indefinite" restart="never" nodeType="tmRoot">
-          <p:childTnLst>
-            <p:seq concurrent="1" nextAc="seek">
-              <p:cTn id="2" dur="indefinite" nodeType="mainSeq">
-                <p:childTnLst>
-                  <p:par>
-                    <p:cTn id="3" fill="hold">
-                      <p:stCondLst>
-                        <p:cond delay="indefinite"/>
-                      </p:stCondLst>
-                      <p:childTnLst>
-                        <p:par>
-                          <p:cTn id="4" fill="hold">
-                            <p:stCondLst>
-                              <p:cond delay="0"/>
-                            </p:stCondLst>
-                            <p:childTnLst>
-                              <p:par>
-                                <p:cTn id="5" presetID="10" presetClass="entr" presetSubtype="0" fill="hold" grpId="0" nodeType="clickEffect">
-                                  <p:stCondLst>
-                                    <p:cond delay="0"/>
-                                  </p:stCondLst>
-                                  <p:childTnLst>
-                                    <p:set>
-                                      <p:cBhvr>
-                                        <p:cTn id="6" dur="1" fill="hold">
-                                          <p:stCondLst>
-                                            <p:cond delay="0"/>
-                                          </p:stCondLst>
-                                        </p:cTn>
-                                        <p:tgtEl>
-                                          <p:spTgt spid="8">
-                                            <p:txEl>
-                                              <p:pRg st="0" end="0"/>
-                                            </p:txEl>
-                                          </p:spTgt>
-                                        </p:tgtEl>
-                                        <p:attrNameLst>
-                                          <p:attrName>style.visibility</p:attrName>
-                                        </p:attrNameLst>
-                                      </p:cBhvr>
-                                      <p:to>
-                                        <p:strVal val="visible"/>
-                                      </p:to>
-                                    </p:set>
-                                    <p:animEffect transition="in" filter="fade">
-                                      <p:cBhvr>
-                                        <p:cTn id="7" dur="500"/>
-                                        <p:tgtEl>
-                                          <p:spTgt spid="8">
-                                            <p:txEl>
-                                              <p:pRg st="0" end="0"/>
-                                            </p:txEl>
-                                          </p:spTgt>
-                                        </p:tgtEl>
-                                      </p:cBhvr>
-                                    </p:animEffect>
-                                  </p:childTnLst>
-                                </p:cTn>
-                              </p:par>
-                              <p:par>
-                                <p:cTn id="8" presetID="10" presetClass="entr" presetSubtype="0" fill="hold" grpId="0" nodeType="withEffect">
-                                  <p:stCondLst>
-                                    <p:cond delay="0"/>
-                                  </p:stCondLst>
-                                  <p:childTnLst>
-                                    <p:set>
-                                      <p:cBhvr>
-                                        <p:cTn id="9" dur="1" fill="hold">
-                                          <p:stCondLst>
-                                            <p:cond delay="0"/>
-                                          </p:stCondLst>
-                                        </p:cTn>
-                                        <p:tgtEl>
-                                          <p:spTgt spid="8">
-                                            <p:txEl>
-                                              <p:pRg st="1" end="1"/>
-                                            </p:txEl>
-                                          </p:spTgt>
-                                        </p:tgtEl>
-                                        <p:attrNameLst>
-                                          <p:attrName>style.visibility</p:attrName>
-                                        </p:attrNameLst>
-                                      </p:cBhvr>
-                                      <p:to>
-                                        <p:strVal val="visible"/>
-                                      </p:to>
-                                    </p:set>
-                                    <p:animEffect transition="in" filter="fade">
-                                      <p:cBhvr>
-                                        <p:cTn id="10" dur="500"/>
-                                        <p:tgtEl>
-                                          <p:spTgt spid="8">
-                                            <p:txEl>
-                                              <p:pRg st="1" end="1"/>
-                                            </p:txEl>
-                                          </p:spTgt>
-                                        </p:tgtEl>
-                                      </p:cBhvr>
-                                    </p:animEffect>
-                                  </p:childTnLst>
-                                </p:cTn>
-                              </p:par>
-                            </p:childTnLst>
-                          </p:cTn>
-                        </p:par>
-                      </p:childTnLst>
-                    </p:cTn>
-                  </p:par>
-                  <p:par>
-                    <p:cTn id="11" fill="hold">
-                      <p:stCondLst>
-                        <p:cond delay="indefinite"/>
-                      </p:stCondLst>
-                      <p:childTnLst>
-                        <p:par>
-                          <p:cTn id="12" fill="hold">
-                            <p:stCondLst>
-                              <p:cond delay="0"/>
-                            </p:stCondLst>
-                            <p:childTnLst>
-                              <p:par>
-                                <p:cTn id="13" presetID="10" presetClass="entr" presetSubtype="0" fill="hold" grpId="0" nodeType="clickEffect">
-                                  <p:stCondLst>
-                                    <p:cond delay="0"/>
-                                  </p:stCondLst>
-                                  <p:childTnLst>
-                                    <p:set>
-                                      <p:cBhvr>
-                                        <p:cTn id="14" dur="1" fill="hold">
-                                          <p:stCondLst>
-                                            <p:cond delay="0"/>
-                                          </p:stCondLst>
-                                        </p:cTn>
-                                        <p:tgtEl>
-                                          <p:spTgt spid="8">
-                                            <p:txEl>
-                                              <p:pRg st="2" end="2"/>
-                                            </p:txEl>
-                                          </p:spTgt>
-                                        </p:tgtEl>
-                                        <p:attrNameLst>
-                                          <p:attrName>style.visibility</p:attrName>
-                                        </p:attrNameLst>
-                                      </p:cBhvr>
-                                      <p:to>
-                                        <p:strVal val="visible"/>
-                                      </p:to>
-                                    </p:set>
-                                    <p:animEffect transition="in" filter="fade">
-                                      <p:cBhvr>
-                                        <p:cTn id="15" dur="500"/>
-                                        <p:tgtEl>
-                                          <p:spTgt spid="8">
-                                            <p:txEl>
-                                              <p:pRg st="2" end="2"/>
-                                            </p:txEl>
-                                          </p:spTgt>
-                                        </p:tgtEl>
-                                      </p:cBhvr>
-                                    </p:animEffect>
-                                  </p:childTnLst>
-                                </p:cTn>
-                              </p:par>
-                            </p:childTnLst>
-                          </p:cTn>
-                        </p:par>
-                      </p:childTnLst>
-                    </p:cTn>
-                  </p:par>
-                  <p:par>
-                    <p:cTn id="16" fill="hold">
-                      <p:stCondLst>
-                        <p:cond delay="indefinite"/>
-                      </p:stCondLst>
-                      <p:childTnLst>
-                        <p:par>
-                          <p:cTn id="17" fill="hold">
-                            <p:stCondLst>
-                              <p:cond delay="0"/>
-                            </p:stCondLst>
-                            <p:childTnLst>
-                              <p:par>
-                                <p:cTn id="18" presetID="10" presetClass="entr" presetSubtype="0" fill="hold" grpId="0" nodeType="clickEffect">
-                                  <p:stCondLst>
-                                    <p:cond delay="0"/>
-                                  </p:stCondLst>
-                                  <p:childTnLst>
-                                    <p:set>
-                                      <p:cBhvr>
-                                        <p:cTn id="19" dur="1" fill="hold">
-                                          <p:stCondLst>
-                                            <p:cond delay="0"/>
-                                          </p:stCondLst>
-                                        </p:cTn>
-                                        <p:tgtEl>
-                                          <p:spTgt spid="8">
-                                            <p:txEl>
-                                              <p:pRg st="3" end="3"/>
-                                            </p:txEl>
-                                          </p:spTgt>
-                                        </p:tgtEl>
-                                        <p:attrNameLst>
-                                          <p:attrName>style.visibility</p:attrName>
-                                        </p:attrNameLst>
-                                      </p:cBhvr>
-                                      <p:to>
-                                        <p:strVal val="visible"/>
-                                      </p:to>
-                                    </p:set>
-                                    <p:animEffect transition="in" filter="fade">
-                                      <p:cBhvr>
-                                        <p:cTn id="20" dur="500"/>
-                                        <p:tgtEl>
-                                          <p:spTgt spid="8">
-                                            <p:txEl>
-                                              <p:pRg st="3" end="3"/>
-                                            </p:txEl>
-                                          </p:spTgt>
-                                        </p:tgtEl>
-                                      </p:cBhvr>
-                                    </p:animEffect>
-                                  </p:childTnLst>
-                                </p:cTn>
-                              </p:par>
-                            </p:childTnLst>
-                          </p:cTn>
-                        </p:par>
-                      </p:childTnLst>
-                    </p:cTn>
-                  </p:par>
-                  <p:par>
-                    <p:cTn id="21" fill="hold">
-                      <p:stCondLst>
-                        <p:cond delay="indefinite"/>
-                      </p:stCondLst>
-                      <p:childTnLst>
-                        <p:par>
-                          <p:cTn id="22" fill="hold">
-                            <p:stCondLst>
-                              <p:cond delay="0"/>
-                            </p:stCondLst>
-                            <p:childTnLst>
-                              <p:par>
-                                <p:cTn id="23" presetID="10" presetClass="entr" presetSubtype="0" fill="hold" grpId="0" nodeType="clickEffect">
-                                  <p:stCondLst>
-                                    <p:cond delay="0"/>
-                                  </p:stCondLst>
-                                  <p:childTnLst>
-                                    <p:set>
-                                      <p:cBhvr>
-                                        <p:cTn id="24" dur="1" fill="hold">
-                                          <p:stCondLst>
-                                            <p:cond delay="0"/>
-                                          </p:stCondLst>
-                                        </p:cTn>
-                                        <p:tgtEl>
-                                          <p:spTgt spid="8">
-                                            <p:txEl>
-                                              <p:pRg st="4" end="4"/>
-                                            </p:txEl>
-                                          </p:spTgt>
-                                        </p:tgtEl>
-                                        <p:attrNameLst>
-                                          <p:attrName>style.visibility</p:attrName>
-                                        </p:attrNameLst>
-                                      </p:cBhvr>
-                                      <p:to>
-                                        <p:strVal val="visible"/>
-                                      </p:to>
-                                    </p:set>
-                                    <p:animEffect transition="in" filter="fade">
-                                      <p:cBhvr>
-                                        <p:cTn id="25" dur="500"/>
-                                        <p:tgtEl>
-                                          <p:spTgt spid="8">
-                                            <p:txEl>
-                                              <p:pRg st="4" end="4"/>
-                                            </p:txEl>
-                                          </p:spTgt>
-                                        </p:tgtEl>
-                                      </p:cBhvr>
-                                    </p:animEffect>
-                                  </p:childTnLst>
-                                </p:cTn>
-                              </p:par>
-                            </p:childTnLst>
-                          </p:cTn>
-                        </p:par>
-                      </p:childTnLst>
-                    </p:cTn>
-                  </p:par>
-                </p:childTnLst>
-              </p:cTn>
-              <p:prevCondLst>
-                <p:cond evt="onPrev" delay="0">
-                  <p:tgtEl>
-                    <p:sldTgt/>
-                  </p:tgtEl>
-                </p:cond>
-              </p:prevCondLst>
-              <p:nextCondLst>
-                <p:cond evt="onNext" delay="0">
-                  <p:tgtEl>
-                    <p:sldTgt/>
-                  </p:tgtEl>
-                </p:cond>
-              </p:nextCondLst>
-            </p:seq>
-          </p:childTnLst>
-        </p:cTn>
-      </p:par>
-    </p:tnLst>
-    <p:bldLst>
-      <p:bldP spid="8" grpId="0" build="p"/>
-    </p:bldLst>
-  </p:timing>
-</p:sld>
-</file>
-
-<file path=ppt/slides/slide9.xml><?xml version="1.0" encoding="utf-8"?>
-<p:sld xmlns:a="http://schemas.openxmlformats.org/drawingml/2006/main" xmlns:r="http://schemas.openxmlformats.org/officeDocument/2006/relationships" xmlns:p="http://schemas.openxmlformats.org/presentationml/2006/main">
-  <p:cSld>
-    <p:spTree>
-      <p:nvGrpSpPr>
-        <p:cNvPr id="1" name=""/>
-        <p:cNvGrpSpPr/>
-        <p:nvPr/>
-      </p:nvGrpSpPr>
-      <p:grpSpPr>
-        <a:xfrm>
-          <a:off x="0" y="0"/>
-          <a:ext cx="0" cy="0"/>
-          <a:chOff x="0" y="0"/>
-          <a:chExt cx="0" cy="0"/>
-        </a:xfrm>
-      </p:grpSpPr>
-      <p:sp>
-        <p:nvSpPr>
-          <p:cNvPr id="2" name="Title 1"/>
-          <p:cNvSpPr>
-            <a:spLocks noGrp="1"/>
-          </p:cNvSpPr>
-          <p:nvPr>
-            <p:ph type="title"/>
-          </p:nvPr>
-        </p:nvSpPr>
-        <p:spPr/>
-        <p:txBody>
-          <a:bodyPr/>
-          <a:lstStyle/>
-          <a:p>
-            <a:r>
-              <a:rPr lang="en-US" dirty="0"/>
-              <a:t>Planned lessons</a:t>
-            </a:r>
-          </a:p>
-        </p:txBody>
-      </p:sp>
-      <p:sp>
-        <p:nvSpPr>
-          <p:cNvPr id="7" name="Content Placeholder 6"/>
-          <p:cNvSpPr>
-            <a:spLocks noGrp="1"/>
-          </p:cNvSpPr>
-          <p:nvPr>
-            <p:ph sz="half" idx="1"/>
-          </p:nvPr>
-        </p:nvSpPr>
-        <p:spPr/>
-        <p:txBody>
-          <a:bodyPr/>
-          <a:lstStyle/>
-          <a:p>
-            <a:r>
-              <a:rPr lang="en-US" dirty="0">
-                <a:solidFill>
-                  <a:schemeClr val="bg1">
-                    <a:lumMod val="65000"/>
-                  </a:schemeClr>
-                </a:solidFill>
-              </a:rPr>
-              <a:t>Data representation &amp; arithmetic</a:t>
-            </a:r>
-          </a:p>
-          <a:p>
-            <a:r>
-              <a:rPr lang="en-US" dirty="0">
-                <a:solidFill>
-                  <a:schemeClr val="bg1">
-                    <a:lumMod val="65000"/>
-                  </a:schemeClr>
-                </a:solidFill>
-              </a:rPr>
-              <a:t>Assembly language</a:t>
-            </a:r>
-          </a:p>
-          <a:p>
-            <a:r>
-              <a:rPr lang="en-US" dirty="0"/>
-              <a:t>Processor architecture</a:t>
-            </a:r>
-          </a:p>
-        </p:txBody>
-      </p:sp>
-      <p:sp>
-        <p:nvSpPr>
-          <p:cNvPr id="8" name="Content Placeholder 7"/>
-          <p:cNvSpPr>
-            <a:spLocks noGrp="1"/>
-          </p:cNvSpPr>
-          <p:nvPr>
-            <p:ph sz="half" idx="2"/>
-          </p:nvPr>
-        </p:nvSpPr>
-        <p:spPr/>
-        <p:txBody>
-          <a:bodyPr>
-            <a:normAutofit/>
-          </a:bodyPr>
-          <a:lstStyle/>
-          <a:p>
-            <a:r>
-              <a:rPr lang="en-US" dirty="0"/>
-              <a:t>Why is clock speed a poor measure of processor performance?</a:t>
-            </a:r>
-          </a:p>
-          <a:p>
-            <a:endParaRPr lang="en-US" dirty="0"/>
-          </a:p>
-          <a:p>
-            <a:endParaRPr lang="en-US" dirty="0"/>
-          </a:p>
-          <a:p>
-            <a:endParaRPr lang="en-US" dirty="0"/>
-          </a:p>
-          <a:p>
-            <a:endParaRPr lang="en-US" sz="4000" dirty="0"/>
-          </a:p>
-        </p:txBody>
-      </p:sp>
-      <p:sp>
-        <p:nvSpPr>
-          <p:cNvPr id="4" name="Footer Placeholder 3"/>
-          <p:cNvSpPr>
-            <a:spLocks noGrp="1"/>
-          </p:cNvSpPr>
-          <p:nvPr>
-            <p:ph type="ftr" sz="quarter" idx="11"/>
-          </p:nvPr>
-        </p:nvSpPr>
-        <p:spPr/>
-        <p:txBody>
-          <a:bodyPr/>
-          <a:lstStyle/>
-          <a:p>
-            <a:r>
-              <a:rPr lang="en-US"/>
-              <a:t>Programming at the Hardware/Software Interface</a:t>
-            </a:r>
-            <a:endParaRPr lang="en-US" dirty="0"/>
-          </a:p>
-        </p:txBody>
-      </p:sp>
-      <p:sp>
-        <p:nvSpPr>
-          <p:cNvPr id="5" name="Slide Number Placeholder 4"/>
-          <p:cNvSpPr>
-            <a:spLocks noGrp="1"/>
-          </p:cNvSpPr>
-          <p:nvPr>
-            <p:ph type="sldNum" sz="quarter" idx="12"/>
-          </p:nvPr>
-        </p:nvSpPr>
-        <p:spPr/>
-        <p:txBody>
-          <a:bodyPr/>
-          <a:lstStyle/>
-          <a:p>
-            <a:fld id="{B30C84D9-7A41-4FEB-892B-80917372DB87}" type="slidenum">
-              <a:rPr lang="en-US" smtClean="0"/>
-              <a:t>9</a:t>
-            </a:fld>
-            <a:endParaRPr lang="en-US"/>
-          </a:p>
-        </p:txBody>
-      </p:sp>
-      <p:sp>
-        <p:nvSpPr>
-          <p:cNvPr id="9" name="Text Placeholder 8"/>
-          <p:cNvSpPr>
-            <a:spLocks noGrp="1"/>
-          </p:cNvSpPr>
-          <p:nvPr>
-            <p:ph type="body" sz="quarter" idx="13"/>
-          </p:nvPr>
-        </p:nvSpPr>
-        <p:spPr/>
-        <p:txBody>
-          <a:bodyPr/>
-          <a:lstStyle/>
-          <a:p>
-            <a:r>
-              <a:rPr lang="en-US" dirty="0"/>
-              <a:t>Slide by Bohn</a:t>
-            </a:r>
-          </a:p>
-        </p:txBody>
-      </p:sp>
-    </p:spTree>
-    <p:extLst>
-      <p:ext uri="{BB962C8B-B14F-4D97-AF65-F5344CB8AC3E}">
-        <p14:creationId xmlns:p14="http://schemas.microsoft.com/office/powerpoint/2010/main" val="98335725"/>
-      </p:ext>
-    </p:extLst>
-  </p:cSld>
-  <p:clrMapOvr>
-    <a:masterClrMapping/>
-  </p:clrMapOvr>
-  <p:timing>
-    <p:tnLst>
-      <p:par>
-        <p:cTn id="1" dur="indefinite" restart="never" nodeType="tmRoot">
-          <p:childTnLst>
-            <p:seq concurrent="1" nextAc="seek">
-              <p:cTn id="2" dur="indefinite" nodeType="mainSeq">
-                <p:childTnLst>
-                  <p:par>
-                    <p:cTn id="3" fill="hold">
-                      <p:stCondLst>
-                        <p:cond delay="indefinite"/>
-                      </p:stCondLst>
-                      <p:childTnLst>
-                        <p:par>
-                          <p:cTn id="4" fill="hold">
-                            <p:stCondLst>
-                              <p:cond delay="0"/>
-                            </p:stCondLst>
-                            <p:childTnLst>
-                              <p:par>
-                                <p:cTn id="5" presetID="10" presetClass="entr" presetSubtype="0" fill="hold" nodeType="clickEffect">
-                                  <p:stCondLst>
-                                    <p:cond delay="0"/>
-                                  </p:stCondLst>
-                                  <p:childTnLst>
-                                    <p:set>
-                                      <p:cBhvr>
-                                        <p:cTn id="6" dur="1" fill="hold">
-                                          <p:stCondLst>
-                                            <p:cond delay="0"/>
-                                          </p:stCondLst>
-                                        </p:cTn>
-                                        <p:tgtEl>
-                                          <p:spTgt spid="8">
-                                            <p:txEl>
-                                              <p:pRg st="0" end="0"/>
-                                            </p:txEl>
-                                          </p:spTgt>
-                                        </p:tgtEl>
-                                        <p:attrNameLst>
-                                          <p:attrName>style.visibility</p:attrName>
-                                        </p:attrNameLst>
-                                      </p:cBhvr>
-                                      <p:to>
-                                        <p:strVal val="visible"/>
-                                      </p:to>
-                                    </p:set>
-                                    <p:animEffect transition="in" filter="fade">
-                                      <p:cBhvr>
-                                        <p:cTn id="7" dur="500"/>
-                                        <p:tgtEl>
-                                          <p:spTgt spid="8">
-                                            <p:txEl>
-                                              <p:pRg st="0" end="0"/>
-                                            </p:txEl>
-                                          </p:spTgt>
-                                        </p:tgtEl>
-                                      </p:cBhvr>
-                                    </p:animEffect>
-                                  </p:childTnLst>
-                                </p:cTn>
-                              </p:par>
-                            </p:childTnLst>
-                          </p:cTn>
-                        </p:par>
-                      </p:childTnLst>
-                    </p:cTn>
-                  </p:par>
-                </p:childTnLst>
-              </p:cTn>
-              <p:prevCondLst>
-                <p:cond evt="onPrev" delay="0">
-                  <p:tgtEl>
-                    <p:sldTgt/>
-                  </p:tgtEl>
-                </p:cond>
-              </p:prevCondLst>
-              <p:nextCondLst>
-                <p:cond evt="onNext" delay="0">
-                  <p:tgtEl>
-                    <p:sldTgt/>
-                  </p:tgtEl>
-                </p:cond>
-              </p:nextCondLst>
-            </p:seq>
-          </p:childTnLst>
-        </p:cTn>
-      </p:par>
-    </p:tnLst>
   </p:timing>
 </p:sld>
 </file>

</xml_diff>

<commit_message>
Removed COVID slide from chap 1
</commit_message>
<xml_diff>
--- a/chap01.pptx
+++ b/chap01.pptx
@@ -5,27 +5,26 @@
     <p:sldMasterId id="2147483648" r:id="rId1"/>
   </p:sldMasterIdLst>
   <p:notesMasterIdLst>
-    <p:notesMasterId r:id="rId20"/>
+    <p:notesMasterId r:id="rId19"/>
   </p:notesMasterIdLst>
   <p:sldIdLst>
     <p:sldId id="256" r:id="rId2"/>
     <p:sldId id="301" r:id="rId3"/>
     <p:sldId id="303" r:id="rId4"/>
-    <p:sldId id="304" r:id="rId5"/>
-    <p:sldId id="258" r:id="rId6"/>
-    <p:sldId id="259" r:id="rId7"/>
-    <p:sldId id="260" r:id="rId8"/>
-    <p:sldId id="261" r:id="rId9"/>
-    <p:sldId id="262" r:id="rId10"/>
-    <p:sldId id="263" r:id="rId11"/>
-    <p:sldId id="264" r:id="rId12"/>
-    <p:sldId id="266" r:id="rId13"/>
-    <p:sldId id="265" r:id="rId14"/>
-    <p:sldId id="267" r:id="rId15"/>
-    <p:sldId id="268" r:id="rId16"/>
-    <p:sldId id="269" r:id="rId17"/>
-    <p:sldId id="271" r:id="rId18"/>
-    <p:sldId id="302" r:id="rId19"/>
+    <p:sldId id="258" r:id="rId5"/>
+    <p:sldId id="259" r:id="rId6"/>
+    <p:sldId id="260" r:id="rId7"/>
+    <p:sldId id="261" r:id="rId8"/>
+    <p:sldId id="262" r:id="rId9"/>
+    <p:sldId id="263" r:id="rId10"/>
+    <p:sldId id="264" r:id="rId11"/>
+    <p:sldId id="266" r:id="rId12"/>
+    <p:sldId id="265" r:id="rId13"/>
+    <p:sldId id="267" r:id="rId14"/>
+    <p:sldId id="268" r:id="rId15"/>
+    <p:sldId id="269" r:id="rId16"/>
+    <p:sldId id="271" r:id="rId17"/>
+    <p:sldId id="302" r:id="rId18"/>
   </p:sldIdLst>
   <p:sldSz cx="12192000" cy="6858000"/>
   <p:notesSz cx="6858000" cy="9144000"/>
@@ -214,7 +213,7 @@
           <a:p>
             <a:fld id="{F22450E9-715D-42D8-9747-C0402EEB663B}" type="datetimeFigureOut">
               <a:rPr lang="en-US" smtClean="0"/>
-              <a:t>8/23/21</a:t>
+              <a:t>8/23/22</a:t>
             </a:fld>
             <a:endParaRPr lang="en-US"/>
           </a:p>
@@ -549,7 +548,7 @@
           <a:p>
             <a:fld id="{B451C161-4068-4B77-B93E-241C90510927}" type="slidenum">
               <a:rPr lang="en-US" smtClean="0"/>
-              <a:t>17</a:t>
+              <a:t>16</a:t>
             </a:fld>
             <a:endParaRPr lang="en-US"/>
           </a:p>
@@ -819,7 +818,7 @@
           <a:p>
             <a:fld id="{085D2B30-53B0-FF44-AD2E-D4C00B5F0D07}" type="datetime1">
               <a:rPr lang="en-US" smtClean="0"/>
-              <a:t>8/23/21</a:t>
+              <a:t>8/23/22</a:t>
             </a:fld>
             <a:endParaRPr lang="en-US"/>
           </a:p>
@@ -991,7 +990,7 @@
           <a:p>
             <a:fld id="{D9BC79DF-1E81-8E43-818F-0368D173919E}" type="datetime1">
               <a:rPr lang="en-US" smtClean="0"/>
-              <a:t>8/23/21</a:t>
+              <a:t>8/23/22</a:t>
             </a:fld>
             <a:endParaRPr lang="en-US"/>
           </a:p>
@@ -1255,7 +1254,7 @@
           <a:p>
             <a:fld id="{26F2BF60-4963-D247-82AD-5F0039621502}" type="datetime1">
               <a:rPr lang="en-US" smtClean="0"/>
-              <a:t>8/23/21</a:t>
+              <a:t>8/23/22</a:t>
             </a:fld>
             <a:endParaRPr lang="en-US"/>
           </a:p>
@@ -1652,7 +1651,7 @@
           <a:p>
             <a:fld id="{892056E5-B551-3347-86B6-60A1CDFCD73F}" type="datetime1">
               <a:rPr lang="en-US" smtClean="0"/>
-              <a:t>8/23/21</a:t>
+              <a:t>8/23/22</a:t>
             </a:fld>
             <a:endParaRPr lang="en-US"/>
           </a:p>
@@ -2071,7 +2070,7 @@
           <a:p>
             <a:fld id="{0EB98D53-3742-E34B-BFE8-2899DEF3906D}" type="datetime1">
               <a:rPr lang="en-US" smtClean="0"/>
-              <a:t>8/23/21</a:t>
+              <a:t>8/23/22</a:t>
             </a:fld>
             <a:endParaRPr lang="en-US"/>
           </a:p>
@@ -2243,7 +2242,7 @@
           <a:p>
             <a:fld id="{D7741631-EBCE-024F-9D78-CF06A260D182}" type="datetime1">
               <a:rPr lang="en-US" smtClean="0"/>
-              <a:t>8/23/21</a:t>
+              <a:t>8/23/22</a:t>
             </a:fld>
             <a:endParaRPr lang="en-US"/>
           </a:p>
@@ -2393,7 +2392,7 @@
           <a:p>
             <a:fld id="{27BB9E86-5687-1A40-8327-458B60AB9A4C}" type="datetime1">
               <a:rPr lang="en-US" smtClean="0"/>
-              <a:t>8/23/21</a:t>
+              <a:t>8/23/22</a:t>
             </a:fld>
             <a:endParaRPr lang="en-US"/>
           </a:p>
@@ -2723,7 +2722,7 @@
           <a:p>
             <a:fld id="{035049FA-2FE8-F14F-A250-6231AACB4152}" type="datetime1">
               <a:rPr lang="en-US" smtClean="0"/>
-              <a:t>8/23/21</a:t>
+              <a:t>8/23/22</a:t>
             </a:fld>
             <a:endParaRPr lang="en-US"/>
           </a:p>
@@ -3030,7 +3029,7 @@
           <a:p>
             <a:fld id="{CABEF1DE-0106-6945-9FDC-9F265DADF1B8}" type="datetime1">
               <a:rPr lang="en-US" smtClean="0"/>
-              <a:t>8/23/21</a:t>
+              <a:t>8/23/22</a:t>
             </a:fld>
             <a:endParaRPr lang="en-US"/>
           </a:p>
@@ -3485,7 +3484,7 @@
           <a:p>
             <a:fld id="{490BEB36-C871-9444-8A7B-5727C7452DEF}" type="datetime1">
               <a:rPr lang="en-US" smtClean="0"/>
-              <a:t>8/23/21</a:t>
+              <a:t>8/23/22</a:t>
             </a:fld>
             <a:endParaRPr lang="en-US"/>
           </a:p>
@@ -4068,571 +4067,6 @@
           </a:p>
           <a:p>
             <a:r>
-              <a:rPr lang="en-US" dirty="0"/>
-              <a:t>Assembly language</a:t>
-            </a:r>
-          </a:p>
-        </p:txBody>
-      </p:sp>
-      <p:sp>
-        <p:nvSpPr>
-          <p:cNvPr id="8" name="Content Placeholder 7"/>
-          <p:cNvSpPr>
-            <a:spLocks noGrp="1"/>
-          </p:cNvSpPr>
-          <p:nvPr>
-            <p:ph sz="half" idx="2"/>
-          </p:nvPr>
-        </p:nvSpPr>
-        <p:spPr/>
-        <p:txBody>
-          <a:bodyPr>
-            <a:normAutofit/>
-          </a:bodyPr>
-          <a:lstStyle/>
-          <a:p>
-            <a:r>
-              <a:rPr lang="en-US" dirty="0"/>
-              <a:t>ALGOL, BASIC, COBOL, FORTRAN, Pascal, and PL/I</a:t>
-            </a:r>
-            <a:br>
-              <a:rPr lang="en-US" dirty="0"/>
-            </a:br>
-            <a:r>
-              <a:rPr lang="en-US" dirty="0"/>
-              <a:t>count 1,2,3…</a:t>
-            </a:r>
-            <a:br>
-              <a:rPr lang="en-US" dirty="0"/>
-            </a:br>
-            <a:r>
-              <a:rPr lang="en-US" sz="2000" dirty="0"/>
-              <a:t>(or allow arbitrary array ranges)</a:t>
-            </a:r>
-            <a:endParaRPr lang="en-US" dirty="0"/>
-          </a:p>
-          <a:p>
-            <a:r>
-              <a:rPr lang="en-US" dirty="0"/>
-              <a:t>Why does C count 0,1,2…?</a:t>
-            </a:r>
-          </a:p>
-          <a:p>
-            <a:r>
-              <a:rPr lang="en-US" dirty="0"/>
-              <a:t>Why do C strings end in </a:t>
-            </a:r>
-            <a:r>
-              <a:rPr lang="en-US" b="1" dirty="0"/>
-              <a:t>\0</a:t>
-            </a:r>
-            <a:r>
-              <a:rPr lang="en-US" dirty="0"/>
-              <a:t> ?</a:t>
-            </a:r>
-          </a:p>
-          <a:p>
-            <a:r>
-              <a:rPr lang="en-US" dirty="0"/>
-              <a:t>Why does C have an increment operator (</a:t>
-            </a:r>
-            <a:r>
-              <a:rPr lang="en-US" b="1" dirty="0" err="1"/>
-              <a:t>i</a:t>
-            </a:r>
-            <a:r>
-              <a:rPr lang="en-US" b="1" dirty="0"/>
-              <a:t>++</a:t>
-            </a:r>
-            <a:r>
-              <a:rPr lang="en-US" dirty="0"/>
-              <a:t>)?</a:t>
-            </a:r>
-          </a:p>
-          <a:p>
-            <a:r>
-              <a:rPr lang="en-US" dirty="0"/>
-              <a:t>Why does C have the ternary operator? (</a:t>
-            </a:r>
-            <a:r>
-              <a:rPr lang="en-US" b="1" dirty="0"/>
-              <a:t>x = x&lt;y ? x : y</a:t>
-            </a:r>
-            <a:r>
-              <a:rPr lang="en-US" dirty="0"/>
-              <a:t>)</a:t>
-            </a:r>
-          </a:p>
-        </p:txBody>
-      </p:sp>
-      <p:sp>
-        <p:nvSpPr>
-          <p:cNvPr id="4" name="Footer Placeholder 3"/>
-          <p:cNvSpPr>
-            <a:spLocks noGrp="1"/>
-          </p:cNvSpPr>
-          <p:nvPr>
-            <p:ph type="ftr" sz="quarter" idx="11"/>
-          </p:nvPr>
-        </p:nvSpPr>
-        <p:spPr/>
-        <p:txBody>
-          <a:bodyPr/>
-          <a:lstStyle/>
-          <a:p>
-            <a:r>
-              <a:rPr lang="en-US"/>
-              <a:t>Programming at the Hardware/Software Interface</a:t>
-            </a:r>
-            <a:endParaRPr lang="en-US" dirty="0"/>
-          </a:p>
-        </p:txBody>
-      </p:sp>
-      <p:sp>
-        <p:nvSpPr>
-          <p:cNvPr id="5" name="Slide Number Placeholder 4"/>
-          <p:cNvSpPr>
-            <a:spLocks noGrp="1"/>
-          </p:cNvSpPr>
-          <p:nvPr>
-            <p:ph type="sldNum" sz="quarter" idx="12"/>
-          </p:nvPr>
-        </p:nvSpPr>
-        <p:spPr/>
-        <p:txBody>
-          <a:bodyPr/>
-          <a:lstStyle/>
-          <a:p>
-            <a:fld id="{B30C84D9-7A41-4FEB-892B-80917372DB87}" type="slidenum">
-              <a:rPr lang="en-US" smtClean="0"/>
-              <a:t>10</a:t>
-            </a:fld>
-            <a:endParaRPr lang="en-US"/>
-          </a:p>
-        </p:txBody>
-      </p:sp>
-      <p:sp>
-        <p:nvSpPr>
-          <p:cNvPr id="9" name="Text Placeholder 8"/>
-          <p:cNvSpPr>
-            <a:spLocks noGrp="1"/>
-          </p:cNvSpPr>
-          <p:nvPr>
-            <p:ph type="body" sz="quarter" idx="13"/>
-          </p:nvPr>
-        </p:nvSpPr>
-        <p:spPr/>
-        <p:txBody>
-          <a:bodyPr/>
-          <a:lstStyle/>
-          <a:p>
-            <a:r>
-              <a:rPr lang="en-US" dirty="0"/>
-              <a:t>Slide by Bohn</a:t>
-            </a:r>
-          </a:p>
-        </p:txBody>
-      </p:sp>
-    </p:spTree>
-    <p:extLst>
-      <p:ext uri="{BB962C8B-B14F-4D97-AF65-F5344CB8AC3E}">
-        <p14:creationId xmlns:p14="http://schemas.microsoft.com/office/powerpoint/2010/main" val="1737821417"/>
-      </p:ext>
-    </p:extLst>
-  </p:cSld>
-  <p:clrMapOvr>
-    <a:masterClrMapping/>
-  </p:clrMapOvr>
-  <p:timing>
-    <p:tnLst>
-      <p:par>
-        <p:cTn id="1" dur="indefinite" restart="never" nodeType="tmRoot">
-          <p:childTnLst>
-            <p:seq concurrent="1" nextAc="seek">
-              <p:cTn id="2" dur="indefinite" nodeType="mainSeq">
-                <p:childTnLst>
-                  <p:par>
-                    <p:cTn id="3" fill="hold">
-                      <p:stCondLst>
-                        <p:cond delay="indefinite"/>
-                      </p:stCondLst>
-                      <p:childTnLst>
-                        <p:par>
-                          <p:cTn id="4" fill="hold">
-                            <p:stCondLst>
-                              <p:cond delay="0"/>
-                            </p:stCondLst>
-                            <p:childTnLst>
-                              <p:par>
-                                <p:cTn id="5" presetID="10" presetClass="entr" presetSubtype="0" fill="hold" grpId="0" nodeType="clickEffect">
-                                  <p:stCondLst>
-                                    <p:cond delay="0"/>
-                                  </p:stCondLst>
-                                  <p:childTnLst>
-                                    <p:set>
-                                      <p:cBhvr>
-                                        <p:cTn id="6" dur="1" fill="hold">
-                                          <p:stCondLst>
-                                            <p:cond delay="0"/>
-                                          </p:stCondLst>
-                                        </p:cTn>
-                                        <p:tgtEl>
-                                          <p:spTgt spid="8">
-                                            <p:txEl>
-                                              <p:pRg st="0" end="0"/>
-                                            </p:txEl>
-                                          </p:spTgt>
-                                        </p:tgtEl>
-                                        <p:attrNameLst>
-                                          <p:attrName>style.visibility</p:attrName>
-                                        </p:attrNameLst>
-                                      </p:cBhvr>
-                                      <p:to>
-                                        <p:strVal val="visible"/>
-                                      </p:to>
-                                    </p:set>
-                                    <p:animEffect transition="in" filter="fade">
-                                      <p:cBhvr>
-                                        <p:cTn id="7" dur="500"/>
-                                        <p:tgtEl>
-                                          <p:spTgt spid="8">
-                                            <p:txEl>
-                                              <p:pRg st="0" end="0"/>
-                                            </p:txEl>
-                                          </p:spTgt>
-                                        </p:tgtEl>
-                                      </p:cBhvr>
-                                    </p:animEffect>
-                                  </p:childTnLst>
-                                </p:cTn>
-                              </p:par>
-                              <p:par>
-                                <p:cTn id="8" presetID="10" presetClass="entr" presetSubtype="0" fill="hold" grpId="0" nodeType="withEffect">
-                                  <p:stCondLst>
-                                    <p:cond delay="0"/>
-                                  </p:stCondLst>
-                                  <p:childTnLst>
-                                    <p:set>
-                                      <p:cBhvr>
-                                        <p:cTn id="9" dur="1" fill="hold">
-                                          <p:stCondLst>
-                                            <p:cond delay="0"/>
-                                          </p:stCondLst>
-                                        </p:cTn>
-                                        <p:tgtEl>
-                                          <p:spTgt spid="8">
-                                            <p:txEl>
-                                              <p:pRg st="1" end="1"/>
-                                            </p:txEl>
-                                          </p:spTgt>
-                                        </p:tgtEl>
-                                        <p:attrNameLst>
-                                          <p:attrName>style.visibility</p:attrName>
-                                        </p:attrNameLst>
-                                      </p:cBhvr>
-                                      <p:to>
-                                        <p:strVal val="visible"/>
-                                      </p:to>
-                                    </p:set>
-                                    <p:animEffect transition="in" filter="fade">
-                                      <p:cBhvr>
-                                        <p:cTn id="10" dur="500"/>
-                                        <p:tgtEl>
-                                          <p:spTgt spid="8">
-                                            <p:txEl>
-                                              <p:pRg st="1" end="1"/>
-                                            </p:txEl>
-                                          </p:spTgt>
-                                        </p:tgtEl>
-                                      </p:cBhvr>
-                                    </p:animEffect>
-                                  </p:childTnLst>
-                                </p:cTn>
-                              </p:par>
-                            </p:childTnLst>
-                          </p:cTn>
-                        </p:par>
-                      </p:childTnLst>
-                    </p:cTn>
-                  </p:par>
-                  <p:par>
-                    <p:cTn id="11" fill="hold">
-                      <p:stCondLst>
-                        <p:cond delay="indefinite"/>
-                      </p:stCondLst>
-                      <p:childTnLst>
-                        <p:par>
-                          <p:cTn id="12" fill="hold">
-                            <p:stCondLst>
-                              <p:cond delay="0"/>
-                            </p:stCondLst>
-                            <p:childTnLst>
-                              <p:par>
-                                <p:cTn id="13" presetID="10" presetClass="entr" presetSubtype="0" fill="hold" grpId="0" nodeType="clickEffect">
-                                  <p:stCondLst>
-                                    <p:cond delay="0"/>
-                                  </p:stCondLst>
-                                  <p:childTnLst>
-                                    <p:set>
-                                      <p:cBhvr>
-                                        <p:cTn id="14" dur="1" fill="hold">
-                                          <p:stCondLst>
-                                            <p:cond delay="0"/>
-                                          </p:stCondLst>
-                                        </p:cTn>
-                                        <p:tgtEl>
-                                          <p:spTgt spid="8">
-                                            <p:txEl>
-                                              <p:pRg st="2" end="2"/>
-                                            </p:txEl>
-                                          </p:spTgt>
-                                        </p:tgtEl>
-                                        <p:attrNameLst>
-                                          <p:attrName>style.visibility</p:attrName>
-                                        </p:attrNameLst>
-                                      </p:cBhvr>
-                                      <p:to>
-                                        <p:strVal val="visible"/>
-                                      </p:to>
-                                    </p:set>
-                                    <p:animEffect transition="in" filter="fade">
-                                      <p:cBhvr>
-                                        <p:cTn id="15" dur="500"/>
-                                        <p:tgtEl>
-                                          <p:spTgt spid="8">
-                                            <p:txEl>
-                                              <p:pRg st="2" end="2"/>
-                                            </p:txEl>
-                                          </p:spTgt>
-                                        </p:tgtEl>
-                                      </p:cBhvr>
-                                    </p:animEffect>
-                                  </p:childTnLst>
-                                </p:cTn>
-                              </p:par>
-                            </p:childTnLst>
-                          </p:cTn>
-                        </p:par>
-                      </p:childTnLst>
-                    </p:cTn>
-                  </p:par>
-                  <p:par>
-                    <p:cTn id="16" fill="hold">
-                      <p:stCondLst>
-                        <p:cond delay="indefinite"/>
-                      </p:stCondLst>
-                      <p:childTnLst>
-                        <p:par>
-                          <p:cTn id="17" fill="hold">
-                            <p:stCondLst>
-                              <p:cond delay="0"/>
-                            </p:stCondLst>
-                            <p:childTnLst>
-                              <p:par>
-                                <p:cTn id="18" presetID="10" presetClass="entr" presetSubtype="0" fill="hold" grpId="0" nodeType="clickEffect">
-                                  <p:stCondLst>
-                                    <p:cond delay="0"/>
-                                  </p:stCondLst>
-                                  <p:childTnLst>
-                                    <p:set>
-                                      <p:cBhvr>
-                                        <p:cTn id="19" dur="1" fill="hold">
-                                          <p:stCondLst>
-                                            <p:cond delay="0"/>
-                                          </p:stCondLst>
-                                        </p:cTn>
-                                        <p:tgtEl>
-                                          <p:spTgt spid="8">
-                                            <p:txEl>
-                                              <p:pRg st="3" end="3"/>
-                                            </p:txEl>
-                                          </p:spTgt>
-                                        </p:tgtEl>
-                                        <p:attrNameLst>
-                                          <p:attrName>style.visibility</p:attrName>
-                                        </p:attrNameLst>
-                                      </p:cBhvr>
-                                      <p:to>
-                                        <p:strVal val="visible"/>
-                                      </p:to>
-                                    </p:set>
-                                    <p:animEffect transition="in" filter="fade">
-                                      <p:cBhvr>
-                                        <p:cTn id="20" dur="500"/>
-                                        <p:tgtEl>
-                                          <p:spTgt spid="8">
-                                            <p:txEl>
-                                              <p:pRg st="3" end="3"/>
-                                            </p:txEl>
-                                          </p:spTgt>
-                                        </p:tgtEl>
-                                      </p:cBhvr>
-                                    </p:animEffect>
-                                  </p:childTnLst>
-                                </p:cTn>
-                              </p:par>
-                            </p:childTnLst>
-                          </p:cTn>
-                        </p:par>
-                      </p:childTnLst>
-                    </p:cTn>
-                  </p:par>
-                  <p:par>
-                    <p:cTn id="21" fill="hold">
-                      <p:stCondLst>
-                        <p:cond delay="indefinite"/>
-                      </p:stCondLst>
-                      <p:childTnLst>
-                        <p:par>
-                          <p:cTn id="22" fill="hold">
-                            <p:stCondLst>
-                              <p:cond delay="0"/>
-                            </p:stCondLst>
-                            <p:childTnLst>
-                              <p:par>
-                                <p:cTn id="23" presetID="10" presetClass="entr" presetSubtype="0" fill="hold" grpId="0" nodeType="clickEffect">
-                                  <p:stCondLst>
-                                    <p:cond delay="0"/>
-                                  </p:stCondLst>
-                                  <p:childTnLst>
-                                    <p:set>
-                                      <p:cBhvr>
-                                        <p:cTn id="24" dur="1" fill="hold">
-                                          <p:stCondLst>
-                                            <p:cond delay="0"/>
-                                          </p:stCondLst>
-                                        </p:cTn>
-                                        <p:tgtEl>
-                                          <p:spTgt spid="8">
-                                            <p:txEl>
-                                              <p:pRg st="4" end="4"/>
-                                            </p:txEl>
-                                          </p:spTgt>
-                                        </p:tgtEl>
-                                        <p:attrNameLst>
-                                          <p:attrName>style.visibility</p:attrName>
-                                        </p:attrNameLst>
-                                      </p:cBhvr>
-                                      <p:to>
-                                        <p:strVal val="visible"/>
-                                      </p:to>
-                                    </p:set>
-                                    <p:animEffect transition="in" filter="fade">
-                                      <p:cBhvr>
-                                        <p:cTn id="25" dur="500"/>
-                                        <p:tgtEl>
-                                          <p:spTgt spid="8">
-                                            <p:txEl>
-                                              <p:pRg st="4" end="4"/>
-                                            </p:txEl>
-                                          </p:spTgt>
-                                        </p:tgtEl>
-                                      </p:cBhvr>
-                                    </p:animEffect>
-                                  </p:childTnLst>
-                                </p:cTn>
-                              </p:par>
-                            </p:childTnLst>
-                          </p:cTn>
-                        </p:par>
-                      </p:childTnLst>
-                    </p:cTn>
-                  </p:par>
-                </p:childTnLst>
-              </p:cTn>
-              <p:prevCondLst>
-                <p:cond evt="onPrev" delay="0">
-                  <p:tgtEl>
-                    <p:sldTgt/>
-                  </p:tgtEl>
-                </p:cond>
-              </p:prevCondLst>
-              <p:nextCondLst>
-                <p:cond evt="onNext" delay="0">
-                  <p:tgtEl>
-                    <p:sldTgt/>
-                  </p:tgtEl>
-                </p:cond>
-              </p:nextCondLst>
-            </p:seq>
-          </p:childTnLst>
-        </p:cTn>
-      </p:par>
-    </p:tnLst>
-    <p:bldLst>
-      <p:bldP spid="8" grpId="0" build="p"/>
-    </p:bldLst>
-  </p:timing>
-</p:sld>
-</file>
-
-<file path=ppt/slides/slide11.xml><?xml version="1.0" encoding="utf-8"?>
-<p:sld xmlns:a="http://schemas.openxmlformats.org/drawingml/2006/main" xmlns:r="http://schemas.openxmlformats.org/officeDocument/2006/relationships" xmlns:p="http://schemas.openxmlformats.org/presentationml/2006/main">
-  <p:cSld>
-    <p:spTree>
-      <p:nvGrpSpPr>
-        <p:cNvPr id="1" name=""/>
-        <p:cNvGrpSpPr/>
-        <p:nvPr/>
-      </p:nvGrpSpPr>
-      <p:grpSpPr>
-        <a:xfrm>
-          <a:off x="0" y="0"/>
-          <a:ext cx="0" cy="0"/>
-          <a:chOff x="0" y="0"/>
-          <a:chExt cx="0" cy="0"/>
-        </a:xfrm>
-      </p:grpSpPr>
-      <p:sp>
-        <p:nvSpPr>
-          <p:cNvPr id="2" name="Title 1"/>
-          <p:cNvSpPr>
-            <a:spLocks noGrp="1"/>
-          </p:cNvSpPr>
-          <p:nvPr>
-            <p:ph type="title"/>
-          </p:nvPr>
-        </p:nvSpPr>
-        <p:spPr/>
-        <p:txBody>
-          <a:bodyPr/>
-          <a:lstStyle/>
-          <a:p>
-            <a:r>
-              <a:rPr lang="en-US" dirty="0"/>
-              <a:t>Planned lessons</a:t>
-            </a:r>
-          </a:p>
-        </p:txBody>
-      </p:sp>
-      <p:sp>
-        <p:nvSpPr>
-          <p:cNvPr id="7" name="Content Placeholder 6"/>
-          <p:cNvSpPr>
-            <a:spLocks noGrp="1"/>
-          </p:cNvSpPr>
-          <p:nvPr>
-            <p:ph sz="half" idx="1"/>
-          </p:nvPr>
-        </p:nvSpPr>
-        <p:spPr/>
-        <p:txBody>
-          <a:bodyPr/>
-          <a:lstStyle/>
-          <a:p>
-            <a:r>
-              <a:rPr lang="en-US" dirty="0">
-                <a:solidFill>
-                  <a:schemeClr val="bg1">
-                    <a:lumMod val="65000"/>
-                  </a:schemeClr>
-                </a:solidFill>
-              </a:rPr>
-              <a:t>Data representation &amp; arithmetic</a:t>
-            </a:r>
-          </a:p>
-          <a:p>
-            <a:r>
               <a:rPr lang="en-US" dirty="0">
                 <a:solidFill>
                   <a:schemeClr val="bg1">
@@ -4727,7 +4161,7 @@
           <a:p>
             <a:fld id="{B30C84D9-7A41-4FEB-892B-80917372DB87}" type="slidenum">
               <a:rPr lang="en-US" smtClean="0"/>
-              <a:t>11</a:t>
+              <a:t>10</a:t>
             </a:fld>
             <a:endParaRPr lang="en-US"/>
           </a:p>
@@ -4859,7 +4293,7 @@
 </p:sld>
 </file>
 
-<file path=ppt/slides/slide12.xml><?xml version="1.0" encoding="utf-8"?>
+<file path=ppt/slides/slide11.xml><?xml version="1.0" encoding="utf-8"?>
 <p:sld xmlns:a="http://schemas.openxmlformats.org/drawingml/2006/main" xmlns:r="http://schemas.openxmlformats.org/officeDocument/2006/relationships" xmlns:p="http://schemas.openxmlformats.org/presentationml/2006/main">
   <p:cSld>
     <p:spTree>
@@ -5028,7 +4462,7 @@
           <a:p>
             <a:fld id="{B30C84D9-7A41-4FEB-892B-80917372DB87}" type="slidenum">
               <a:rPr lang="en-US" smtClean="0"/>
-              <a:t>12</a:t>
+              <a:t>11</a:t>
             </a:fld>
             <a:endParaRPr lang="en-US"/>
           </a:p>
@@ -5668,7 +5102,7 @@
 </p:sld>
 </file>
 
-<file path=ppt/slides/slide13.xml><?xml version="1.0" encoding="utf-8"?>
+<file path=ppt/slides/slide12.xml><?xml version="1.0" encoding="utf-8"?>
 <p:sld xmlns:a="http://schemas.openxmlformats.org/drawingml/2006/main" xmlns:r="http://schemas.openxmlformats.org/officeDocument/2006/relationships" xmlns:p="http://schemas.openxmlformats.org/presentationml/2006/main">
   <p:cSld>
     <p:spTree>
@@ -5877,7 +5311,7 @@
           <a:p>
             <a:fld id="{B30C84D9-7A41-4FEB-892B-80917372DB87}" type="slidenum">
               <a:rPr lang="en-US" smtClean="0"/>
-              <a:t>13</a:t>
+              <a:t>12</a:t>
             </a:fld>
             <a:endParaRPr lang="en-US"/>
           </a:p>
@@ -6159,7 +5593,7 @@
 </p:sld>
 </file>
 
-<file path=ppt/slides/slide14.xml><?xml version="1.0" encoding="utf-8"?>
+<file path=ppt/slides/slide13.xml><?xml version="1.0" encoding="utf-8"?>
 <p:sld xmlns:a="http://schemas.openxmlformats.org/drawingml/2006/main" xmlns:r="http://schemas.openxmlformats.org/officeDocument/2006/relationships" xmlns:p="http://schemas.openxmlformats.org/presentationml/2006/main">
   <p:cSld>
     <p:spTree>
@@ -6377,7 +5811,7 @@
           <a:p>
             <a:fld id="{B30C84D9-7A41-4FEB-892B-80917372DB87}" type="slidenum">
               <a:rPr lang="en-US" smtClean="0"/>
-              <a:t>14</a:t>
+              <a:t>13</a:t>
             </a:fld>
             <a:endParaRPr lang="en-US"/>
           </a:p>
@@ -6727,7 +6161,7 @@
 </p:sld>
 </file>
 
-<file path=ppt/slides/slide15.xml><?xml version="1.0" encoding="utf-8"?>
+<file path=ppt/slides/slide14.xml><?xml version="1.0" encoding="utf-8"?>
 <p:sld xmlns:a="http://schemas.openxmlformats.org/drawingml/2006/main" xmlns:r="http://schemas.openxmlformats.org/officeDocument/2006/relationships" xmlns:p="http://schemas.openxmlformats.org/presentationml/2006/main">
   <p:cSld>
     <p:spTree>
@@ -7369,7 +6803,7 @@
           <a:p>
             <a:fld id="{B30C84D9-7A41-4FEB-892B-80917372DB87}" type="slidenum">
               <a:rPr lang="en-US" smtClean="0"/>
-              <a:t>15</a:t>
+              <a:t>14</a:t>
             </a:fld>
             <a:endParaRPr lang="en-US"/>
           </a:p>
@@ -7934,7 +7368,7 @@
 </p:sld>
 </file>
 
-<file path=ppt/slides/slide16.xml><?xml version="1.0" encoding="utf-8"?>
+<file path=ppt/slides/slide15.xml><?xml version="1.0" encoding="utf-8"?>
 <p:sld xmlns:a="http://schemas.openxmlformats.org/drawingml/2006/main" xmlns:r="http://schemas.openxmlformats.org/officeDocument/2006/relationships" xmlns:p="http://schemas.openxmlformats.org/presentationml/2006/main">
   <p:cSld>
     <p:spTree>
@@ -8176,7 +7610,7 @@
           <a:p>
             <a:fld id="{B30C84D9-7A41-4FEB-892B-80917372DB87}" type="slidenum">
               <a:rPr lang="en-US" smtClean="0"/>
-              <a:t>16</a:t>
+              <a:t>15</a:t>
             </a:fld>
             <a:endParaRPr lang="en-US"/>
           </a:p>
@@ -8415,6 +7849,238 @@
 </p:sld>
 </file>
 
+<file path=ppt/slides/slide16.xml><?xml version="1.0" encoding="utf-8"?>
+<p:sld xmlns:a="http://schemas.openxmlformats.org/drawingml/2006/main" xmlns:r="http://schemas.openxmlformats.org/officeDocument/2006/relationships" xmlns:p="http://schemas.openxmlformats.org/presentationml/2006/main">
+  <p:cSld>
+    <p:spTree>
+      <p:nvGrpSpPr>
+        <p:cNvPr id="1" name=""/>
+        <p:cNvGrpSpPr/>
+        <p:nvPr/>
+      </p:nvGrpSpPr>
+      <p:grpSpPr>
+        <a:xfrm>
+          <a:off x="0" y="0"/>
+          <a:ext cx="0" cy="0"/>
+          <a:chOff x="0" y="0"/>
+          <a:chExt cx="0" cy="0"/>
+        </a:xfrm>
+      </p:grpSpPr>
+      <p:sp>
+        <p:nvSpPr>
+          <p:cNvPr id="32771" name="Rectangle 3"/>
+          <p:cNvSpPr>
+            <a:spLocks noGrp="1" noChangeArrowheads="1"/>
+          </p:cNvSpPr>
+          <p:nvPr>
+            <p:ph type="title"/>
+          </p:nvPr>
+        </p:nvSpPr>
+        <p:spPr>
+          <a:ln/>
+        </p:spPr>
+        <p:txBody>
+          <a:bodyPr/>
+          <a:lstStyle/>
+          <a:p>
+            <a:pPr marL="119063" indent="-119063"/>
+            <a:r>
+              <a:rPr lang="en-US"/>
+              <a:t>Course Components</a:t>
+            </a:r>
+          </a:p>
+        </p:txBody>
+      </p:sp>
+      <p:sp>
+        <p:nvSpPr>
+          <p:cNvPr id="32772" name="Rectangle 4"/>
+          <p:cNvSpPr>
+            <a:spLocks noGrp="1" noChangeArrowheads="1"/>
+          </p:cNvSpPr>
+          <p:nvPr>
+            <p:ph idx="1"/>
+          </p:nvPr>
+        </p:nvSpPr>
+        <p:spPr>
+          <a:ln/>
+        </p:spPr>
+        <p:txBody>
+          <a:bodyPr>
+            <a:normAutofit fontScale="92500" lnSpcReduction="10000"/>
+          </a:bodyPr>
+          <a:lstStyle/>
+          <a:p>
+            <a:r>
+              <a:rPr lang="en-US" dirty="0"/>
+              <a:t>Lectures</a:t>
+            </a:r>
+          </a:p>
+          <a:p>
+            <a:pPr marL="552450" lvl="1"/>
+            <a:r>
+              <a:rPr lang="en-US" dirty="0"/>
+              <a:t>Higher level concepts</a:t>
+            </a:r>
+          </a:p>
+          <a:p>
+            <a:r>
+              <a:rPr lang="en-US" dirty="0"/>
+              <a:t>Recitations</a:t>
+            </a:r>
+          </a:p>
+          <a:p>
+            <a:pPr marL="552450" lvl="1"/>
+            <a:r>
+              <a:rPr lang="en-US" dirty="0"/>
+              <a:t>Applied concepts, important tools and skills for labs, clarification of lectures, exam coverage</a:t>
+            </a:r>
+          </a:p>
+          <a:p>
+            <a:r>
+              <a:rPr lang="en-US" dirty="0"/>
+              <a:t>Labs</a:t>
+            </a:r>
+          </a:p>
+          <a:p>
+            <a:pPr marL="552450" lvl="1"/>
+            <a:r>
+              <a:rPr lang="en-US" dirty="0"/>
+              <a:t>The heart of the course</a:t>
+            </a:r>
+          </a:p>
+          <a:p>
+            <a:pPr marL="552450" lvl="1"/>
+            <a:r>
+              <a:rPr lang="en-US" dirty="0"/>
+              <a:t>1-2 weeks each</a:t>
+            </a:r>
+          </a:p>
+          <a:p>
+            <a:pPr marL="552450" lvl="1"/>
+            <a:r>
+              <a:rPr lang="en-US" dirty="0"/>
+              <a:t>Provide in-depth understanding of an aspect of systems programming and debugging</a:t>
+            </a:r>
+          </a:p>
+          <a:p>
+            <a:r>
+              <a:rPr lang="en-US" dirty="0"/>
+              <a:t>Homework and Exams</a:t>
+            </a:r>
+          </a:p>
+          <a:p>
+            <a:pPr marL="552450" lvl="1"/>
+            <a:r>
+              <a:rPr lang="en-US" dirty="0"/>
+              <a:t>Test your understanding of concepts &amp; key principles</a:t>
+            </a:r>
+          </a:p>
+          <a:p>
+            <a:pPr marL="952500" lvl="2"/>
+            <a:r>
+              <a:rPr lang="en-US" dirty="0"/>
+              <a:t>Two midterms and one final</a:t>
+            </a:r>
+          </a:p>
+          <a:p>
+            <a:pPr marL="552450" lvl="1"/>
+            <a:endParaRPr lang="en-US" dirty="0"/>
+          </a:p>
+        </p:txBody>
+      </p:sp>
+      <p:sp>
+        <p:nvSpPr>
+          <p:cNvPr id="2" name="Text Placeholder 1"/>
+          <p:cNvSpPr>
+            <a:spLocks noGrp="1"/>
+          </p:cNvSpPr>
+          <p:nvPr>
+            <p:ph type="body" sz="quarter" idx="13"/>
+          </p:nvPr>
+        </p:nvSpPr>
+        <p:spPr/>
+        <p:txBody>
+          <a:bodyPr/>
+          <a:lstStyle/>
+          <a:p>
+            <a:r>
+              <a:rPr lang="en-US" dirty="0"/>
+              <a:t>Slide by Bohn</a:t>
+            </a:r>
+          </a:p>
+        </p:txBody>
+      </p:sp>
+      <p:sp>
+        <p:nvSpPr>
+          <p:cNvPr id="3" name="Footer Placeholder 2">
+            <a:extLst>
+              <a:ext uri="{FF2B5EF4-FFF2-40B4-BE49-F238E27FC236}">
+                <a16:creationId xmlns:a16="http://schemas.microsoft.com/office/drawing/2014/main" id="{E4207D7D-6FAA-AF43-A6FD-1F43A468A142}"/>
+              </a:ext>
+            </a:extLst>
+          </p:cNvPr>
+          <p:cNvSpPr>
+            <a:spLocks noGrp="1"/>
+          </p:cNvSpPr>
+          <p:nvPr>
+            <p:ph type="ftr" sz="quarter" idx="11"/>
+          </p:nvPr>
+        </p:nvSpPr>
+        <p:spPr/>
+        <p:txBody>
+          <a:bodyPr/>
+          <a:lstStyle/>
+          <a:p>
+            <a:r>
+              <a:rPr lang="en-US"/>
+              <a:t>Programming at the Hardware/Software Interface</a:t>
+            </a:r>
+            <a:endParaRPr lang="en-US" dirty="0"/>
+          </a:p>
+        </p:txBody>
+      </p:sp>
+      <p:sp>
+        <p:nvSpPr>
+          <p:cNvPr id="4" name="Slide Number Placeholder 3">
+            <a:extLst>
+              <a:ext uri="{FF2B5EF4-FFF2-40B4-BE49-F238E27FC236}">
+                <a16:creationId xmlns:a16="http://schemas.microsoft.com/office/drawing/2014/main" id="{05C38FD3-AA50-584A-BBDF-973FBFC9A44C}"/>
+              </a:ext>
+            </a:extLst>
+          </p:cNvPr>
+          <p:cNvSpPr>
+            <a:spLocks noGrp="1"/>
+          </p:cNvSpPr>
+          <p:nvPr>
+            <p:ph type="sldNum" sz="quarter" idx="12"/>
+          </p:nvPr>
+        </p:nvSpPr>
+        <p:spPr/>
+        <p:txBody>
+          <a:bodyPr/>
+          <a:lstStyle/>
+          <a:p>
+            <a:fld id="{B30C84D9-7A41-4FEB-892B-80917372DB87}" type="slidenum">
+              <a:rPr lang="en-US" smtClean="0"/>
+              <a:t>16</a:t>
+            </a:fld>
+            <a:endParaRPr lang="en-US"/>
+          </a:p>
+        </p:txBody>
+      </p:sp>
+    </p:spTree>
+    <p:extLst>
+      <p:ext uri="{BB962C8B-B14F-4D97-AF65-F5344CB8AC3E}">
+        <p14:creationId xmlns:p14="http://schemas.microsoft.com/office/powerpoint/2010/main" val="2523484820"/>
+      </p:ext>
+    </p:extLst>
+  </p:cSld>
+  <p:clrMapOvr>
+    <a:masterClrMapping/>
+  </p:clrMapOvr>
+</p:sld>
+</file>
+
 <file path=ppt/slides/slide17.xml><?xml version="1.0" encoding="utf-8"?>
 <p:sld xmlns:a="http://schemas.openxmlformats.org/drawingml/2006/main" xmlns:r="http://schemas.openxmlformats.org/officeDocument/2006/relationships" xmlns:p="http://schemas.openxmlformats.org/presentationml/2006/main">
   <p:cSld>
@@ -8434,238 +8100,6 @@
       </p:grpSpPr>
       <p:sp>
         <p:nvSpPr>
-          <p:cNvPr id="32771" name="Rectangle 3"/>
-          <p:cNvSpPr>
-            <a:spLocks noGrp="1" noChangeArrowheads="1"/>
-          </p:cNvSpPr>
-          <p:nvPr>
-            <p:ph type="title"/>
-          </p:nvPr>
-        </p:nvSpPr>
-        <p:spPr>
-          <a:ln/>
-        </p:spPr>
-        <p:txBody>
-          <a:bodyPr/>
-          <a:lstStyle/>
-          <a:p>
-            <a:pPr marL="119063" indent="-119063"/>
-            <a:r>
-              <a:rPr lang="en-US"/>
-              <a:t>Course Components</a:t>
-            </a:r>
-          </a:p>
-        </p:txBody>
-      </p:sp>
-      <p:sp>
-        <p:nvSpPr>
-          <p:cNvPr id="32772" name="Rectangle 4"/>
-          <p:cNvSpPr>
-            <a:spLocks noGrp="1" noChangeArrowheads="1"/>
-          </p:cNvSpPr>
-          <p:nvPr>
-            <p:ph idx="1"/>
-          </p:nvPr>
-        </p:nvSpPr>
-        <p:spPr>
-          <a:ln/>
-        </p:spPr>
-        <p:txBody>
-          <a:bodyPr>
-            <a:normAutofit fontScale="92500" lnSpcReduction="10000"/>
-          </a:bodyPr>
-          <a:lstStyle/>
-          <a:p>
-            <a:r>
-              <a:rPr lang="en-US" dirty="0"/>
-              <a:t>Lectures</a:t>
-            </a:r>
-          </a:p>
-          <a:p>
-            <a:pPr marL="552450" lvl="1"/>
-            <a:r>
-              <a:rPr lang="en-US" dirty="0"/>
-              <a:t>Higher level concepts</a:t>
-            </a:r>
-          </a:p>
-          <a:p>
-            <a:r>
-              <a:rPr lang="en-US" dirty="0"/>
-              <a:t>Recitations</a:t>
-            </a:r>
-          </a:p>
-          <a:p>
-            <a:pPr marL="552450" lvl="1"/>
-            <a:r>
-              <a:rPr lang="en-US" dirty="0"/>
-              <a:t>Applied concepts, important tools and skills for labs, clarification of lectures, exam coverage</a:t>
-            </a:r>
-          </a:p>
-          <a:p>
-            <a:r>
-              <a:rPr lang="en-US" dirty="0"/>
-              <a:t>Labs</a:t>
-            </a:r>
-          </a:p>
-          <a:p>
-            <a:pPr marL="552450" lvl="1"/>
-            <a:r>
-              <a:rPr lang="en-US" dirty="0"/>
-              <a:t>The heart of the course</a:t>
-            </a:r>
-          </a:p>
-          <a:p>
-            <a:pPr marL="552450" lvl="1"/>
-            <a:r>
-              <a:rPr lang="en-US" dirty="0"/>
-              <a:t>1-2 weeks each</a:t>
-            </a:r>
-          </a:p>
-          <a:p>
-            <a:pPr marL="552450" lvl="1"/>
-            <a:r>
-              <a:rPr lang="en-US" dirty="0"/>
-              <a:t>Provide in-depth understanding of an aspect of systems programming and debugging</a:t>
-            </a:r>
-          </a:p>
-          <a:p>
-            <a:r>
-              <a:rPr lang="en-US" dirty="0"/>
-              <a:t>Homework and Exams</a:t>
-            </a:r>
-          </a:p>
-          <a:p>
-            <a:pPr marL="552450" lvl="1"/>
-            <a:r>
-              <a:rPr lang="en-US" dirty="0"/>
-              <a:t>Test your understanding of concepts &amp; key principles</a:t>
-            </a:r>
-          </a:p>
-          <a:p>
-            <a:pPr marL="952500" lvl="2"/>
-            <a:r>
-              <a:rPr lang="en-US" dirty="0"/>
-              <a:t>Two midterms and one final</a:t>
-            </a:r>
-          </a:p>
-          <a:p>
-            <a:pPr marL="552450" lvl="1"/>
-            <a:endParaRPr lang="en-US" dirty="0"/>
-          </a:p>
-        </p:txBody>
-      </p:sp>
-      <p:sp>
-        <p:nvSpPr>
-          <p:cNvPr id="2" name="Text Placeholder 1"/>
-          <p:cNvSpPr>
-            <a:spLocks noGrp="1"/>
-          </p:cNvSpPr>
-          <p:nvPr>
-            <p:ph type="body" sz="quarter" idx="13"/>
-          </p:nvPr>
-        </p:nvSpPr>
-        <p:spPr/>
-        <p:txBody>
-          <a:bodyPr/>
-          <a:lstStyle/>
-          <a:p>
-            <a:r>
-              <a:rPr lang="en-US" dirty="0"/>
-              <a:t>Slide by Bohn</a:t>
-            </a:r>
-          </a:p>
-        </p:txBody>
-      </p:sp>
-      <p:sp>
-        <p:nvSpPr>
-          <p:cNvPr id="3" name="Footer Placeholder 2">
-            <a:extLst>
-              <a:ext uri="{FF2B5EF4-FFF2-40B4-BE49-F238E27FC236}">
-                <a16:creationId xmlns:a16="http://schemas.microsoft.com/office/drawing/2014/main" id="{E4207D7D-6FAA-AF43-A6FD-1F43A468A142}"/>
-              </a:ext>
-            </a:extLst>
-          </p:cNvPr>
-          <p:cNvSpPr>
-            <a:spLocks noGrp="1"/>
-          </p:cNvSpPr>
-          <p:nvPr>
-            <p:ph type="ftr" sz="quarter" idx="11"/>
-          </p:nvPr>
-        </p:nvSpPr>
-        <p:spPr/>
-        <p:txBody>
-          <a:bodyPr/>
-          <a:lstStyle/>
-          <a:p>
-            <a:r>
-              <a:rPr lang="en-US"/>
-              <a:t>Programming at the Hardware/Software Interface</a:t>
-            </a:r>
-            <a:endParaRPr lang="en-US" dirty="0"/>
-          </a:p>
-        </p:txBody>
-      </p:sp>
-      <p:sp>
-        <p:nvSpPr>
-          <p:cNvPr id="4" name="Slide Number Placeholder 3">
-            <a:extLst>
-              <a:ext uri="{FF2B5EF4-FFF2-40B4-BE49-F238E27FC236}">
-                <a16:creationId xmlns:a16="http://schemas.microsoft.com/office/drawing/2014/main" id="{05C38FD3-AA50-584A-BBDF-973FBFC9A44C}"/>
-              </a:ext>
-            </a:extLst>
-          </p:cNvPr>
-          <p:cNvSpPr>
-            <a:spLocks noGrp="1"/>
-          </p:cNvSpPr>
-          <p:nvPr>
-            <p:ph type="sldNum" sz="quarter" idx="12"/>
-          </p:nvPr>
-        </p:nvSpPr>
-        <p:spPr/>
-        <p:txBody>
-          <a:bodyPr/>
-          <a:lstStyle/>
-          <a:p>
-            <a:fld id="{B30C84D9-7A41-4FEB-892B-80917372DB87}" type="slidenum">
-              <a:rPr lang="en-US" smtClean="0"/>
-              <a:t>17</a:t>
-            </a:fld>
-            <a:endParaRPr lang="en-US"/>
-          </a:p>
-        </p:txBody>
-      </p:sp>
-    </p:spTree>
-    <p:extLst>
-      <p:ext uri="{BB962C8B-B14F-4D97-AF65-F5344CB8AC3E}">
-        <p14:creationId xmlns:p14="http://schemas.microsoft.com/office/powerpoint/2010/main" val="2523484820"/>
-      </p:ext>
-    </p:extLst>
-  </p:cSld>
-  <p:clrMapOvr>
-    <a:masterClrMapping/>
-  </p:clrMapOvr>
-</p:sld>
-</file>
-
-<file path=ppt/slides/slide18.xml><?xml version="1.0" encoding="utf-8"?>
-<p:sld xmlns:a="http://schemas.openxmlformats.org/drawingml/2006/main" xmlns:r="http://schemas.openxmlformats.org/officeDocument/2006/relationships" xmlns:p="http://schemas.openxmlformats.org/presentationml/2006/main">
-  <p:cSld>
-    <p:spTree>
-      <p:nvGrpSpPr>
-        <p:cNvPr id="1" name=""/>
-        <p:cNvGrpSpPr/>
-        <p:nvPr/>
-      </p:nvGrpSpPr>
-      <p:grpSpPr>
-        <a:xfrm>
-          <a:off x="0" y="0"/>
-          <a:ext cx="0" cy="0"/>
-          <a:chOff x="0" y="0"/>
-          <a:chExt cx="0" cy="0"/>
-        </a:xfrm>
-      </p:grpSpPr>
-      <p:sp>
-        <p:nvSpPr>
           <p:cNvPr id="2" name="Title 1">
             <a:extLst>
               <a:ext uri="{FF2B5EF4-FFF2-40B4-BE49-F238E27FC236}">
@@ -8790,7 +8224,7 @@
           <a:p>
             <a:fld id="{B30C84D9-7A41-4FEB-892B-80917372DB87}" type="slidenum">
               <a:rPr lang="en-US" smtClean="0"/>
-              <a:t>18</a:t>
+              <a:t>17</a:t>
             </a:fld>
             <a:endParaRPr lang="en-US"/>
           </a:p>
@@ -9435,13 +8869,7 @@
       </p:grpSpPr>
       <p:sp>
         <p:nvSpPr>
-          <p:cNvPr id="2" name="Title 1">
-            <a:extLst>
-              <a:ext uri="{FF2B5EF4-FFF2-40B4-BE49-F238E27FC236}">
-                <a16:creationId xmlns:a16="http://schemas.microsoft.com/office/drawing/2014/main" id="{E54522FE-CB06-D049-819C-3F6594B20FCE}"/>
-              </a:ext>
-            </a:extLst>
-          </p:cNvPr>
+          <p:cNvPr id="2" name="Title 1"/>
           <p:cNvSpPr>
             <a:spLocks noGrp="1"/>
           </p:cNvSpPr>
@@ -9456,66 +8884,14 @@
           <a:p>
             <a:r>
               <a:rPr lang="en-US" dirty="0"/>
-              <a:t>COVID-19 Notes</a:t>
-            </a:r>
-          </a:p>
-        </p:txBody>
-      </p:sp>
-      <p:sp>
-        <p:nvSpPr>
-          <p:cNvPr id="3" name="Content Placeholder 2">
-            <a:extLst>
-              <a:ext uri="{FF2B5EF4-FFF2-40B4-BE49-F238E27FC236}">
-                <a16:creationId xmlns:a16="http://schemas.microsoft.com/office/drawing/2014/main" id="{494697D4-F3A9-3C41-84A4-99AA50C3EDF0}"/>
-              </a:ext>
-            </a:extLst>
-          </p:cNvPr>
-          <p:cNvSpPr>
-            <a:spLocks noGrp="1"/>
-          </p:cNvSpPr>
-          <p:nvPr>
-            <p:ph idx="1"/>
-          </p:nvPr>
-        </p:nvSpPr>
-        <p:spPr/>
-        <p:txBody>
-          <a:bodyPr/>
-          <a:lstStyle/>
-          <a:p>
-            <a:r>
-              <a:rPr lang="en-US" dirty="0"/>
-              <a:t>This course does not have an approved requirement for mandatory face coverings</a:t>
-            </a:r>
-          </a:p>
-          <a:p>
-            <a:endParaRPr lang="en-US" dirty="0"/>
-          </a:p>
-          <a:p>
-            <a:r>
-              <a:rPr lang="en-US" dirty="0"/>
-              <a:t>If your circumstances necessitate mandatory face coverings (family member who cannot be vaccinated or with health condition that makes vaccines less effective), contact me ASAP</a:t>
-            </a:r>
-          </a:p>
-          <a:p>
-            <a:endParaRPr lang="en-US" dirty="0"/>
-          </a:p>
-          <a:p>
-            <a:r>
-              <a:rPr lang="en-US" dirty="0"/>
-              <a:t>I will accommodate students who cannot attend class due to health issues</a:t>
-            </a:r>
-          </a:p>
-        </p:txBody>
-      </p:sp>
-      <p:sp>
-        <p:nvSpPr>
-          <p:cNvPr id="4" name="Footer Placeholder 3">
-            <a:extLst>
-              <a:ext uri="{FF2B5EF4-FFF2-40B4-BE49-F238E27FC236}">
-                <a16:creationId xmlns:a16="http://schemas.microsoft.com/office/drawing/2014/main" id="{1D81375A-459D-1648-BDAD-A9D9FD0F6EF0}"/>
-              </a:ext>
-            </a:extLst>
-          </p:cNvPr>
+              <a:t>Why are you taking this course?</a:t>
+            </a:r>
+          </a:p>
+        </p:txBody>
+      </p:sp>
+      <p:sp>
+        <p:nvSpPr>
+          <p:cNvPr id="4" name="Footer Placeholder 3"/>
           <p:cNvSpPr>
             <a:spLocks noGrp="1"/>
           </p:cNvSpPr>
@@ -9538,13 +8914,7 @@
       </p:sp>
       <p:sp>
         <p:nvSpPr>
-          <p:cNvPr id="5" name="Slide Number Placeholder 4">
-            <a:extLst>
-              <a:ext uri="{FF2B5EF4-FFF2-40B4-BE49-F238E27FC236}">
-                <a16:creationId xmlns:a16="http://schemas.microsoft.com/office/drawing/2014/main" id="{842F4E4A-5783-B948-AC41-16C887FACC82}"/>
-              </a:ext>
-            </a:extLst>
-          </p:cNvPr>
+          <p:cNvPr id="5" name="Slide Number Placeholder 4"/>
           <p:cNvSpPr>
             <a:spLocks noGrp="1"/>
           </p:cNvSpPr>
@@ -9560,132 +8930,6 @@
             <a:fld id="{B30C84D9-7A41-4FEB-892B-80917372DB87}" type="slidenum">
               <a:rPr lang="en-US" smtClean="0"/>
               <a:t>4</a:t>
-            </a:fld>
-            <a:endParaRPr lang="en-US"/>
-          </a:p>
-        </p:txBody>
-      </p:sp>
-      <p:sp>
-        <p:nvSpPr>
-          <p:cNvPr id="6" name="Text Placeholder 5">
-            <a:extLst>
-              <a:ext uri="{FF2B5EF4-FFF2-40B4-BE49-F238E27FC236}">
-                <a16:creationId xmlns:a16="http://schemas.microsoft.com/office/drawing/2014/main" id="{83AE8B4C-A08A-4442-A5DA-C1FA0801A231}"/>
-              </a:ext>
-            </a:extLst>
-          </p:cNvPr>
-          <p:cNvSpPr>
-            <a:spLocks noGrp="1"/>
-          </p:cNvSpPr>
-          <p:nvPr>
-            <p:ph type="body" sz="quarter" idx="13"/>
-          </p:nvPr>
-        </p:nvSpPr>
-        <p:spPr/>
-        <p:txBody>
-          <a:bodyPr/>
-          <a:lstStyle/>
-          <a:p>
-            <a:r>
-              <a:rPr lang="en-US" dirty="0"/>
-              <a:t>Slide by Bohn</a:t>
-            </a:r>
-          </a:p>
-        </p:txBody>
-      </p:sp>
-    </p:spTree>
-    <p:extLst>
-      <p:ext uri="{BB962C8B-B14F-4D97-AF65-F5344CB8AC3E}">
-        <p14:creationId xmlns:p14="http://schemas.microsoft.com/office/powerpoint/2010/main" val="2662494157"/>
-      </p:ext>
-    </p:extLst>
-  </p:cSld>
-  <p:clrMapOvr>
-    <a:masterClrMapping/>
-  </p:clrMapOvr>
-</p:sld>
-</file>
-
-<file path=ppt/slides/slide5.xml><?xml version="1.0" encoding="utf-8"?>
-<p:sld xmlns:a="http://schemas.openxmlformats.org/drawingml/2006/main" xmlns:r="http://schemas.openxmlformats.org/officeDocument/2006/relationships" xmlns:p="http://schemas.openxmlformats.org/presentationml/2006/main">
-  <p:cSld>
-    <p:spTree>
-      <p:nvGrpSpPr>
-        <p:cNvPr id="1" name=""/>
-        <p:cNvGrpSpPr/>
-        <p:nvPr/>
-      </p:nvGrpSpPr>
-      <p:grpSpPr>
-        <a:xfrm>
-          <a:off x="0" y="0"/>
-          <a:ext cx="0" cy="0"/>
-          <a:chOff x="0" y="0"/>
-          <a:chExt cx="0" cy="0"/>
-        </a:xfrm>
-      </p:grpSpPr>
-      <p:sp>
-        <p:nvSpPr>
-          <p:cNvPr id="2" name="Title 1"/>
-          <p:cNvSpPr>
-            <a:spLocks noGrp="1"/>
-          </p:cNvSpPr>
-          <p:nvPr>
-            <p:ph type="title"/>
-          </p:nvPr>
-        </p:nvSpPr>
-        <p:spPr/>
-        <p:txBody>
-          <a:bodyPr/>
-          <a:lstStyle/>
-          <a:p>
-            <a:r>
-              <a:rPr lang="en-US" dirty="0"/>
-              <a:t>Why are you taking this course?</a:t>
-            </a:r>
-          </a:p>
-        </p:txBody>
-      </p:sp>
-      <p:sp>
-        <p:nvSpPr>
-          <p:cNvPr id="4" name="Footer Placeholder 3"/>
-          <p:cNvSpPr>
-            <a:spLocks noGrp="1"/>
-          </p:cNvSpPr>
-          <p:nvPr>
-            <p:ph type="ftr" sz="quarter" idx="11"/>
-          </p:nvPr>
-        </p:nvSpPr>
-        <p:spPr/>
-        <p:txBody>
-          <a:bodyPr/>
-          <a:lstStyle/>
-          <a:p>
-            <a:r>
-              <a:rPr lang="en-US"/>
-              <a:t>Programming at the Hardware/Software Interface</a:t>
-            </a:r>
-            <a:endParaRPr lang="en-US" dirty="0"/>
-          </a:p>
-        </p:txBody>
-      </p:sp>
-      <p:sp>
-        <p:nvSpPr>
-          <p:cNvPr id="5" name="Slide Number Placeholder 4"/>
-          <p:cNvSpPr>
-            <a:spLocks noGrp="1"/>
-          </p:cNvSpPr>
-          <p:nvPr>
-            <p:ph type="sldNum" sz="quarter" idx="12"/>
-          </p:nvPr>
-        </p:nvSpPr>
-        <p:spPr/>
-        <p:txBody>
-          <a:bodyPr/>
-          <a:lstStyle/>
-          <a:p>
-            <a:fld id="{B30C84D9-7A41-4FEB-892B-80917372DB87}" type="slidenum">
-              <a:rPr lang="en-US" smtClean="0"/>
-              <a:t>5</a:t>
             </a:fld>
             <a:endParaRPr lang="en-US"/>
           </a:p>
@@ -10144,7 +9388,7 @@
 </p:sld>
 </file>
 
-<file path=ppt/slides/slide6.xml><?xml version="1.0" encoding="utf-8"?>
+<file path=ppt/slides/slide5.xml><?xml version="1.0" encoding="utf-8"?>
 <p:sld xmlns:a="http://schemas.openxmlformats.org/drawingml/2006/main" xmlns:r="http://schemas.openxmlformats.org/officeDocument/2006/relationships" xmlns:p="http://schemas.openxmlformats.org/presentationml/2006/main">
   <p:cSld>
     <p:spTree>
@@ -10275,7 +9519,7 @@
           <a:p>
             <a:fld id="{B30C84D9-7A41-4FEB-892B-80917372DB87}" type="slidenum">
               <a:rPr lang="en-US" smtClean="0"/>
-              <a:t>6</a:t>
+              <a:t>5</a:t>
             </a:fld>
             <a:endParaRPr lang="en-US"/>
           </a:p>
@@ -10651,7 +9895,7 @@
 </p:sld>
 </file>
 
-<file path=ppt/slides/slide7.xml><?xml version="1.0" encoding="utf-8"?>
+<file path=ppt/slides/slide6.xml><?xml version="1.0" encoding="utf-8"?>
 <p:sld xmlns:a="http://schemas.openxmlformats.org/drawingml/2006/main" xmlns:r="http://schemas.openxmlformats.org/officeDocument/2006/relationships" xmlns:p="http://schemas.openxmlformats.org/presentationml/2006/main">
   <p:cSld>
     <p:spTree>
@@ -10791,7 +10035,7 @@
           <a:p>
             <a:fld id="{B30C84D9-7A41-4FEB-892B-80917372DB87}" type="slidenum">
               <a:rPr lang="en-US" smtClean="0"/>
-              <a:t>7</a:t>
+              <a:t>6</a:t>
             </a:fld>
             <a:endParaRPr lang="en-US"/>
           </a:p>
@@ -11210,6 +10454,163 @@
 </p:sld>
 </file>
 
+<file path=ppt/slides/slide7.xml><?xml version="1.0" encoding="utf-8"?>
+<p:sld xmlns:a="http://schemas.openxmlformats.org/drawingml/2006/main" xmlns:r="http://schemas.openxmlformats.org/officeDocument/2006/relationships" xmlns:p="http://schemas.openxmlformats.org/presentationml/2006/main">
+  <p:cSld>
+    <p:spTree>
+      <p:nvGrpSpPr>
+        <p:cNvPr id="1" name=""/>
+        <p:cNvGrpSpPr/>
+        <p:nvPr/>
+      </p:nvGrpSpPr>
+      <p:grpSpPr>
+        <a:xfrm>
+          <a:off x="0" y="0"/>
+          <a:ext cx="0" cy="0"/>
+          <a:chOff x="0" y="0"/>
+          <a:chExt cx="0" cy="0"/>
+        </a:xfrm>
+      </p:grpSpPr>
+      <p:sp>
+        <p:nvSpPr>
+          <p:cNvPr id="2" name="Title 1"/>
+          <p:cNvSpPr>
+            <a:spLocks noGrp="1"/>
+          </p:cNvSpPr>
+          <p:nvPr>
+            <p:ph type="title"/>
+          </p:nvPr>
+        </p:nvSpPr>
+        <p:spPr/>
+        <p:txBody>
+          <a:bodyPr/>
+          <a:lstStyle/>
+          <a:p>
+            <a:r>
+              <a:rPr lang="en-US" dirty="0"/>
+              <a:t>Languages used in this course</a:t>
+            </a:r>
+          </a:p>
+        </p:txBody>
+      </p:sp>
+      <p:sp>
+        <p:nvSpPr>
+          <p:cNvPr id="3" name="Content Placeholder 2"/>
+          <p:cNvSpPr>
+            <a:spLocks noGrp="1"/>
+          </p:cNvSpPr>
+          <p:nvPr>
+            <p:ph idx="1"/>
+          </p:nvPr>
+        </p:nvSpPr>
+        <p:spPr/>
+        <p:txBody>
+          <a:bodyPr/>
+          <a:lstStyle/>
+          <a:p>
+            <a:r>
+              <a:rPr lang="en-US" dirty="0"/>
+              <a:t>C</a:t>
+            </a:r>
+          </a:p>
+          <a:p>
+            <a:r>
+              <a:rPr lang="en-US" dirty="0"/>
+              <a:t>Assembly (x86, ARM)</a:t>
+            </a:r>
+          </a:p>
+          <a:p>
+            <a:endParaRPr lang="en-US" dirty="0"/>
+          </a:p>
+          <a:p>
+            <a:r>
+              <a:rPr lang="en-US" dirty="0"/>
+              <a:t>Why?</a:t>
+            </a:r>
+          </a:p>
+        </p:txBody>
+      </p:sp>
+      <p:sp>
+        <p:nvSpPr>
+          <p:cNvPr id="4" name="Footer Placeholder 3"/>
+          <p:cNvSpPr>
+            <a:spLocks noGrp="1"/>
+          </p:cNvSpPr>
+          <p:nvPr>
+            <p:ph type="ftr" sz="quarter" idx="11"/>
+          </p:nvPr>
+        </p:nvSpPr>
+        <p:spPr/>
+        <p:txBody>
+          <a:bodyPr/>
+          <a:lstStyle/>
+          <a:p>
+            <a:r>
+              <a:rPr lang="en-US"/>
+              <a:t>Programming at the Hardware/Software Interface</a:t>
+            </a:r>
+            <a:endParaRPr lang="en-US" dirty="0"/>
+          </a:p>
+        </p:txBody>
+      </p:sp>
+      <p:sp>
+        <p:nvSpPr>
+          <p:cNvPr id="5" name="Slide Number Placeholder 4"/>
+          <p:cNvSpPr>
+            <a:spLocks noGrp="1"/>
+          </p:cNvSpPr>
+          <p:nvPr>
+            <p:ph type="sldNum" sz="quarter" idx="12"/>
+          </p:nvPr>
+        </p:nvSpPr>
+        <p:spPr/>
+        <p:txBody>
+          <a:bodyPr/>
+          <a:lstStyle/>
+          <a:p>
+            <a:fld id="{B30C84D9-7A41-4FEB-892B-80917372DB87}" type="slidenum">
+              <a:rPr lang="en-US" smtClean="0"/>
+              <a:t>7</a:t>
+            </a:fld>
+            <a:endParaRPr lang="en-US"/>
+          </a:p>
+        </p:txBody>
+      </p:sp>
+      <p:sp>
+        <p:nvSpPr>
+          <p:cNvPr id="6" name="Text Placeholder 5"/>
+          <p:cNvSpPr>
+            <a:spLocks noGrp="1"/>
+          </p:cNvSpPr>
+          <p:nvPr>
+            <p:ph type="body" sz="quarter" idx="13"/>
+          </p:nvPr>
+        </p:nvSpPr>
+        <p:spPr/>
+        <p:txBody>
+          <a:bodyPr/>
+          <a:lstStyle/>
+          <a:p>
+            <a:r>
+              <a:rPr lang="en-US" dirty="0"/>
+              <a:t>Slide by Bohn</a:t>
+            </a:r>
+          </a:p>
+        </p:txBody>
+      </p:sp>
+    </p:spTree>
+    <p:extLst>
+      <p:ext uri="{BB962C8B-B14F-4D97-AF65-F5344CB8AC3E}">
+        <p14:creationId xmlns:p14="http://schemas.microsoft.com/office/powerpoint/2010/main" val="3703694109"/>
+      </p:ext>
+    </p:extLst>
+  </p:cSld>
+  <p:clrMapOvr>
+    <a:masterClrMapping/>
+  </p:clrMapOvr>
+</p:sld>
+</file>
+
 <file path=ppt/slides/slide8.xml><?xml version="1.0" encoding="utf-8"?>
 <p:sld xmlns:a="http://schemas.openxmlformats.org/drawingml/2006/main" xmlns:r="http://schemas.openxmlformats.org/officeDocument/2006/relationships" xmlns:p="http://schemas.openxmlformats.org/presentationml/2006/main">
   <p:cSld>
@@ -11244,163 +10645,6 @@
           <a:p>
             <a:r>
               <a:rPr lang="en-US" dirty="0"/>
-              <a:t>Languages used in this course</a:t>
-            </a:r>
-          </a:p>
-        </p:txBody>
-      </p:sp>
-      <p:sp>
-        <p:nvSpPr>
-          <p:cNvPr id="3" name="Content Placeholder 2"/>
-          <p:cNvSpPr>
-            <a:spLocks noGrp="1"/>
-          </p:cNvSpPr>
-          <p:nvPr>
-            <p:ph idx="1"/>
-          </p:nvPr>
-        </p:nvSpPr>
-        <p:spPr/>
-        <p:txBody>
-          <a:bodyPr/>
-          <a:lstStyle/>
-          <a:p>
-            <a:r>
-              <a:rPr lang="en-US" dirty="0"/>
-              <a:t>C</a:t>
-            </a:r>
-          </a:p>
-          <a:p>
-            <a:r>
-              <a:rPr lang="en-US" dirty="0"/>
-              <a:t>Assembly (x86, ARM)</a:t>
-            </a:r>
-          </a:p>
-          <a:p>
-            <a:endParaRPr lang="en-US" dirty="0"/>
-          </a:p>
-          <a:p>
-            <a:r>
-              <a:rPr lang="en-US" dirty="0"/>
-              <a:t>Why?</a:t>
-            </a:r>
-          </a:p>
-        </p:txBody>
-      </p:sp>
-      <p:sp>
-        <p:nvSpPr>
-          <p:cNvPr id="4" name="Footer Placeholder 3"/>
-          <p:cNvSpPr>
-            <a:spLocks noGrp="1"/>
-          </p:cNvSpPr>
-          <p:nvPr>
-            <p:ph type="ftr" sz="quarter" idx="11"/>
-          </p:nvPr>
-        </p:nvSpPr>
-        <p:spPr/>
-        <p:txBody>
-          <a:bodyPr/>
-          <a:lstStyle/>
-          <a:p>
-            <a:r>
-              <a:rPr lang="en-US"/>
-              <a:t>Programming at the Hardware/Software Interface</a:t>
-            </a:r>
-            <a:endParaRPr lang="en-US" dirty="0"/>
-          </a:p>
-        </p:txBody>
-      </p:sp>
-      <p:sp>
-        <p:nvSpPr>
-          <p:cNvPr id="5" name="Slide Number Placeholder 4"/>
-          <p:cNvSpPr>
-            <a:spLocks noGrp="1"/>
-          </p:cNvSpPr>
-          <p:nvPr>
-            <p:ph type="sldNum" sz="quarter" idx="12"/>
-          </p:nvPr>
-        </p:nvSpPr>
-        <p:spPr/>
-        <p:txBody>
-          <a:bodyPr/>
-          <a:lstStyle/>
-          <a:p>
-            <a:fld id="{B30C84D9-7A41-4FEB-892B-80917372DB87}" type="slidenum">
-              <a:rPr lang="en-US" smtClean="0"/>
-              <a:t>8</a:t>
-            </a:fld>
-            <a:endParaRPr lang="en-US"/>
-          </a:p>
-        </p:txBody>
-      </p:sp>
-      <p:sp>
-        <p:nvSpPr>
-          <p:cNvPr id="6" name="Text Placeholder 5"/>
-          <p:cNvSpPr>
-            <a:spLocks noGrp="1"/>
-          </p:cNvSpPr>
-          <p:nvPr>
-            <p:ph type="body" sz="quarter" idx="13"/>
-          </p:nvPr>
-        </p:nvSpPr>
-        <p:spPr/>
-        <p:txBody>
-          <a:bodyPr/>
-          <a:lstStyle/>
-          <a:p>
-            <a:r>
-              <a:rPr lang="en-US" dirty="0"/>
-              <a:t>Slide by Bohn</a:t>
-            </a:r>
-          </a:p>
-        </p:txBody>
-      </p:sp>
-    </p:spTree>
-    <p:extLst>
-      <p:ext uri="{BB962C8B-B14F-4D97-AF65-F5344CB8AC3E}">
-        <p14:creationId xmlns:p14="http://schemas.microsoft.com/office/powerpoint/2010/main" val="3703694109"/>
-      </p:ext>
-    </p:extLst>
-  </p:cSld>
-  <p:clrMapOvr>
-    <a:masterClrMapping/>
-  </p:clrMapOvr>
-</p:sld>
-</file>
-
-<file path=ppt/slides/slide9.xml><?xml version="1.0" encoding="utf-8"?>
-<p:sld xmlns:a="http://schemas.openxmlformats.org/drawingml/2006/main" xmlns:r="http://schemas.openxmlformats.org/officeDocument/2006/relationships" xmlns:p="http://schemas.openxmlformats.org/presentationml/2006/main">
-  <p:cSld>
-    <p:spTree>
-      <p:nvGrpSpPr>
-        <p:cNvPr id="1" name=""/>
-        <p:cNvGrpSpPr/>
-        <p:nvPr/>
-      </p:nvGrpSpPr>
-      <p:grpSpPr>
-        <a:xfrm>
-          <a:off x="0" y="0"/>
-          <a:ext cx="0" cy="0"/>
-          <a:chOff x="0" y="0"/>
-          <a:chExt cx="0" cy="0"/>
-        </a:xfrm>
-      </p:grpSpPr>
-      <p:sp>
-        <p:nvSpPr>
-          <p:cNvPr id="2" name="Title 1"/>
-          <p:cNvSpPr>
-            <a:spLocks noGrp="1"/>
-          </p:cNvSpPr>
-          <p:nvPr>
-            <p:ph type="title"/>
-          </p:nvPr>
-        </p:nvSpPr>
-        <p:spPr/>
-        <p:txBody>
-          <a:bodyPr/>
-          <a:lstStyle/>
-          <a:p>
-            <a:r>
-              <a:rPr lang="en-US" dirty="0"/>
               <a:t>Planned lessons</a:t>
             </a:r>
           </a:p>
@@ -11500,7 +10744,7 @@
           <a:p>
             <a:fld id="{B30C84D9-7A41-4FEB-892B-80917372DB87}" type="slidenum">
               <a:rPr lang="en-US" smtClean="0"/>
-              <a:t>9</a:t>
+              <a:t>8</a:t>
             </a:fld>
             <a:endParaRPr lang="en-US"/>
           </a:p>
@@ -12118,6 +11362,571 @@
       <p:bldP spid="6" grpId="0"/>
       <p:bldP spid="14" grpId="0"/>
       <p:bldP spid="15" grpId="0"/>
+    </p:bldLst>
+  </p:timing>
+</p:sld>
+</file>
+
+<file path=ppt/slides/slide9.xml><?xml version="1.0" encoding="utf-8"?>
+<p:sld xmlns:a="http://schemas.openxmlformats.org/drawingml/2006/main" xmlns:r="http://schemas.openxmlformats.org/officeDocument/2006/relationships" xmlns:p="http://schemas.openxmlformats.org/presentationml/2006/main">
+  <p:cSld>
+    <p:spTree>
+      <p:nvGrpSpPr>
+        <p:cNvPr id="1" name=""/>
+        <p:cNvGrpSpPr/>
+        <p:nvPr/>
+      </p:nvGrpSpPr>
+      <p:grpSpPr>
+        <a:xfrm>
+          <a:off x="0" y="0"/>
+          <a:ext cx="0" cy="0"/>
+          <a:chOff x="0" y="0"/>
+          <a:chExt cx="0" cy="0"/>
+        </a:xfrm>
+      </p:grpSpPr>
+      <p:sp>
+        <p:nvSpPr>
+          <p:cNvPr id="2" name="Title 1"/>
+          <p:cNvSpPr>
+            <a:spLocks noGrp="1"/>
+          </p:cNvSpPr>
+          <p:nvPr>
+            <p:ph type="title"/>
+          </p:nvPr>
+        </p:nvSpPr>
+        <p:spPr/>
+        <p:txBody>
+          <a:bodyPr/>
+          <a:lstStyle/>
+          <a:p>
+            <a:r>
+              <a:rPr lang="en-US" dirty="0"/>
+              <a:t>Planned lessons</a:t>
+            </a:r>
+          </a:p>
+        </p:txBody>
+      </p:sp>
+      <p:sp>
+        <p:nvSpPr>
+          <p:cNvPr id="7" name="Content Placeholder 6"/>
+          <p:cNvSpPr>
+            <a:spLocks noGrp="1"/>
+          </p:cNvSpPr>
+          <p:nvPr>
+            <p:ph sz="half" idx="1"/>
+          </p:nvPr>
+        </p:nvSpPr>
+        <p:spPr/>
+        <p:txBody>
+          <a:bodyPr/>
+          <a:lstStyle/>
+          <a:p>
+            <a:r>
+              <a:rPr lang="en-US" dirty="0">
+                <a:solidFill>
+                  <a:schemeClr val="bg1">
+                    <a:lumMod val="65000"/>
+                  </a:schemeClr>
+                </a:solidFill>
+              </a:rPr>
+              <a:t>Data representation &amp; arithmetic</a:t>
+            </a:r>
+          </a:p>
+          <a:p>
+            <a:r>
+              <a:rPr lang="en-US" dirty="0"/>
+              <a:t>Assembly language</a:t>
+            </a:r>
+          </a:p>
+        </p:txBody>
+      </p:sp>
+      <p:sp>
+        <p:nvSpPr>
+          <p:cNvPr id="8" name="Content Placeholder 7"/>
+          <p:cNvSpPr>
+            <a:spLocks noGrp="1"/>
+          </p:cNvSpPr>
+          <p:nvPr>
+            <p:ph sz="half" idx="2"/>
+          </p:nvPr>
+        </p:nvSpPr>
+        <p:spPr/>
+        <p:txBody>
+          <a:bodyPr>
+            <a:normAutofit/>
+          </a:bodyPr>
+          <a:lstStyle/>
+          <a:p>
+            <a:r>
+              <a:rPr lang="en-US" dirty="0"/>
+              <a:t>ALGOL, BASIC, COBOL, FORTRAN, Pascal, and PL/I</a:t>
+            </a:r>
+            <a:br>
+              <a:rPr lang="en-US" dirty="0"/>
+            </a:br>
+            <a:r>
+              <a:rPr lang="en-US" dirty="0"/>
+              <a:t>count 1,2,3…</a:t>
+            </a:r>
+            <a:br>
+              <a:rPr lang="en-US" dirty="0"/>
+            </a:br>
+            <a:r>
+              <a:rPr lang="en-US" sz="2000" dirty="0"/>
+              <a:t>(or allow arbitrary array ranges)</a:t>
+            </a:r>
+            <a:endParaRPr lang="en-US" dirty="0"/>
+          </a:p>
+          <a:p>
+            <a:r>
+              <a:rPr lang="en-US" dirty="0"/>
+              <a:t>Why does C count 0,1,2…?</a:t>
+            </a:r>
+          </a:p>
+          <a:p>
+            <a:r>
+              <a:rPr lang="en-US" dirty="0"/>
+              <a:t>Why do C strings end in </a:t>
+            </a:r>
+            <a:r>
+              <a:rPr lang="en-US" b="1" dirty="0"/>
+              <a:t>\0</a:t>
+            </a:r>
+            <a:r>
+              <a:rPr lang="en-US" dirty="0"/>
+              <a:t> ?</a:t>
+            </a:r>
+          </a:p>
+          <a:p>
+            <a:r>
+              <a:rPr lang="en-US" dirty="0"/>
+              <a:t>Why does C have an increment operator (</a:t>
+            </a:r>
+            <a:r>
+              <a:rPr lang="en-US" b="1" dirty="0" err="1"/>
+              <a:t>i</a:t>
+            </a:r>
+            <a:r>
+              <a:rPr lang="en-US" b="1" dirty="0"/>
+              <a:t>++</a:t>
+            </a:r>
+            <a:r>
+              <a:rPr lang="en-US" dirty="0"/>
+              <a:t>)?</a:t>
+            </a:r>
+          </a:p>
+          <a:p>
+            <a:r>
+              <a:rPr lang="en-US" dirty="0"/>
+              <a:t>Why does C have the ternary operator? (</a:t>
+            </a:r>
+            <a:r>
+              <a:rPr lang="en-US" b="1" dirty="0"/>
+              <a:t>x = x&lt;y ? x : y</a:t>
+            </a:r>
+            <a:r>
+              <a:rPr lang="en-US" dirty="0"/>
+              <a:t>)</a:t>
+            </a:r>
+          </a:p>
+        </p:txBody>
+      </p:sp>
+      <p:sp>
+        <p:nvSpPr>
+          <p:cNvPr id="4" name="Footer Placeholder 3"/>
+          <p:cNvSpPr>
+            <a:spLocks noGrp="1"/>
+          </p:cNvSpPr>
+          <p:nvPr>
+            <p:ph type="ftr" sz="quarter" idx="11"/>
+          </p:nvPr>
+        </p:nvSpPr>
+        <p:spPr/>
+        <p:txBody>
+          <a:bodyPr/>
+          <a:lstStyle/>
+          <a:p>
+            <a:r>
+              <a:rPr lang="en-US"/>
+              <a:t>Programming at the Hardware/Software Interface</a:t>
+            </a:r>
+            <a:endParaRPr lang="en-US" dirty="0"/>
+          </a:p>
+        </p:txBody>
+      </p:sp>
+      <p:sp>
+        <p:nvSpPr>
+          <p:cNvPr id="5" name="Slide Number Placeholder 4"/>
+          <p:cNvSpPr>
+            <a:spLocks noGrp="1"/>
+          </p:cNvSpPr>
+          <p:nvPr>
+            <p:ph type="sldNum" sz="quarter" idx="12"/>
+          </p:nvPr>
+        </p:nvSpPr>
+        <p:spPr/>
+        <p:txBody>
+          <a:bodyPr/>
+          <a:lstStyle/>
+          <a:p>
+            <a:fld id="{B30C84D9-7A41-4FEB-892B-80917372DB87}" type="slidenum">
+              <a:rPr lang="en-US" smtClean="0"/>
+              <a:t>9</a:t>
+            </a:fld>
+            <a:endParaRPr lang="en-US"/>
+          </a:p>
+        </p:txBody>
+      </p:sp>
+      <p:sp>
+        <p:nvSpPr>
+          <p:cNvPr id="9" name="Text Placeholder 8"/>
+          <p:cNvSpPr>
+            <a:spLocks noGrp="1"/>
+          </p:cNvSpPr>
+          <p:nvPr>
+            <p:ph type="body" sz="quarter" idx="13"/>
+          </p:nvPr>
+        </p:nvSpPr>
+        <p:spPr/>
+        <p:txBody>
+          <a:bodyPr/>
+          <a:lstStyle/>
+          <a:p>
+            <a:r>
+              <a:rPr lang="en-US" dirty="0"/>
+              <a:t>Slide by Bohn</a:t>
+            </a:r>
+          </a:p>
+        </p:txBody>
+      </p:sp>
+    </p:spTree>
+    <p:extLst>
+      <p:ext uri="{BB962C8B-B14F-4D97-AF65-F5344CB8AC3E}">
+        <p14:creationId xmlns:p14="http://schemas.microsoft.com/office/powerpoint/2010/main" val="1737821417"/>
+      </p:ext>
+    </p:extLst>
+  </p:cSld>
+  <p:clrMapOvr>
+    <a:masterClrMapping/>
+  </p:clrMapOvr>
+  <p:timing>
+    <p:tnLst>
+      <p:par>
+        <p:cTn id="1" dur="indefinite" restart="never" nodeType="tmRoot">
+          <p:childTnLst>
+            <p:seq concurrent="1" nextAc="seek">
+              <p:cTn id="2" dur="indefinite" nodeType="mainSeq">
+                <p:childTnLst>
+                  <p:par>
+                    <p:cTn id="3" fill="hold">
+                      <p:stCondLst>
+                        <p:cond delay="indefinite"/>
+                      </p:stCondLst>
+                      <p:childTnLst>
+                        <p:par>
+                          <p:cTn id="4" fill="hold">
+                            <p:stCondLst>
+                              <p:cond delay="0"/>
+                            </p:stCondLst>
+                            <p:childTnLst>
+                              <p:par>
+                                <p:cTn id="5" presetID="10" presetClass="entr" presetSubtype="0" fill="hold" grpId="0" nodeType="clickEffect">
+                                  <p:stCondLst>
+                                    <p:cond delay="0"/>
+                                  </p:stCondLst>
+                                  <p:childTnLst>
+                                    <p:set>
+                                      <p:cBhvr>
+                                        <p:cTn id="6" dur="1" fill="hold">
+                                          <p:stCondLst>
+                                            <p:cond delay="0"/>
+                                          </p:stCondLst>
+                                        </p:cTn>
+                                        <p:tgtEl>
+                                          <p:spTgt spid="8">
+                                            <p:txEl>
+                                              <p:pRg st="0" end="0"/>
+                                            </p:txEl>
+                                          </p:spTgt>
+                                        </p:tgtEl>
+                                        <p:attrNameLst>
+                                          <p:attrName>style.visibility</p:attrName>
+                                        </p:attrNameLst>
+                                      </p:cBhvr>
+                                      <p:to>
+                                        <p:strVal val="visible"/>
+                                      </p:to>
+                                    </p:set>
+                                    <p:animEffect transition="in" filter="fade">
+                                      <p:cBhvr>
+                                        <p:cTn id="7" dur="500"/>
+                                        <p:tgtEl>
+                                          <p:spTgt spid="8">
+                                            <p:txEl>
+                                              <p:pRg st="0" end="0"/>
+                                            </p:txEl>
+                                          </p:spTgt>
+                                        </p:tgtEl>
+                                      </p:cBhvr>
+                                    </p:animEffect>
+                                  </p:childTnLst>
+                                </p:cTn>
+                              </p:par>
+                              <p:par>
+                                <p:cTn id="8" presetID="10" presetClass="entr" presetSubtype="0" fill="hold" grpId="0" nodeType="withEffect">
+                                  <p:stCondLst>
+                                    <p:cond delay="0"/>
+                                  </p:stCondLst>
+                                  <p:childTnLst>
+                                    <p:set>
+                                      <p:cBhvr>
+                                        <p:cTn id="9" dur="1" fill="hold">
+                                          <p:stCondLst>
+                                            <p:cond delay="0"/>
+                                          </p:stCondLst>
+                                        </p:cTn>
+                                        <p:tgtEl>
+                                          <p:spTgt spid="8">
+                                            <p:txEl>
+                                              <p:pRg st="1" end="1"/>
+                                            </p:txEl>
+                                          </p:spTgt>
+                                        </p:tgtEl>
+                                        <p:attrNameLst>
+                                          <p:attrName>style.visibility</p:attrName>
+                                        </p:attrNameLst>
+                                      </p:cBhvr>
+                                      <p:to>
+                                        <p:strVal val="visible"/>
+                                      </p:to>
+                                    </p:set>
+                                    <p:animEffect transition="in" filter="fade">
+                                      <p:cBhvr>
+                                        <p:cTn id="10" dur="500"/>
+                                        <p:tgtEl>
+                                          <p:spTgt spid="8">
+                                            <p:txEl>
+                                              <p:pRg st="1" end="1"/>
+                                            </p:txEl>
+                                          </p:spTgt>
+                                        </p:tgtEl>
+                                      </p:cBhvr>
+                                    </p:animEffect>
+                                  </p:childTnLst>
+                                </p:cTn>
+                              </p:par>
+                            </p:childTnLst>
+                          </p:cTn>
+                        </p:par>
+                      </p:childTnLst>
+                    </p:cTn>
+                  </p:par>
+                  <p:par>
+                    <p:cTn id="11" fill="hold">
+                      <p:stCondLst>
+                        <p:cond delay="indefinite"/>
+                      </p:stCondLst>
+                      <p:childTnLst>
+                        <p:par>
+                          <p:cTn id="12" fill="hold">
+                            <p:stCondLst>
+                              <p:cond delay="0"/>
+                            </p:stCondLst>
+                            <p:childTnLst>
+                              <p:par>
+                                <p:cTn id="13" presetID="10" presetClass="entr" presetSubtype="0" fill="hold" grpId="0" nodeType="clickEffect">
+                                  <p:stCondLst>
+                                    <p:cond delay="0"/>
+                                  </p:stCondLst>
+                                  <p:childTnLst>
+                                    <p:set>
+                                      <p:cBhvr>
+                                        <p:cTn id="14" dur="1" fill="hold">
+                                          <p:stCondLst>
+                                            <p:cond delay="0"/>
+                                          </p:stCondLst>
+                                        </p:cTn>
+                                        <p:tgtEl>
+                                          <p:spTgt spid="8">
+                                            <p:txEl>
+                                              <p:pRg st="2" end="2"/>
+                                            </p:txEl>
+                                          </p:spTgt>
+                                        </p:tgtEl>
+                                        <p:attrNameLst>
+                                          <p:attrName>style.visibility</p:attrName>
+                                        </p:attrNameLst>
+                                      </p:cBhvr>
+                                      <p:to>
+                                        <p:strVal val="visible"/>
+                                      </p:to>
+                                    </p:set>
+                                    <p:animEffect transition="in" filter="fade">
+                                      <p:cBhvr>
+                                        <p:cTn id="15" dur="500"/>
+                                        <p:tgtEl>
+                                          <p:spTgt spid="8">
+                                            <p:txEl>
+                                              <p:pRg st="2" end="2"/>
+                                            </p:txEl>
+                                          </p:spTgt>
+                                        </p:tgtEl>
+                                      </p:cBhvr>
+                                    </p:animEffect>
+                                  </p:childTnLst>
+                                </p:cTn>
+                              </p:par>
+                            </p:childTnLst>
+                          </p:cTn>
+                        </p:par>
+                      </p:childTnLst>
+                    </p:cTn>
+                  </p:par>
+                  <p:par>
+                    <p:cTn id="16" fill="hold">
+                      <p:stCondLst>
+                        <p:cond delay="indefinite"/>
+                      </p:stCondLst>
+                      <p:childTnLst>
+                        <p:par>
+                          <p:cTn id="17" fill="hold">
+                            <p:stCondLst>
+                              <p:cond delay="0"/>
+                            </p:stCondLst>
+                            <p:childTnLst>
+                              <p:par>
+                                <p:cTn id="18" presetID="10" presetClass="entr" presetSubtype="0" fill="hold" grpId="0" nodeType="clickEffect">
+                                  <p:stCondLst>
+                                    <p:cond delay="0"/>
+                                  </p:stCondLst>
+                                  <p:childTnLst>
+                                    <p:set>
+                                      <p:cBhvr>
+                                        <p:cTn id="19" dur="1" fill="hold">
+                                          <p:stCondLst>
+                                            <p:cond delay="0"/>
+                                          </p:stCondLst>
+                                        </p:cTn>
+                                        <p:tgtEl>
+                                          <p:spTgt spid="8">
+                                            <p:txEl>
+                                              <p:pRg st="3" end="3"/>
+                                            </p:txEl>
+                                          </p:spTgt>
+                                        </p:tgtEl>
+                                        <p:attrNameLst>
+                                          <p:attrName>style.visibility</p:attrName>
+                                        </p:attrNameLst>
+                                      </p:cBhvr>
+                                      <p:to>
+                                        <p:strVal val="visible"/>
+                                      </p:to>
+                                    </p:set>
+                                    <p:animEffect transition="in" filter="fade">
+                                      <p:cBhvr>
+                                        <p:cTn id="20" dur="500"/>
+                                        <p:tgtEl>
+                                          <p:spTgt spid="8">
+                                            <p:txEl>
+                                              <p:pRg st="3" end="3"/>
+                                            </p:txEl>
+                                          </p:spTgt>
+                                        </p:tgtEl>
+                                      </p:cBhvr>
+                                    </p:animEffect>
+                                  </p:childTnLst>
+                                </p:cTn>
+                              </p:par>
+                            </p:childTnLst>
+                          </p:cTn>
+                        </p:par>
+                      </p:childTnLst>
+                    </p:cTn>
+                  </p:par>
+                  <p:par>
+                    <p:cTn id="21" fill="hold">
+                      <p:stCondLst>
+                        <p:cond delay="indefinite"/>
+                      </p:stCondLst>
+                      <p:childTnLst>
+                        <p:par>
+                          <p:cTn id="22" fill="hold">
+                            <p:stCondLst>
+                              <p:cond delay="0"/>
+                            </p:stCondLst>
+                            <p:childTnLst>
+                              <p:par>
+                                <p:cTn id="23" presetID="10" presetClass="entr" presetSubtype="0" fill="hold" grpId="0" nodeType="clickEffect">
+                                  <p:stCondLst>
+                                    <p:cond delay="0"/>
+                                  </p:stCondLst>
+                                  <p:childTnLst>
+                                    <p:set>
+                                      <p:cBhvr>
+                                        <p:cTn id="24" dur="1" fill="hold">
+                                          <p:stCondLst>
+                                            <p:cond delay="0"/>
+                                          </p:stCondLst>
+                                        </p:cTn>
+                                        <p:tgtEl>
+                                          <p:spTgt spid="8">
+                                            <p:txEl>
+                                              <p:pRg st="4" end="4"/>
+                                            </p:txEl>
+                                          </p:spTgt>
+                                        </p:tgtEl>
+                                        <p:attrNameLst>
+                                          <p:attrName>style.visibility</p:attrName>
+                                        </p:attrNameLst>
+                                      </p:cBhvr>
+                                      <p:to>
+                                        <p:strVal val="visible"/>
+                                      </p:to>
+                                    </p:set>
+                                    <p:animEffect transition="in" filter="fade">
+                                      <p:cBhvr>
+                                        <p:cTn id="25" dur="500"/>
+                                        <p:tgtEl>
+                                          <p:spTgt spid="8">
+                                            <p:txEl>
+                                              <p:pRg st="4" end="4"/>
+                                            </p:txEl>
+                                          </p:spTgt>
+                                        </p:tgtEl>
+                                      </p:cBhvr>
+                                    </p:animEffect>
+                                  </p:childTnLst>
+                                </p:cTn>
+                              </p:par>
+                            </p:childTnLst>
+                          </p:cTn>
+                        </p:par>
+                      </p:childTnLst>
+                    </p:cTn>
+                  </p:par>
+                </p:childTnLst>
+              </p:cTn>
+              <p:prevCondLst>
+                <p:cond evt="onPrev" delay="0">
+                  <p:tgtEl>
+                    <p:sldTgt/>
+                  </p:tgtEl>
+                </p:cond>
+              </p:prevCondLst>
+              <p:nextCondLst>
+                <p:cond evt="onNext" delay="0">
+                  <p:tgtEl>
+                    <p:sldTgt/>
+                  </p:tgtEl>
+                </p:cond>
+              </p:nextCondLst>
+            </p:seq>
+          </p:childTnLst>
+        </p:cTn>
+      </p:par>
+    </p:tnLst>
+    <p:bldLst>
+      <p:bldP spid="8" grpId="0" build="p"/>
     </p:bldLst>
   </p:timing>
 </p:sld>

</xml_diff>

<commit_message>
added worked examples for chapter 5 and part of chapter 6
</commit_message>
<xml_diff>
--- a/chap01.pptx
+++ b/chap01.pptx
@@ -5,26 +5,27 @@
     <p:sldMasterId id="2147483648" r:id="rId1"/>
   </p:sldMasterIdLst>
   <p:notesMasterIdLst>
-    <p:notesMasterId r:id="rId19"/>
+    <p:notesMasterId r:id="rId20"/>
   </p:notesMasterIdLst>
   <p:sldIdLst>
     <p:sldId id="256" r:id="rId2"/>
     <p:sldId id="301" r:id="rId3"/>
     <p:sldId id="303" r:id="rId4"/>
-    <p:sldId id="258" r:id="rId5"/>
-    <p:sldId id="259" r:id="rId6"/>
-    <p:sldId id="260" r:id="rId7"/>
-    <p:sldId id="261" r:id="rId8"/>
-    <p:sldId id="262" r:id="rId9"/>
-    <p:sldId id="263" r:id="rId10"/>
-    <p:sldId id="264" r:id="rId11"/>
-    <p:sldId id="266" r:id="rId12"/>
-    <p:sldId id="265" r:id="rId13"/>
-    <p:sldId id="267" r:id="rId14"/>
-    <p:sldId id="268" r:id="rId15"/>
-    <p:sldId id="269" r:id="rId16"/>
-    <p:sldId id="271" r:id="rId17"/>
-    <p:sldId id="302" r:id="rId18"/>
+    <p:sldId id="304" r:id="rId5"/>
+    <p:sldId id="258" r:id="rId6"/>
+    <p:sldId id="259" r:id="rId7"/>
+    <p:sldId id="260" r:id="rId8"/>
+    <p:sldId id="261" r:id="rId9"/>
+    <p:sldId id="262" r:id="rId10"/>
+    <p:sldId id="263" r:id="rId11"/>
+    <p:sldId id="264" r:id="rId12"/>
+    <p:sldId id="266" r:id="rId13"/>
+    <p:sldId id="265" r:id="rId14"/>
+    <p:sldId id="267" r:id="rId15"/>
+    <p:sldId id="268" r:id="rId16"/>
+    <p:sldId id="269" r:id="rId17"/>
+    <p:sldId id="271" r:id="rId18"/>
+    <p:sldId id="302" r:id="rId19"/>
   </p:sldIdLst>
   <p:sldSz cx="12192000" cy="6858000"/>
   <p:notesSz cx="6858000" cy="9144000"/>
@@ -213,7 +214,7 @@
           <a:p>
             <a:fld id="{F22450E9-715D-42D8-9747-C0402EEB663B}" type="datetimeFigureOut">
               <a:rPr lang="en-US" smtClean="0"/>
-              <a:t>8/23/22</a:t>
+              <a:t>9/30/22</a:t>
             </a:fld>
             <a:endParaRPr lang="en-US"/>
           </a:p>
@@ -548,7 +549,7 @@
           <a:p>
             <a:fld id="{B451C161-4068-4B77-B93E-241C90510927}" type="slidenum">
               <a:rPr lang="en-US" smtClean="0"/>
-              <a:t>16</a:t>
+              <a:t>17</a:t>
             </a:fld>
             <a:endParaRPr lang="en-US"/>
           </a:p>
@@ -818,7 +819,7 @@
           <a:p>
             <a:fld id="{085D2B30-53B0-FF44-AD2E-D4C00B5F0D07}" type="datetime1">
               <a:rPr lang="en-US" smtClean="0"/>
-              <a:t>8/23/22</a:t>
+              <a:t>9/30/22</a:t>
             </a:fld>
             <a:endParaRPr lang="en-US"/>
           </a:p>
@@ -990,7 +991,7 @@
           <a:p>
             <a:fld id="{D9BC79DF-1E81-8E43-818F-0368D173919E}" type="datetime1">
               <a:rPr lang="en-US" smtClean="0"/>
-              <a:t>8/23/22</a:t>
+              <a:t>9/30/22</a:t>
             </a:fld>
             <a:endParaRPr lang="en-US"/>
           </a:p>
@@ -1254,7 +1255,7 @@
           <a:p>
             <a:fld id="{26F2BF60-4963-D247-82AD-5F0039621502}" type="datetime1">
               <a:rPr lang="en-US" smtClean="0"/>
-              <a:t>8/23/22</a:t>
+              <a:t>9/30/22</a:t>
             </a:fld>
             <a:endParaRPr lang="en-US"/>
           </a:p>
@@ -1651,7 +1652,7 @@
           <a:p>
             <a:fld id="{892056E5-B551-3347-86B6-60A1CDFCD73F}" type="datetime1">
               <a:rPr lang="en-US" smtClean="0"/>
-              <a:t>8/23/22</a:t>
+              <a:t>9/30/22</a:t>
             </a:fld>
             <a:endParaRPr lang="en-US"/>
           </a:p>
@@ -2070,7 +2071,7 @@
           <a:p>
             <a:fld id="{0EB98D53-3742-E34B-BFE8-2899DEF3906D}" type="datetime1">
               <a:rPr lang="en-US" smtClean="0"/>
-              <a:t>8/23/22</a:t>
+              <a:t>9/30/22</a:t>
             </a:fld>
             <a:endParaRPr lang="en-US"/>
           </a:p>
@@ -2242,7 +2243,7 @@
           <a:p>
             <a:fld id="{D7741631-EBCE-024F-9D78-CF06A260D182}" type="datetime1">
               <a:rPr lang="en-US" smtClean="0"/>
-              <a:t>8/23/22</a:t>
+              <a:t>9/30/22</a:t>
             </a:fld>
             <a:endParaRPr lang="en-US"/>
           </a:p>
@@ -2392,7 +2393,7 @@
           <a:p>
             <a:fld id="{27BB9E86-5687-1A40-8327-458B60AB9A4C}" type="datetime1">
               <a:rPr lang="en-US" smtClean="0"/>
-              <a:t>8/23/22</a:t>
+              <a:t>9/30/22</a:t>
             </a:fld>
             <a:endParaRPr lang="en-US"/>
           </a:p>
@@ -2722,7 +2723,7 @@
           <a:p>
             <a:fld id="{035049FA-2FE8-F14F-A250-6231AACB4152}" type="datetime1">
               <a:rPr lang="en-US" smtClean="0"/>
-              <a:t>8/23/22</a:t>
+              <a:t>9/30/22</a:t>
             </a:fld>
             <a:endParaRPr lang="en-US"/>
           </a:p>
@@ -3029,7 +3030,7 @@
           <a:p>
             <a:fld id="{CABEF1DE-0106-6945-9FDC-9F265DADF1B8}" type="datetime1">
               <a:rPr lang="en-US" smtClean="0"/>
-              <a:t>8/23/22</a:t>
+              <a:t>9/30/22</a:t>
             </a:fld>
             <a:endParaRPr lang="en-US"/>
           </a:p>
@@ -3484,7 +3485,7 @@
           <a:p>
             <a:fld id="{490BEB36-C871-9444-8A7B-5727C7452DEF}" type="datetime1">
               <a:rPr lang="en-US" smtClean="0"/>
-              <a:t>8/23/22</a:t>
+              <a:t>9/30/22</a:t>
             </a:fld>
             <a:endParaRPr lang="en-US"/>
           </a:p>
@@ -4067,6 +4068,571 @@
           </a:p>
           <a:p>
             <a:r>
+              <a:rPr lang="en-US" dirty="0"/>
+              <a:t>Assembly language</a:t>
+            </a:r>
+          </a:p>
+        </p:txBody>
+      </p:sp>
+      <p:sp>
+        <p:nvSpPr>
+          <p:cNvPr id="8" name="Content Placeholder 7"/>
+          <p:cNvSpPr>
+            <a:spLocks noGrp="1"/>
+          </p:cNvSpPr>
+          <p:nvPr>
+            <p:ph sz="half" idx="2"/>
+          </p:nvPr>
+        </p:nvSpPr>
+        <p:spPr/>
+        <p:txBody>
+          <a:bodyPr>
+            <a:normAutofit/>
+          </a:bodyPr>
+          <a:lstStyle/>
+          <a:p>
+            <a:r>
+              <a:rPr lang="en-US" dirty="0"/>
+              <a:t>ALGOL, BASIC, COBOL, FORTRAN, Pascal, and PL/I</a:t>
+            </a:r>
+            <a:br>
+              <a:rPr lang="en-US" dirty="0"/>
+            </a:br>
+            <a:r>
+              <a:rPr lang="en-US" dirty="0"/>
+              <a:t>count 1,2,3…</a:t>
+            </a:r>
+            <a:br>
+              <a:rPr lang="en-US" dirty="0"/>
+            </a:br>
+            <a:r>
+              <a:rPr lang="en-US" sz="2000" dirty="0"/>
+              <a:t>(or allow arbitrary array ranges)</a:t>
+            </a:r>
+            <a:endParaRPr lang="en-US" dirty="0"/>
+          </a:p>
+          <a:p>
+            <a:r>
+              <a:rPr lang="en-US" dirty="0"/>
+              <a:t>Why does C count 0,1,2…?</a:t>
+            </a:r>
+          </a:p>
+          <a:p>
+            <a:r>
+              <a:rPr lang="en-US" dirty="0"/>
+              <a:t>Why do C strings end in </a:t>
+            </a:r>
+            <a:r>
+              <a:rPr lang="en-US" b="1" dirty="0"/>
+              <a:t>\0</a:t>
+            </a:r>
+            <a:r>
+              <a:rPr lang="en-US" dirty="0"/>
+              <a:t> ?</a:t>
+            </a:r>
+          </a:p>
+          <a:p>
+            <a:r>
+              <a:rPr lang="en-US" dirty="0"/>
+              <a:t>Why does C have an increment operator (</a:t>
+            </a:r>
+            <a:r>
+              <a:rPr lang="en-US" b="1" dirty="0" err="1"/>
+              <a:t>i</a:t>
+            </a:r>
+            <a:r>
+              <a:rPr lang="en-US" b="1" dirty="0"/>
+              <a:t>++</a:t>
+            </a:r>
+            <a:r>
+              <a:rPr lang="en-US" dirty="0"/>
+              <a:t>)?</a:t>
+            </a:r>
+          </a:p>
+          <a:p>
+            <a:r>
+              <a:rPr lang="en-US" dirty="0"/>
+              <a:t>Why does C have the ternary operator? (</a:t>
+            </a:r>
+            <a:r>
+              <a:rPr lang="en-US" b="1" dirty="0"/>
+              <a:t>x = x&lt;y ? x : y</a:t>
+            </a:r>
+            <a:r>
+              <a:rPr lang="en-US" dirty="0"/>
+              <a:t>)</a:t>
+            </a:r>
+          </a:p>
+        </p:txBody>
+      </p:sp>
+      <p:sp>
+        <p:nvSpPr>
+          <p:cNvPr id="4" name="Footer Placeholder 3"/>
+          <p:cNvSpPr>
+            <a:spLocks noGrp="1"/>
+          </p:cNvSpPr>
+          <p:nvPr>
+            <p:ph type="ftr" sz="quarter" idx="11"/>
+          </p:nvPr>
+        </p:nvSpPr>
+        <p:spPr/>
+        <p:txBody>
+          <a:bodyPr/>
+          <a:lstStyle/>
+          <a:p>
+            <a:r>
+              <a:rPr lang="en-US"/>
+              <a:t>Programming at the Hardware/Software Interface</a:t>
+            </a:r>
+            <a:endParaRPr lang="en-US" dirty="0"/>
+          </a:p>
+        </p:txBody>
+      </p:sp>
+      <p:sp>
+        <p:nvSpPr>
+          <p:cNvPr id="5" name="Slide Number Placeholder 4"/>
+          <p:cNvSpPr>
+            <a:spLocks noGrp="1"/>
+          </p:cNvSpPr>
+          <p:nvPr>
+            <p:ph type="sldNum" sz="quarter" idx="12"/>
+          </p:nvPr>
+        </p:nvSpPr>
+        <p:spPr/>
+        <p:txBody>
+          <a:bodyPr/>
+          <a:lstStyle/>
+          <a:p>
+            <a:fld id="{B30C84D9-7A41-4FEB-892B-80917372DB87}" type="slidenum">
+              <a:rPr lang="en-US" smtClean="0"/>
+              <a:t>10</a:t>
+            </a:fld>
+            <a:endParaRPr lang="en-US"/>
+          </a:p>
+        </p:txBody>
+      </p:sp>
+      <p:sp>
+        <p:nvSpPr>
+          <p:cNvPr id="9" name="Text Placeholder 8"/>
+          <p:cNvSpPr>
+            <a:spLocks noGrp="1"/>
+          </p:cNvSpPr>
+          <p:nvPr>
+            <p:ph type="body" sz="quarter" idx="13"/>
+          </p:nvPr>
+        </p:nvSpPr>
+        <p:spPr/>
+        <p:txBody>
+          <a:bodyPr/>
+          <a:lstStyle/>
+          <a:p>
+            <a:r>
+              <a:rPr lang="en-US" dirty="0"/>
+              <a:t>Slide by Bohn</a:t>
+            </a:r>
+          </a:p>
+        </p:txBody>
+      </p:sp>
+    </p:spTree>
+    <p:extLst>
+      <p:ext uri="{BB962C8B-B14F-4D97-AF65-F5344CB8AC3E}">
+        <p14:creationId xmlns:p14="http://schemas.microsoft.com/office/powerpoint/2010/main" val="1737821417"/>
+      </p:ext>
+    </p:extLst>
+  </p:cSld>
+  <p:clrMapOvr>
+    <a:masterClrMapping/>
+  </p:clrMapOvr>
+  <p:timing>
+    <p:tnLst>
+      <p:par>
+        <p:cTn id="1" dur="indefinite" restart="never" nodeType="tmRoot">
+          <p:childTnLst>
+            <p:seq concurrent="1" nextAc="seek">
+              <p:cTn id="2" dur="indefinite" nodeType="mainSeq">
+                <p:childTnLst>
+                  <p:par>
+                    <p:cTn id="3" fill="hold">
+                      <p:stCondLst>
+                        <p:cond delay="indefinite"/>
+                      </p:stCondLst>
+                      <p:childTnLst>
+                        <p:par>
+                          <p:cTn id="4" fill="hold">
+                            <p:stCondLst>
+                              <p:cond delay="0"/>
+                            </p:stCondLst>
+                            <p:childTnLst>
+                              <p:par>
+                                <p:cTn id="5" presetID="10" presetClass="entr" presetSubtype="0" fill="hold" grpId="0" nodeType="clickEffect">
+                                  <p:stCondLst>
+                                    <p:cond delay="0"/>
+                                  </p:stCondLst>
+                                  <p:childTnLst>
+                                    <p:set>
+                                      <p:cBhvr>
+                                        <p:cTn id="6" dur="1" fill="hold">
+                                          <p:stCondLst>
+                                            <p:cond delay="0"/>
+                                          </p:stCondLst>
+                                        </p:cTn>
+                                        <p:tgtEl>
+                                          <p:spTgt spid="8">
+                                            <p:txEl>
+                                              <p:pRg st="0" end="0"/>
+                                            </p:txEl>
+                                          </p:spTgt>
+                                        </p:tgtEl>
+                                        <p:attrNameLst>
+                                          <p:attrName>style.visibility</p:attrName>
+                                        </p:attrNameLst>
+                                      </p:cBhvr>
+                                      <p:to>
+                                        <p:strVal val="visible"/>
+                                      </p:to>
+                                    </p:set>
+                                    <p:animEffect transition="in" filter="fade">
+                                      <p:cBhvr>
+                                        <p:cTn id="7" dur="500"/>
+                                        <p:tgtEl>
+                                          <p:spTgt spid="8">
+                                            <p:txEl>
+                                              <p:pRg st="0" end="0"/>
+                                            </p:txEl>
+                                          </p:spTgt>
+                                        </p:tgtEl>
+                                      </p:cBhvr>
+                                    </p:animEffect>
+                                  </p:childTnLst>
+                                </p:cTn>
+                              </p:par>
+                              <p:par>
+                                <p:cTn id="8" presetID="10" presetClass="entr" presetSubtype="0" fill="hold" grpId="0" nodeType="withEffect">
+                                  <p:stCondLst>
+                                    <p:cond delay="0"/>
+                                  </p:stCondLst>
+                                  <p:childTnLst>
+                                    <p:set>
+                                      <p:cBhvr>
+                                        <p:cTn id="9" dur="1" fill="hold">
+                                          <p:stCondLst>
+                                            <p:cond delay="0"/>
+                                          </p:stCondLst>
+                                        </p:cTn>
+                                        <p:tgtEl>
+                                          <p:spTgt spid="8">
+                                            <p:txEl>
+                                              <p:pRg st="1" end="1"/>
+                                            </p:txEl>
+                                          </p:spTgt>
+                                        </p:tgtEl>
+                                        <p:attrNameLst>
+                                          <p:attrName>style.visibility</p:attrName>
+                                        </p:attrNameLst>
+                                      </p:cBhvr>
+                                      <p:to>
+                                        <p:strVal val="visible"/>
+                                      </p:to>
+                                    </p:set>
+                                    <p:animEffect transition="in" filter="fade">
+                                      <p:cBhvr>
+                                        <p:cTn id="10" dur="500"/>
+                                        <p:tgtEl>
+                                          <p:spTgt spid="8">
+                                            <p:txEl>
+                                              <p:pRg st="1" end="1"/>
+                                            </p:txEl>
+                                          </p:spTgt>
+                                        </p:tgtEl>
+                                      </p:cBhvr>
+                                    </p:animEffect>
+                                  </p:childTnLst>
+                                </p:cTn>
+                              </p:par>
+                            </p:childTnLst>
+                          </p:cTn>
+                        </p:par>
+                      </p:childTnLst>
+                    </p:cTn>
+                  </p:par>
+                  <p:par>
+                    <p:cTn id="11" fill="hold">
+                      <p:stCondLst>
+                        <p:cond delay="indefinite"/>
+                      </p:stCondLst>
+                      <p:childTnLst>
+                        <p:par>
+                          <p:cTn id="12" fill="hold">
+                            <p:stCondLst>
+                              <p:cond delay="0"/>
+                            </p:stCondLst>
+                            <p:childTnLst>
+                              <p:par>
+                                <p:cTn id="13" presetID="10" presetClass="entr" presetSubtype="0" fill="hold" grpId="0" nodeType="clickEffect">
+                                  <p:stCondLst>
+                                    <p:cond delay="0"/>
+                                  </p:stCondLst>
+                                  <p:childTnLst>
+                                    <p:set>
+                                      <p:cBhvr>
+                                        <p:cTn id="14" dur="1" fill="hold">
+                                          <p:stCondLst>
+                                            <p:cond delay="0"/>
+                                          </p:stCondLst>
+                                        </p:cTn>
+                                        <p:tgtEl>
+                                          <p:spTgt spid="8">
+                                            <p:txEl>
+                                              <p:pRg st="2" end="2"/>
+                                            </p:txEl>
+                                          </p:spTgt>
+                                        </p:tgtEl>
+                                        <p:attrNameLst>
+                                          <p:attrName>style.visibility</p:attrName>
+                                        </p:attrNameLst>
+                                      </p:cBhvr>
+                                      <p:to>
+                                        <p:strVal val="visible"/>
+                                      </p:to>
+                                    </p:set>
+                                    <p:animEffect transition="in" filter="fade">
+                                      <p:cBhvr>
+                                        <p:cTn id="15" dur="500"/>
+                                        <p:tgtEl>
+                                          <p:spTgt spid="8">
+                                            <p:txEl>
+                                              <p:pRg st="2" end="2"/>
+                                            </p:txEl>
+                                          </p:spTgt>
+                                        </p:tgtEl>
+                                      </p:cBhvr>
+                                    </p:animEffect>
+                                  </p:childTnLst>
+                                </p:cTn>
+                              </p:par>
+                            </p:childTnLst>
+                          </p:cTn>
+                        </p:par>
+                      </p:childTnLst>
+                    </p:cTn>
+                  </p:par>
+                  <p:par>
+                    <p:cTn id="16" fill="hold">
+                      <p:stCondLst>
+                        <p:cond delay="indefinite"/>
+                      </p:stCondLst>
+                      <p:childTnLst>
+                        <p:par>
+                          <p:cTn id="17" fill="hold">
+                            <p:stCondLst>
+                              <p:cond delay="0"/>
+                            </p:stCondLst>
+                            <p:childTnLst>
+                              <p:par>
+                                <p:cTn id="18" presetID="10" presetClass="entr" presetSubtype="0" fill="hold" grpId="0" nodeType="clickEffect">
+                                  <p:stCondLst>
+                                    <p:cond delay="0"/>
+                                  </p:stCondLst>
+                                  <p:childTnLst>
+                                    <p:set>
+                                      <p:cBhvr>
+                                        <p:cTn id="19" dur="1" fill="hold">
+                                          <p:stCondLst>
+                                            <p:cond delay="0"/>
+                                          </p:stCondLst>
+                                        </p:cTn>
+                                        <p:tgtEl>
+                                          <p:spTgt spid="8">
+                                            <p:txEl>
+                                              <p:pRg st="3" end="3"/>
+                                            </p:txEl>
+                                          </p:spTgt>
+                                        </p:tgtEl>
+                                        <p:attrNameLst>
+                                          <p:attrName>style.visibility</p:attrName>
+                                        </p:attrNameLst>
+                                      </p:cBhvr>
+                                      <p:to>
+                                        <p:strVal val="visible"/>
+                                      </p:to>
+                                    </p:set>
+                                    <p:animEffect transition="in" filter="fade">
+                                      <p:cBhvr>
+                                        <p:cTn id="20" dur="500"/>
+                                        <p:tgtEl>
+                                          <p:spTgt spid="8">
+                                            <p:txEl>
+                                              <p:pRg st="3" end="3"/>
+                                            </p:txEl>
+                                          </p:spTgt>
+                                        </p:tgtEl>
+                                      </p:cBhvr>
+                                    </p:animEffect>
+                                  </p:childTnLst>
+                                </p:cTn>
+                              </p:par>
+                            </p:childTnLst>
+                          </p:cTn>
+                        </p:par>
+                      </p:childTnLst>
+                    </p:cTn>
+                  </p:par>
+                  <p:par>
+                    <p:cTn id="21" fill="hold">
+                      <p:stCondLst>
+                        <p:cond delay="indefinite"/>
+                      </p:stCondLst>
+                      <p:childTnLst>
+                        <p:par>
+                          <p:cTn id="22" fill="hold">
+                            <p:stCondLst>
+                              <p:cond delay="0"/>
+                            </p:stCondLst>
+                            <p:childTnLst>
+                              <p:par>
+                                <p:cTn id="23" presetID="10" presetClass="entr" presetSubtype="0" fill="hold" grpId="0" nodeType="clickEffect">
+                                  <p:stCondLst>
+                                    <p:cond delay="0"/>
+                                  </p:stCondLst>
+                                  <p:childTnLst>
+                                    <p:set>
+                                      <p:cBhvr>
+                                        <p:cTn id="24" dur="1" fill="hold">
+                                          <p:stCondLst>
+                                            <p:cond delay="0"/>
+                                          </p:stCondLst>
+                                        </p:cTn>
+                                        <p:tgtEl>
+                                          <p:spTgt spid="8">
+                                            <p:txEl>
+                                              <p:pRg st="4" end="4"/>
+                                            </p:txEl>
+                                          </p:spTgt>
+                                        </p:tgtEl>
+                                        <p:attrNameLst>
+                                          <p:attrName>style.visibility</p:attrName>
+                                        </p:attrNameLst>
+                                      </p:cBhvr>
+                                      <p:to>
+                                        <p:strVal val="visible"/>
+                                      </p:to>
+                                    </p:set>
+                                    <p:animEffect transition="in" filter="fade">
+                                      <p:cBhvr>
+                                        <p:cTn id="25" dur="500"/>
+                                        <p:tgtEl>
+                                          <p:spTgt spid="8">
+                                            <p:txEl>
+                                              <p:pRg st="4" end="4"/>
+                                            </p:txEl>
+                                          </p:spTgt>
+                                        </p:tgtEl>
+                                      </p:cBhvr>
+                                    </p:animEffect>
+                                  </p:childTnLst>
+                                </p:cTn>
+                              </p:par>
+                            </p:childTnLst>
+                          </p:cTn>
+                        </p:par>
+                      </p:childTnLst>
+                    </p:cTn>
+                  </p:par>
+                </p:childTnLst>
+              </p:cTn>
+              <p:prevCondLst>
+                <p:cond evt="onPrev" delay="0">
+                  <p:tgtEl>
+                    <p:sldTgt/>
+                  </p:tgtEl>
+                </p:cond>
+              </p:prevCondLst>
+              <p:nextCondLst>
+                <p:cond evt="onNext" delay="0">
+                  <p:tgtEl>
+                    <p:sldTgt/>
+                  </p:tgtEl>
+                </p:cond>
+              </p:nextCondLst>
+            </p:seq>
+          </p:childTnLst>
+        </p:cTn>
+      </p:par>
+    </p:tnLst>
+    <p:bldLst>
+      <p:bldP spid="8" grpId="0" build="p"/>
+    </p:bldLst>
+  </p:timing>
+</p:sld>
+</file>
+
+<file path=ppt/slides/slide11.xml><?xml version="1.0" encoding="utf-8"?>
+<p:sld xmlns:a="http://schemas.openxmlformats.org/drawingml/2006/main" xmlns:r="http://schemas.openxmlformats.org/officeDocument/2006/relationships" xmlns:p="http://schemas.openxmlformats.org/presentationml/2006/main">
+  <p:cSld>
+    <p:spTree>
+      <p:nvGrpSpPr>
+        <p:cNvPr id="1" name=""/>
+        <p:cNvGrpSpPr/>
+        <p:nvPr/>
+      </p:nvGrpSpPr>
+      <p:grpSpPr>
+        <a:xfrm>
+          <a:off x="0" y="0"/>
+          <a:ext cx="0" cy="0"/>
+          <a:chOff x="0" y="0"/>
+          <a:chExt cx="0" cy="0"/>
+        </a:xfrm>
+      </p:grpSpPr>
+      <p:sp>
+        <p:nvSpPr>
+          <p:cNvPr id="2" name="Title 1"/>
+          <p:cNvSpPr>
+            <a:spLocks noGrp="1"/>
+          </p:cNvSpPr>
+          <p:nvPr>
+            <p:ph type="title"/>
+          </p:nvPr>
+        </p:nvSpPr>
+        <p:spPr/>
+        <p:txBody>
+          <a:bodyPr/>
+          <a:lstStyle/>
+          <a:p>
+            <a:r>
+              <a:rPr lang="en-US" dirty="0"/>
+              <a:t>Planned lessons</a:t>
+            </a:r>
+          </a:p>
+        </p:txBody>
+      </p:sp>
+      <p:sp>
+        <p:nvSpPr>
+          <p:cNvPr id="7" name="Content Placeholder 6"/>
+          <p:cNvSpPr>
+            <a:spLocks noGrp="1"/>
+          </p:cNvSpPr>
+          <p:nvPr>
+            <p:ph sz="half" idx="1"/>
+          </p:nvPr>
+        </p:nvSpPr>
+        <p:spPr/>
+        <p:txBody>
+          <a:bodyPr/>
+          <a:lstStyle/>
+          <a:p>
+            <a:r>
+              <a:rPr lang="en-US" dirty="0">
+                <a:solidFill>
+                  <a:schemeClr val="bg1">
+                    <a:lumMod val="65000"/>
+                  </a:schemeClr>
+                </a:solidFill>
+              </a:rPr>
+              <a:t>Data representation &amp; arithmetic</a:t>
+            </a:r>
+          </a:p>
+          <a:p>
+            <a:r>
               <a:rPr lang="en-US" dirty="0">
                 <a:solidFill>
                   <a:schemeClr val="bg1">
@@ -4161,7 +4727,7 @@
           <a:p>
             <a:fld id="{B30C84D9-7A41-4FEB-892B-80917372DB87}" type="slidenum">
               <a:rPr lang="en-US" smtClean="0"/>
-              <a:t>10</a:t>
+              <a:t>11</a:t>
             </a:fld>
             <a:endParaRPr lang="en-US"/>
           </a:p>
@@ -4293,7 +4859,7 @@
 </p:sld>
 </file>
 
-<file path=ppt/slides/slide11.xml><?xml version="1.0" encoding="utf-8"?>
+<file path=ppt/slides/slide12.xml><?xml version="1.0" encoding="utf-8"?>
 <p:sld xmlns:a="http://schemas.openxmlformats.org/drawingml/2006/main" xmlns:r="http://schemas.openxmlformats.org/officeDocument/2006/relationships" xmlns:p="http://schemas.openxmlformats.org/presentationml/2006/main">
   <p:cSld>
     <p:spTree>
@@ -4462,7 +5028,7 @@
           <a:p>
             <a:fld id="{B30C84D9-7A41-4FEB-892B-80917372DB87}" type="slidenum">
               <a:rPr lang="en-US" smtClean="0"/>
-              <a:t>11</a:t>
+              <a:t>12</a:t>
             </a:fld>
             <a:endParaRPr lang="en-US"/>
           </a:p>
@@ -5102,7 +5668,7 @@
 </p:sld>
 </file>
 
-<file path=ppt/slides/slide12.xml><?xml version="1.0" encoding="utf-8"?>
+<file path=ppt/slides/slide13.xml><?xml version="1.0" encoding="utf-8"?>
 <p:sld xmlns:a="http://schemas.openxmlformats.org/drawingml/2006/main" xmlns:r="http://schemas.openxmlformats.org/officeDocument/2006/relationships" xmlns:p="http://schemas.openxmlformats.org/presentationml/2006/main">
   <p:cSld>
     <p:spTree>
@@ -5311,7 +5877,7 @@
           <a:p>
             <a:fld id="{B30C84D9-7A41-4FEB-892B-80917372DB87}" type="slidenum">
               <a:rPr lang="en-US" smtClean="0"/>
-              <a:t>12</a:t>
+              <a:t>13</a:t>
             </a:fld>
             <a:endParaRPr lang="en-US"/>
           </a:p>
@@ -5593,7 +6159,7 @@
 </p:sld>
 </file>
 
-<file path=ppt/slides/slide13.xml><?xml version="1.0" encoding="utf-8"?>
+<file path=ppt/slides/slide14.xml><?xml version="1.0" encoding="utf-8"?>
 <p:sld xmlns:a="http://schemas.openxmlformats.org/drawingml/2006/main" xmlns:r="http://schemas.openxmlformats.org/officeDocument/2006/relationships" xmlns:p="http://schemas.openxmlformats.org/presentationml/2006/main">
   <p:cSld>
     <p:spTree>
@@ -5811,7 +6377,7 @@
           <a:p>
             <a:fld id="{B30C84D9-7A41-4FEB-892B-80917372DB87}" type="slidenum">
               <a:rPr lang="en-US" smtClean="0"/>
-              <a:t>13</a:t>
+              <a:t>14</a:t>
             </a:fld>
             <a:endParaRPr lang="en-US"/>
           </a:p>
@@ -6161,7 +6727,7 @@
 </p:sld>
 </file>
 
-<file path=ppt/slides/slide14.xml><?xml version="1.0" encoding="utf-8"?>
+<file path=ppt/slides/slide15.xml><?xml version="1.0" encoding="utf-8"?>
 <p:sld xmlns:a="http://schemas.openxmlformats.org/drawingml/2006/main" xmlns:r="http://schemas.openxmlformats.org/officeDocument/2006/relationships" xmlns:p="http://schemas.openxmlformats.org/presentationml/2006/main">
   <p:cSld>
     <p:spTree>
@@ -6803,7 +7369,7 @@
           <a:p>
             <a:fld id="{B30C84D9-7A41-4FEB-892B-80917372DB87}" type="slidenum">
               <a:rPr lang="en-US" smtClean="0"/>
-              <a:t>14</a:t>
+              <a:t>15</a:t>
             </a:fld>
             <a:endParaRPr lang="en-US"/>
           </a:p>
@@ -7368,7 +7934,7 @@
 </p:sld>
 </file>
 
-<file path=ppt/slides/slide15.xml><?xml version="1.0" encoding="utf-8"?>
+<file path=ppt/slides/slide16.xml><?xml version="1.0" encoding="utf-8"?>
 <p:sld xmlns:a="http://schemas.openxmlformats.org/drawingml/2006/main" xmlns:r="http://schemas.openxmlformats.org/officeDocument/2006/relationships" xmlns:p="http://schemas.openxmlformats.org/presentationml/2006/main">
   <p:cSld>
     <p:spTree>
@@ -7610,7 +8176,7 @@
           <a:p>
             <a:fld id="{B30C84D9-7A41-4FEB-892B-80917372DB87}" type="slidenum">
               <a:rPr lang="en-US" smtClean="0"/>
-              <a:t>15</a:t>
+              <a:t>16</a:t>
             </a:fld>
             <a:endParaRPr lang="en-US"/>
           </a:p>
@@ -7849,238 +8415,6 @@
 </p:sld>
 </file>
 
-<file path=ppt/slides/slide16.xml><?xml version="1.0" encoding="utf-8"?>
-<p:sld xmlns:a="http://schemas.openxmlformats.org/drawingml/2006/main" xmlns:r="http://schemas.openxmlformats.org/officeDocument/2006/relationships" xmlns:p="http://schemas.openxmlformats.org/presentationml/2006/main">
-  <p:cSld>
-    <p:spTree>
-      <p:nvGrpSpPr>
-        <p:cNvPr id="1" name=""/>
-        <p:cNvGrpSpPr/>
-        <p:nvPr/>
-      </p:nvGrpSpPr>
-      <p:grpSpPr>
-        <a:xfrm>
-          <a:off x="0" y="0"/>
-          <a:ext cx="0" cy="0"/>
-          <a:chOff x="0" y="0"/>
-          <a:chExt cx="0" cy="0"/>
-        </a:xfrm>
-      </p:grpSpPr>
-      <p:sp>
-        <p:nvSpPr>
-          <p:cNvPr id="32771" name="Rectangle 3"/>
-          <p:cNvSpPr>
-            <a:spLocks noGrp="1" noChangeArrowheads="1"/>
-          </p:cNvSpPr>
-          <p:nvPr>
-            <p:ph type="title"/>
-          </p:nvPr>
-        </p:nvSpPr>
-        <p:spPr>
-          <a:ln/>
-        </p:spPr>
-        <p:txBody>
-          <a:bodyPr/>
-          <a:lstStyle/>
-          <a:p>
-            <a:pPr marL="119063" indent="-119063"/>
-            <a:r>
-              <a:rPr lang="en-US"/>
-              <a:t>Course Components</a:t>
-            </a:r>
-          </a:p>
-        </p:txBody>
-      </p:sp>
-      <p:sp>
-        <p:nvSpPr>
-          <p:cNvPr id="32772" name="Rectangle 4"/>
-          <p:cNvSpPr>
-            <a:spLocks noGrp="1" noChangeArrowheads="1"/>
-          </p:cNvSpPr>
-          <p:nvPr>
-            <p:ph idx="1"/>
-          </p:nvPr>
-        </p:nvSpPr>
-        <p:spPr>
-          <a:ln/>
-        </p:spPr>
-        <p:txBody>
-          <a:bodyPr>
-            <a:normAutofit fontScale="92500" lnSpcReduction="10000"/>
-          </a:bodyPr>
-          <a:lstStyle/>
-          <a:p>
-            <a:r>
-              <a:rPr lang="en-US" dirty="0"/>
-              <a:t>Lectures</a:t>
-            </a:r>
-          </a:p>
-          <a:p>
-            <a:pPr marL="552450" lvl="1"/>
-            <a:r>
-              <a:rPr lang="en-US" dirty="0"/>
-              <a:t>Higher level concepts</a:t>
-            </a:r>
-          </a:p>
-          <a:p>
-            <a:r>
-              <a:rPr lang="en-US" dirty="0"/>
-              <a:t>Recitations</a:t>
-            </a:r>
-          </a:p>
-          <a:p>
-            <a:pPr marL="552450" lvl="1"/>
-            <a:r>
-              <a:rPr lang="en-US" dirty="0"/>
-              <a:t>Applied concepts, important tools and skills for labs, clarification of lectures, exam coverage</a:t>
-            </a:r>
-          </a:p>
-          <a:p>
-            <a:r>
-              <a:rPr lang="en-US" dirty="0"/>
-              <a:t>Labs</a:t>
-            </a:r>
-          </a:p>
-          <a:p>
-            <a:pPr marL="552450" lvl="1"/>
-            <a:r>
-              <a:rPr lang="en-US" dirty="0"/>
-              <a:t>The heart of the course</a:t>
-            </a:r>
-          </a:p>
-          <a:p>
-            <a:pPr marL="552450" lvl="1"/>
-            <a:r>
-              <a:rPr lang="en-US" dirty="0"/>
-              <a:t>1-2 weeks each</a:t>
-            </a:r>
-          </a:p>
-          <a:p>
-            <a:pPr marL="552450" lvl="1"/>
-            <a:r>
-              <a:rPr lang="en-US" dirty="0"/>
-              <a:t>Provide in-depth understanding of an aspect of systems programming and debugging</a:t>
-            </a:r>
-          </a:p>
-          <a:p>
-            <a:r>
-              <a:rPr lang="en-US" dirty="0"/>
-              <a:t>Homework and Exams</a:t>
-            </a:r>
-          </a:p>
-          <a:p>
-            <a:pPr marL="552450" lvl="1"/>
-            <a:r>
-              <a:rPr lang="en-US" dirty="0"/>
-              <a:t>Test your understanding of concepts &amp; key principles</a:t>
-            </a:r>
-          </a:p>
-          <a:p>
-            <a:pPr marL="952500" lvl="2"/>
-            <a:r>
-              <a:rPr lang="en-US" dirty="0"/>
-              <a:t>Two midterms and one final</a:t>
-            </a:r>
-          </a:p>
-          <a:p>
-            <a:pPr marL="552450" lvl="1"/>
-            <a:endParaRPr lang="en-US" dirty="0"/>
-          </a:p>
-        </p:txBody>
-      </p:sp>
-      <p:sp>
-        <p:nvSpPr>
-          <p:cNvPr id="2" name="Text Placeholder 1"/>
-          <p:cNvSpPr>
-            <a:spLocks noGrp="1"/>
-          </p:cNvSpPr>
-          <p:nvPr>
-            <p:ph type="body" sz="quarter" idx="13"/>
-          </p:nvPr>
-        </p:nvSpPr>
-        <p:spPr/>
-        <p:txBody>
-          <a:bodyPr/>
-          <a:lstStyle/>
-          <a:p>
-            <a:r>
-              <a:rPr lang="en-US" dirty="0"/>
-              <a:t>Slide by Bohn</a:t>
-            </a:r>
-          </a:p>
-        </p:txBody>
-      </p:sp>
-      <p:sp>
-        <p:nvSpPr>
-          <p:cNvPr id="3" name="Footer Placeholder 2">
-            <a:extLst>
-              <a:ext uri="{FF2B5EF4-FFF2-40B4-BE49-F238E27FC236}">
-                <a16:creationId xmlns:a16="http://schemas.microsoft.com/office/drawing/2014/main" id="{E4207D7D-6FAA-AF43-A6FD-1F43A468A142}"/>
-              </a:ext>
-            </a:extLst>
-          </p:cNvPr>
-          <p:cNvSpPr>
-            <a:spLocks noGrp="1"/>
-          </p:cNvSpPr>
-          <p:nvPr>
-            <p:ph type="ftr" sz="quarter" idx="11"/>
-          </p:nvPr>
-        </p:nvSpPr>
-        <p:spPr/>
-        <p:txBody>
-          <a:bodyPr/>
-          <a:lstStyle/>
-          <a:p>
-            <a:r>
-              <a:rPr lang="en-US"/>
-              <a:t>Programming at the Hardware/Software Interface</a:t>
-            </a:r>
-            <a:endParaRPr lang="en-US" dirty="0"/>
-          </a:p>
-        </p:txBody>
-      </p:sp>
-      <p:sp>
-        <p:nvSpPr>
-          <p:cNvPr id="4" name="Slide Number Placeholder 3">
-            <a:extLst>
-              <a:ext uri="{FF2B5EF4-FFF2-40B4-BE49-F238E27FC236}">
-                <a16:creationId xmlns:a16="http://schemas.microsoft.com/office/drawing/2014/main" id="{05C38FD3-AA50-584A-BBDF-973FBFC9A44C}"/>
-              </a:ext>
-            </a:extLst>
-          </p:cNvPr>
-          <p:cNvSpPr>
-            <a:spLocks noGrp="1"/>
-          </p:cNvSpPr>
-          <p:nvPr>
-            <p:ph type="sldNum" sz="quarter" idx="12"/>
-          </p:nvPr>
-        </p:nvSpPr>
-        <p:spPr/>
-        <p:txBody>
-          <a:bodyPr/>
-          <a:lstStyle/>
-          <a:p>
-            <a:fld id="{B30C84D9-7A41-4FEB-892B-80917372DB87}" type="slidenum">
-              <a:rPr lang="en-US" smtClean="0"/>
-              <a:t>16</a:t>
-            </a:fld>
-            <a:endParaRPr lang="en-US"/>
-          </a:p>
-        </p:txBody>
-      </p:sp>
-    </p:spTree>
-    <p:extLst>
-      <p:ext uri="{BB962C8B-B14F-4D97-AF65-F5344CB8AC3E}">
-        <p14:creationId xmlns:p14="http://schemas.microsoft.com/office/powerpoint/2010/main" val="2523484820"/>
-      </p:ext>
-    </p:extLst>
-  </p:cSld>
-  <p:clrMapOvr>
-    <a:masterClrMapping/>
-  </p:clrMapOvr>
-</p:sld>
-</file>
-
 <file path=ppt/slides/slide17.xml><?xml version="1.0" encoding="utf-8"?>
 <p:sld xmlns:a="http://schemas.openxmlformats.org/drawingml/2006/main" xmlns:r="http://schemas.openxmlformats.org/officeDocument/2006/relationships" xmlns:p="http://schemas.openxmlformats.org/presentationml/2006/main">
   <p:cSld>
@@ -8100,6 +8434,238 @@
       </p:grpSpPr>
       <p:sp>
         <p:nvSpPr>
+          <p:cNvPr id="32771" name="Rectangle 3"/>
+          <p:cNvSpPr>
+            <a:spLocks noGrp="1" noChangeArrowheads="1"/>
+          </p:cNvSpPr>
+          <p:nvPr>
+            <p:ph type="title"/>
+          </p:nvPr>
+        </p:nvSpPr>
+        <p:spPr>
+          <a:ln/>
+        </p:spPr>
+        <p:txBody>
+          <a:bodyPr/>
+          <a:lstStyle/>
+          <a:p>
+            <a:pPr marL="119063" indent="-119063"/>
+            <a:r>
+              <a:rPr lang="en-US"/>
+              <a:t>Course Components</a:t>
+            </a:r>
+          </a:p>
+        </p:txBody>
+      </p:sp>
+      <p:sp>
+        <p:nvSpPr>
+          <p:cNvPr id="32772" name="Rectangle 4"/>
+          <p:cNvSpPr>
+            <a:spLocks noGrp="1" noChangeArrowheads="1"/>
+          </p:cNvSpPr>
+          <p:nvPr>
+            <p:ph idx="1"/>
+          </p:nvPr>
+        </p:nvSpPr>
+        <p:spPr>
+          <a:ln/>
+        </p:spPr>
+        <p:txBody>
+          <a:bodyPr>
+            <a:normAutofit fontScale="92500" lnSpcReduction="10000"/>
+          </a:bodyPr>
+          <a:lstStyle/>
+          <a:p>
+            <a:r>
+              <a:rPr lang="en-US" dirty="0"/>
+              <a:t>Lectures</a:t>
+            </a:r>
+          </a:p>
+          <a:p>
+            <a:pPr marL="552450" lvl="1"/>
+            <a:r>
+              <a:rPr lang="en-US" dirty="0"/>
+              <a:t>Higher level concepts</a:t>
+            </a:r>
+          </a:p>
+          <a:p>
+            <a:r>
+              <a:rPr lang="en-US" dirty="0"/>
+              <a:t>Recitations</a:t>
+            </a:r>
+          </a:p>
+          <a:p>
+            <a:pPr marL="552450" lvl="1"/>
+            <a:r>
+              <a:rPr lang="en-US" dirty="0"/>
+              <a:t>Applied concepts, important tools and skills for labs, clarification of lectures, exam coverage</a:t>
+            </a:r>
+          </a:p>
+          <a:p>
+            <a:r>
+              <a:rPr lang="en-US" dirty="0"/>
+              <a:t>Labs</a:t>
+            </a:r>
+          </a:p>
+          <a:p>
+            <a:pPr marL="552450" lvl="1"/>
+            <a:r>
+              <a:rPr lang="en-US" dirty="0"/>
+              <a:t>The heart of the course</a:t>
+            </a:r>
+          </a:p>
+          <a:p>
+            <a:pPr marL="552450" lvl="1"/>
+            <a:r>
+              <a:rPr lang="en-US" dirty="0"/>
+              <a:t>1-2 weeks each</a:t>
+            </a:r>
+          </a:p>
+          <a:p>
+            <a:pPr marL="552450" lvl="1"/>
+            <a:r>
+              <a:rPr lang="en-US" dirty="0"/>
+              <a:t>Provide in-depth understanding of an aspect of systems programming and debugging</a:t>
+            </a:r>
+          </a:p>
+          <a:p>
+            <a:r>
+              <a:rPr lang="en-US" dirty="0"/>
+              <a:t>Homework and Exams</a:t>
+            </a:r>
+          </a:p>
+          <a:p>
+            <a:pPr marL="552450" lvl="1"/>
+            <a:r>
+              <a:rPr lang="en-US" dirty="0"/>
+              <a:t>Test your understanding of concepts &amp; key principles</a:t>
+            </a:r>
+          </a:p>
+          <a:p>
+            <a:pPr marL="952500" lvl="2"/>
+            <a:r>
+              <a:rPr lang="en-US" dirty="0"/>
+              <a:t>Two midterms and one final</a:t>
+            </a:r>
+          </a:p>
+          <a:p>
+            <a:pPr marL="552450" lvl="1"/>
+            <a:endParaRPr lang="en-US" dirty="0"/>
+          </a:p>
+        </p:txBody>
+      </p:sp>
+      <p:sp>
+        <p:nvSpPr>
+          <p:cNvPr id="2" name="Text Placeholder 1"/>
+          <p:cNvSpPr>
+            <a:spLocks noGrp="1"/>
+          </p:cNvSpPr>
+          <p:nvPr>
+            <p:ph type="body" sz="quarter" idx="13"/>
+          </p:nvPr>
+        </p:nvSpPr>
+        <p:spPr/>
+        <p:txBody>
+          <a:bodyPr/>
+          <a:lstStyle/>
+          <a:p>
+            <a:r>
+              <a:rPr lang="en-US" dirty="0"/>
+              <a:t>Slide by Bohn</a:t>
+            </a:r>
+          </a:p>
+        </p:txBody>
+      </p:sp>
+      <p:sp>
+        <p:nvSpPr>
+          <p:cNvPr id="3" name="Footer Placeholder 2">
+            <a:extLst>
+              <a:ext uri="{FF2B5EF4-FFF2-40B4-BE49-F238E27FC236}">
+                <a16:creationId xmlns:a16="http://schemas.microsoft.com/office/drawing/2014/main" id="{E4207D7D-6FAA-AF43-A6FD-1F43A468A142}"/>
+              </a:ext>
+            </a:extLst>
+          </p:cNvPr>
+          <p:cNvSpPr>
+            <a:spLocks noGrp="1"/>
+          </p:cNvSpPr>
+          <p:nvPr>
+            <p:ph type="ftr" sz="quarter" idx="11"/>
+          </p:nvPr>
+        </p:nvSpPr>
+        <p:spPr/>
+        <p:txBody>
+          <a:bodyPr/>
+          <a:lstStyle/>
+          <a:p>
+            <a:r>
+              <a:rPr lang="en-US"/>
+              <a:t>Programming at the Hardware/Software Interface</a:t>
+            </a:r>
+            <a:endParaRPr lang="en-US" dirty="0"/>
+          </a:p>
+        </p:txBody>
+      </p:sp>
+      <p:sp>
+        <p:nvSpPr>
+          <p:cNvPr id="4" name="Slide Number Placeholder 3">
+            <a:extLst>
+              <a:ext uri="{FF2B5EF4-FFF2-40B4-BE49-F238E27FC236}">
+                <a16:creationId xmlns:a16="http://schemas.microsoft.com/office/drawing/2014/main" id="{05C38FD3-AA50-584A-BBDF-973FBFC9A44C}"/>
+              </a:ext>
+            </a:extLst>
+          </p:cNvPr>
+          <p:cNvSpPr>
+            <a:spLocks noGrp="1"/>
+          </p:cNvSpPr>
+          <p:nvPr>
+            <p:ph type="sldNum" sz="quarter" idx="12"/>
+          </p:nvPr>
+        </p:nvSpPr>
+        <p:spPr/>
+        <p:txBody>
+          <a:bodyPr/>
+          <a:lstStyle/>
+          <a:p>
+            <a:fld id="{B30C84D9-7A41-4FEB-892B-80917372DB87}" type="slidenum">
+              <a:rPr lang="en-US" smtClean="0"/>
+              <a:t>17</a:t>
+            </a:fld>
+            <a:endParaRPr lang="en-US"/>
+          </a:p>
+        </p:txBody>
+      </p:sp>
+    </p:spTree>
+    <p:extLst>
+      <p:ext uri="{BB962C8B-B14F-4D97-AF65-F5344CB8AC3E}">
+        <p14:creationId xmlns:p14="http://schemas.microsoft.com/office/powerpoint/2010/main" val="2523484820"/>
+      </p:ext>
+    </p:extLst>
+  </p:cSld>
+  <p:clrMapOvr>
+    <a:masterClrMapping/>
+  </p:clrMapOvr>
+</p:sld>
+</file>
+
+<file path=ppt/slides/slide18.xml><?xml version="1.0" encoding="utf-8"?>
+<p:sld xmlns:a="http://schemas.openxmlformats.org/drawingml/2006/main" xmlns:r="http://schemas.openxmlformats.org/officeDocument/2006/relationships" xmlns:p="http://schemas.openxmlformats.org/presentationml/2006/main">
+  <p:cSld>
+    <p:spTree>
+      <p:nvGrpSpPr>
+        <p:cNvPr id="1" name=""/>
+        <p:cNvGrpSpPr/>
+        <p:nvPr/>
+      </p:nvGrpSpPr>
+      <p:grpSpPr>
+        <a:xfrm>
+          <a:off x="0" y="0"/>
+          <a:ext cx="0" cy="0"/>
+          <a:chOff x="0" y="0"/>
+          <a:chExt cx="0" cy="0"/>
+        </a:xfrm>
+      </p:grpSpPr>
+      <p:sp>
+        <p:nvSpPr>
           <p:cNvPr id="2" name="Title 1">
             <a:extLst>
               <a:ext uri="{FF2B5EF4-FFF2-40B4-BE49-F238E27FC236}">
@@ -8224,7 +8790,7 @@
           <a:p>
             <a:fld id="{B30C84D9-7A41-4FEB-892B-80917372DB87}" type="slidenum">
               <a:rPr lang="en-US" smtClean="0"/>
-              <a:t>17</a:t>
+              <a:t>18</a:t>
             </a:fld>
             <a:endParaRPr lang="en-US"/>
           </a:p>
@@ -8869,7 +9435,13 @@
       </p:grpSpPr>
       <p:sp>
         <p:nvSpPr>
-          <p:cNvPr id="2" name="Title 1"/>
+          <p:cNvPr id="8" name="Title 7">
+            <a:extLst>
+              <a:ext uri="{FF2B5EF4-FFF2-40B4-BE49-F238E27FC236}">
+                <a16:creationId xmlns:a16="http://schemas.microsoft.com/office/drawing/2014/main" id="{7D1DC6DC-2784-8541-AF1D-7586AA985A77}"/>
+              </a:ext>
+            </a:extLst>
+          </p:cNvPr>
           <p:cNvSpPr>
             <a:spLocks noGrp="1"/>
           </p:cNvSpPr>
@@ -8884,14 +9456,91 @@
           <a:p>
             <a:r>
               <a:rPr lang="en-US" dirty="0"/>
-              <a:t>Why are you taking this course?</a:t>
-            </a:r>
-          </a:p>
-        </p:txBody>
-      </p:sp>
-      <p:sp>
-        <p:nvSpPr>
-          <p:cNvPr id="4" name="Footer Placeholder 3"/>
+              <a:t>Before Copying Code</a:t>
+            </a:r>
+            <a:br>
+              <a:rPr lang="en-US" dirty="0"/>
+            </a:br>
+            <a:r>
+              <a:rPr lang="en-US" dirty="0"/>
+              <a:t>from Someone Else or the Internet</a:t>
+            </a:r>
+          </a:p>
+        </p:txBody>
+      </p:sp>
+      <p:sp>
+        <p:nvSpPr>
+          <p:cNvPr id="9" name="Content Placeholder 8">
+            <a:extLst>
+              <a:ext uri="{FF2B5EF4-FFF2-40B4-BE49-F238E27FC236}">
+                <a16:creationId xmlns:a16="http://schemas.microsoft.com/office/drawing/2014/main" id="{F0311056-E350-234B-9E75-5CBCCE51E7E6}"/>
+              </a:ext>
+            </a:extLst>
+          </p:cNvPr>
+          <p:cNvSpPr>
+            <a:spLocks noGrp="1"/>
+          </p:cNvSpPr>
+          <p:nvPr>
+            <p:ph idx="1"/>
+          </p:nvPr>
+        </p:nvSpPr>
+        <p:spPr/>
+        <p:txBody>
+          <a:bodyPr/>
+          <a:lstStyle/>
+          <a:p>
+            <a:pPr marL="0" indent="0">
+              <a:buNone/>
+            </a:pPr>
+            <a:r>
+              <a:rPr lang="en-US" dirty="0"/>
+              <a:t>You should assume that:</a:t>
+            </a:r>
+          </a:p>
+          <a:p>
+            <a:endParaRPr lang="en-US" dirty="0"/>
+          </a:p>
+          <a:p>
+            <a:r>
+              <a:rPr lang="en-US" dirty="0"/>
+              <a:t>I have all of the submissions from students who previously took this course</a:t>
+            </a:r>
+          </a:p>
+          <a:p>
+            <a:r>
+              <a:rPr lang="en-US" dirty="0"/>
+              <a:t>I know which websites most students go to when they copy code for these assignments</a:t>
+            </a:r>
+          </a:p>
+          <a:p>
+            <a:r>
+              <a:rPr lang="en-US" dirty="0"/>
+              <a:t>Chegg will rat you out</a:t>
+            </a:r>
+          </a:p>
+          <a:p>
+            <a:endParaRPr lang="en-US" dirty="0"/>
+          </a:p>
+          <a:p>
+            <a:pPr marL="0" indent="0">
+              <a:buNone/>
+            </a:pPr>
+            <a:r>
+              <a:rPr lang="en-US" dirty="0"/>
+              <a:t>These are all true!</a:t>
+            </a:r>
+          </a:p>
+        </p:txBody>
+      </p:sp>
+      <p:sp>
+        <p:nvSpPr>
+          <p:cNvPr id="5" name="Footer Placeholder 4">
+            <a:extLst>
+              <a:ext uri="{FF2B5EF4-FFF2-40B4-BE49-F238E27FC236}">
+                <a16:creationId xmlns:a16="http://schemas.microsoft.com/office/drawing/2014/main" id="{AECABF7E-C358-8B43-8BBF-7B5570EF476F}"/>
+              </a:ext>
+            </a:extLst>
+          </p:cNvPr>
           <p:cNvSpPr>
             <a:spLocks noGrp="1"/>
           </p:cNvSpPr>
@@ -8914,7 +9563,13 @@
       </p:sp>
       <p:sp>
         <p:nvSpPr>
-          <p:cNvPr id="5" name="Slide Number Placeholder 4"/>
+          <p:cNvPr id="6" name="Slide Number Placeholder 5">
+            <a:extLst>
+              <a:ext uri="{FF2B5EF4-FFF2-40B4-BE49-F238E27FC236}">
+                <a16:creationId xmlns:a16="http://schemas.microsoft.com/office/drawing/2014/main" id="{3493CFBF-F92C-434D-8D13-4470505DB459}"/>
+              </a:ext>
+            </a:extLst>
+          </p:cNvPr>
           <p:cNvSpPr>
             <a:spLocks noGrp="1"/>
           </p:cNvSpPr>
@@ -8930,6 +9585,132 @@
             <a:fld id="{B30C84D9-7A41-4FEB-892B-80917372DB87}" type="slidenum">
               <a:rPr lang="en-US" smtClean="0"/>
               <a:t>4</a:t>
+            </a:fld>
+            <a:endParaRPr lang="en-US"/>
+          </a:p>
+        </p:txBody>
+      </p:sp>
+      <p:sp>
+        <p:nvSpPr>
+          <p:cNvPr id="7" name="Text Placeholder 6">
+            <a:extLst>
+              <a:ext uri="{FF2B5EF4-FFF2-40B4-BE49-F238E27FC236}">
+                <a16:creationId xmlns:a16="http://schemas.microsoft.com/office/drawing/2014/main" id="{55002C55-4F0E-7D43-A8CE-3DBDC7636302}"/>
+              </a:ext>
+            </a:extLst>
+          </p:cNvPr>
+          <p:cNvSpPr>
+            <a:spLocks noGrp="1"/>
+          </p:cNvSpPr>
+          <p:nvPr>
+            <p:ph type="body" sz="quarter" idx="13"/>
+          </p:nvPr>
+        </p:nvSpPr>
+        <p:spPr/>
+        <p:txBody>
+          <a:bodyPr/>
+          <a:lstStyle/>
+          <a:p>
+            <a:r>
+              <a:rPr lang="en-US" dirty="0"/>
+              <a:t>Slide by Bohn</a:t>
+            </a:r>
+          </a:p>
+        </p:txBody>
+      </p:sp>
+    </p:spTree>
+    <p:extLst>
+      <p:ext uri="{BB962C8B-B14F-4D97-AF65-F5344CB8AC3E}">
+        <p14:creationId xmlns:p14="http://schemas.microsoft.com/office/powerpoint/2010/main" val="707115394"/>
+      </p:ext>
+    </p:extLst>
+  </p:cSld>
+  <p:clrMapOvr>
+    <a:masterClrMapping/>
+  </p:clrMapOvr>
+</p:sld>
+</file>
+
+<file path=ppt/slides/slide5.xml><?xml version="1.0" encoding="utf-8"?>
+<p:sld xmlns:a="http://schemas.openxmlformats.org/drawingml/2006/main" xmlns:r="http://schemas.openxmlformats.org/officeDocument/2006/relationships" xmlns:p="http://schemas.openxmlformats.org/presentationml/2006/main">
+  <p:cSld>
+    <p:spTree>
+      <p:nvGrpSpPr>
+        <p:cNvPr id="1" name=""/>
+        <p:cNvGrpSpPr/>
+        <p:nvPr/>
+      </p:nvGrpSpPr>
+      <p:grpSpPr>
+        <a:xfrm>
+          <a:off x="0" y="0"/>
+          <a:ext cx="0" cy="0"/>
+          <a:chOff x="0" y="0"/>
+          <a:chExt cx="0" cy="0"/>
+        </a:xfrm>
+      </p:grpSpPr>
+      <p:sp>
+        <p:nvSpPr>
+          <p:cNvPr id="2" name="Title 1"/>
+          <p:cNvSpPr>
+            <a:spLocks noGrp="1"/>
+          </p:cNvSpPr>
+          <p:nvPr>
+            <p:ph type="title"/>
+          </p:nvPr>
+        </p:nvSpPr>
+        <p:spPr/>
+        <p:txBody>
+          <a:bodyPr/>
+          <a:lstStyle/>
+          <a:p>
+            <a:r>
+              <a:rPr lang="en-US" dirty="0"/>
+              <a:t>Why are you taking this course?</a:t>
+            </a:r>
+          </a:p>
+        </p:txBody>
+      </p:sp>
+      <p:sp>
+        <p:nvSpPr>
+          <p:cNvPr id="4" name="Footer Placeholder 3"/>
+          <p:cNvSpPr>
+            <a:spLocks noGrp="1"/>
+          </p:cNvSpPr>
+          <p:nvPr>
+            <p:ph type="ftr" sz="quarter" idx="11"/>
+          </p:nvPr>
+        </p:nvSpPr>
+        <p:spPr/>
+        <p:txBody>
+          <a:bodyPr/>
+          <a:lstStyle/>
+          <a:p>
+            <a:r>
+              <a:rPr lang="en-US"/>
+              <a:t>Programming at the Hardware/Software Interface</a:t>
+            </a:r>
+            <a:endParaRPr lang="en-US" dirty="0"/>
+          </a:p>
+        </p:txBody>
+      </p:sp>
+      <p:sp>
+        <p:nvSpPr>
+          <p:cNvPr id="5" name="Slide Number Placeholder 4"/>
+          <p:cNvSpPr>
+            <a:spLocks noGrp="1"/>
+          </p:cNvSpPr>
+          <p:nvPr>
+            <p:ph type="sldNum" sz="quarter" idx="12"/>
+          </p:nvPr>
+        </p:nvSpPr>
+        <p:spPr/>
+        <p:txBody>
+          <a:bodyPr/>
+          <a:lstStyle/>
+          <a:p>
+            <a:fld id="{B30C84D9-7A41-4FEB-892B-80917372DB87}" type="slidenum">
+              <a:rPr lang="en-US" smtClean="0"/>
+              <a:t>5</a:t>
             </a:fld>
             <a:endParaRPr lang="en-US"/>
           </a:p>
@@ -9388,7 +10169,7 @@
 </p:sld>
 </file>
 
-<file path=ppt/slides/slide5.xml><?xml version="1.0" encoding="utf-8"?>
+<file path=ppt/slides/slide6.xml><?xml version="1.0" encoding="utf-8"?>
 <p:sld xmlns:a="http://schemas.openxmlformats.org/drawingml/2006/main" xmlns:r="http://schemas.openxmlformats.org/officeDocument/2006/relationships" xmlns:p="http://schemas.openxmlformats.org/presentationml/2006/main">
   <p:cSld>
     <p:spTree>
@@ -9519,7 +10300,7 @@
           <a:p>
             <a:fld id="{B30C84D9-7A41-4FEB-892B-80917372DB87}" type="slidenum">
               <a:rPr lang="en-US" smtClean="0"/>
-              <a:t>5</a:t>
+              <a:t>6</a:t>
             </a:fld>
             <a:endParaRPr lang="en-US"/>
           </a:p>
@@ -9895,7 +10676,7 @@
 </p:sld>
 </file>
 
-<file path=ppt/slides/slide6.xml><?xml version="1.0" encoding="utf-8"?>
+<file path=ppt/slides/slide7.xml><?xml version="1.0" encoding="utf-8"?>
 <p:sld xmlns:a="http://schemas.openxmlformats.org/drawingml/2006/main" xmlns:r="http://schemas.openxmlformats.org/officeDocument/2006/relationships" xmlns:p="http://schemas.openxmlformats.org/presentationml/2006/main">
   <p:cSld>
     <p:spTree>
@@ -10035,7 +10816,7 @@
           <a:p>
             <a:fld id="{B30C84D9-7A41-4FEB-892B-80917372DB87}" type="slidenum">
               <a:rPr lang="en-US" smtClean="0"/>
-              <a:t>6</a:t>
+              <a:t>7</a:t>
             </a:fld>
             <a:endParaRPr lang="en-US"/>
           </a:p>
@@ -10454,163 +11235,6 @@
 </p:sld>
 </file>
 
-<file path=ppt/slides/slide7.xml><?xml version="1.0" encoding="utf-8"?>
-<p:sld xmlns:a="http://schemas.openxmlformats.org/drawingml/2006/main" xmlns:r="http://schemas.openxmlformats.org/officeDocument/2006/relationships" xmlns:p="http://schemas.openxmlformats.org/presentationml/2006/main">
-  <p:cSld>
-    <p:spTree>
-      <p:nvGrpSpPr>
-        <p:cNvPr id="1" name=""/>
-        <p:cNvGrpSpPr/>
-        <p:nvPr/>
-      </p:nvGrpSpPr>
-      <p:grpSpPr>
-        <a:xfrm>
-          <a:off x="0" y="0"/>
-          <a:ext cx="0" cy="0"/>
-          <a:chOff x="0" y="0"/>
-          <a:chExt cx="0" cy="0"/>
-        </a:xfrm>
-      </p:grpSpPr>
-      <p:sp>
-        <p:nvSpPr>
-          <p:cNvPr id="2" name="Title 1"/>
-          <p:cNvSpPr>
-            <a:spLocks noGrp="1"/>
-          </p:cNvSpPr>
-          <p:nvPr>
-            <p:ph type="title"/>
-          </p:nvPr>
-        </p:nvSpPr>
-        <p:spPr/>
-        <p:txBody>
-          <a:bodyPr/>
-          <a:lstStyle/>
-          <a:p>
-            <a:r>
-              <a:rPr lang="en-US" dirty="0"/>
-              <a:t>Languages used in this course</a:t>
-            </a:r>
-          </a:p>
-        </p:txBody>
-      </p:sp>
-      <p:sp>
-        <p:nvSpPr>
-          <p:cNvPr id="3" name="Content Placeholder 2"/>
-          <p:cNvSpPr>
-            <a:spLocks noGrp="1"/>
-          </p:cNvSpPr>
-          <p:nvPr>
-            <p:ph idx="1"/>
-          </p:nvPr>
-        </p:nvSpPr>
-        <p:spPr/>
-        <p:txBody>
-          <a:bodyPr/>
-          <a:lstStyle/>
-          <a:p>
-            <a:r>
-              <a:rPr lang="en-US" dirty="0"/>
-              <a:t>C</a:t>
-            </a:r>
-          </a:p>
-          <a:p>
-            <a:r>
-              <a:rPr lang="en-US" dirty="0"/>
-              <a:t>Assembly (x86, ARM)</a:t>
-            </a:r>
-          </a:p>
-          <a:p>
-            <a:endParaRPr lang="en-US" dirty="0"/>
-          </a:p>
-          <a:p>
-            <a:r>
-              <a:rPr lang="en-US" dirty="0"/>
-              <a:t>Why?</a:t>
-            </a:r>
-          </a:p>
-        </p:txBody>
-      </p:sp>
-      <p:sp>
-        <p:nvSpPr>
-          <p:cNvPr id="4" name="Footer Placeholder 3"/>
-          <p:cNvSpPr>
-            <a:spLocks noGrp="1"/>
-          </p:cNvSpPr>
-          <p:nvPr>
-            <p:ph type="ftr" sz="quarter" idx="11"/>
-          </p:nvPr>
-        </p:nvSpPr>
-        <p:spPr/>
-        <p:txBody>
-          <a:bodyPr/>
-          <a:lstStyle/>
-          <a:p>
-            <a:r>
-              <a:rPr lang="en-US"/>
-              <a:t>Programming at the Hardware/Software Interface</a:t>
-            </a:r>
-            <a:endParaRPr lang="en-US" dirty="0"/>
-          </a:p>
-        </p:txBody>
-      </p:sp>
-      <p:sp>
-        <p:nvSpPr>
-          <p:cNvPr id="5" name="Slide Number Placeholder 4"/>
-          <p:cNvSpPr>
-            <a:spLocks noGrp="1"/>
-          </p:cNvSpPr>
-          <p:nvPr>
-            <p:ph type="sldNum" sz="quarter" idx="12"/>
-          </p:nvPr>
-        </p:nvSpPr>
-        <p:spPr/>
-        <p:txBody>
-          <a:bodyPr/>
-          <a:lstStyle/>
-          <a:p>
-            <a:fld id="{B30C84D9-7A41-4FEB-892B-80917372DB87}" type="slidenum">
-              <a:rPr lang="en-US" smtClean="0"/>
-              <a:t>7</a:t>
-            </a:fld>
-            <a:endParaRPr lang="en-US"/>
-          </a:p>
-        </p:txBody>
-      </p:sp>
-      <p:sp>
-        <p:nvSpPr>
-          <p:cNvPr id="6" name="Text Placeholder 5"/>
-          <p:cNvSpPr>
-            <a:spLocks noGrp="1"/>
-          </p:cNvSpPr>
-          <p:nvPr>
-            <p:ph type="body" sz="quarter" idx="13"/>
-          </p:nvPr>
-        </p:nvSpPr>
-        <p:spPr/>
-        <p:txBody>
-          <a:bodyPr/>
-          <a:lstStyle/>
-          <a:p>
-            <a:r>
-              <a:rPr lang="en-US" dirty="0"/>
-              <a:t>Slide by Bohn</a:t>
-            </a:r>
-          </a:p>
-        </p:txBody>
-      </p:sp>
-    </p:spTree>
-    <p:extLst>
-      <p:ext uri="{BB962C8B-B14F-4D97-AF65-F5344CB8AC3E}">
-        <p14:creationId xmlns:p14="http://schemas.microsoft.com/office/powerpoint/2010/main" val="3703694109"/>
-      </p:ext>
-    </p:extLst>
-  </p:cSld>
-  <p:clrMapOvr>
-    <a:masterClrMapping/>
-  </p:clrMapOvr>
-</p:sld>
-</file>
-
 <file path=ppt/slides/slide8.xml><?xml version="1.0" encoding="utf-8"?>
 <p:sld xmlns:a="http://schemas.openxmlformats.org/drawingml/2006/main" xmlns:r="http://schemas.openxmlformats.org/officeDocument/2006/relationships" xmlns:p="http://schemas.openxmlformats.org/presentationml/2006/main">
   <p:cSld>
@@ -10645,6 +11269,163 @@
           <a:p>
             <a:r>
               <a:rPr lang="en-US" dirty="0"/>
+              <a:t>Languages used in this course</a:t>
+            </a:r>
+          </a:p>
+        </p:txBody>
+      </p:sp>
+      <p:sp>
+        <p:nvSpPr>
+          <p:cNvPr id="3" name="Content Placeholder 2"/>
+          <p:cNvSpPr>
+            <a:spLocks noGrp="1"/>
+          </p:cNvSpPr>
+          <p:nvPr>
+            <p:ph idx="1"/>
+          </p:nvPr>
+        </p:nvSpPr>
+        <p:spPr/>
+        <p:txBody>
+          <a:bodyPr/>
+          <a:lstStyle/>
+          <a:p>
+            <a:r>
+              <a:rPr lang="en-US" dirty="0"/>
+              <a:t>C</a:t>
+            </a:r>
+          </a:p>
+          <a:p>
+            <a:r>
+              <a:rPr lang="en-US" dirty="0"/>
+              <a:t>Assembly (x86, ARM)</a:t>
+            </a:r>
+          </a:p>
+          <a:p>
+            <a:endParaRPr lang="en-US" dirty="0"/>
+          </a:p>
+          <a:p>
+            <a:r>
+              <a:rPr lang="en-US" dirty="0"/>
+              <a:t>Why?</a:t>
+            </a:r>
+          </a:p>
+        </p:txBody>
+      </p:sp>
+      <p:sp>
+        <p:nvSpPr>
+          <p:cNvPr id="4" name="Footer Placeholder 3"/>
+          <p:cNvSpPr>
+            <a:spLocks noGrp="1"/>
+          </p:cNvSpPr>
+          <p:nvPr>
+            <p:ph type="ftr" sz="quarter" idx="11"/>
+          </p:nvPr>
+        </p:nvSpPr>
+        <p:spPr/>
+        <p:txBody>
+          <a:bodyPr/>
+          <a:lstStyle/>
+          <a:p>
+            <a:r>
+              <a:rPr lang="en-US"/>
+              <a:t>Programming at the Hardware/Software Interface</a:t>
+            </a:r>
+            <a:endParaRPr lang="en-US" dirty="0"/>
+          </a:p>
+        </p:txBody>
+      </p:sp>
+      <p:sp>
+        <p:nvSpPr>
+          <p:cNvPr id="5" name="Slide Number Placeholder 4"/>
+          <p:cNvSpPr>
+            <a:spLocks noGrp="1"/>
+          </p:cNvSpPr>
+          <p:nvPr>
+            <p:ph type="sldNum" sz="quarter" idx="12"/>
+          </p:nvPr>
+        </p:nvSpPr>
+        <p:spPr/>
+        <p:txBody>
+          <a:bodyPr/>
+          <a:lstStyle/>
+          <a:p>
+            <a:fld id="{B30C84D9-7A41-4FEB-892B-80917372DB87}" type="slidenum">
+              <a:rPr lang="en-US" smtClean="0"/>
+              <a:t>8</a:t>
+            </a:fld>
+            <a:endParaRPr lang="en-US"/>
+          </a:p>
+        </p:txBody>
+      </p:sp>
+      <p:sp>
+        <p:nvSpPr>
+          <p:cNvPr id="6" name="Text Placeholder 5"/>
+          <p:cNvSpPr>
+            <a:spLocks noGrp="1"/>
+          </p:cNvSpPr>
+          <p:nvPr>
+            <p:ph type="body" sz="quarter" idx="13"/>
+          </p:nvPr>
+        </p:nvSpPr>
+        <p:spPr/>
+        <p:txBody>
+          <a:bodyPr/>
+          <a:lstStyle/>
+          <a:p>
+            <a:r>
+              <a:rPr lang="en-US" dirty="0"/>
+              <a:t>Slide by Bohn</a:t>
+            </a:r>
+          </a:p>
+        </p:txBody>
+      </p:sp>
+    </p:spTree>
+    <p:extLst>
+      <p:ext uri="{BB962C8B-B14F-4D97-AF65-F5344CB8AC3E}">
+        <p14:creationId xmlns:p14="http://schemas.microsoft.com/office/powerpoint/2010/main" val="3703694109"/>
+      </p:ext>
+    </p:extLst>
+  </p:cSld>
+  <p:clrMapOvr>
+    <a:masterClrMapping/>
+  </p:clrMapOvr>
+</p:sld>
+</file>
+
+<file path=ppt/slides/slide9.xml><?xml version="1.0" encoding="utf-8"?>
+<p:sld xmlns:a="http://schemas.openxmlformats.org/drawingml/2006/main" xmlns:r="http://schemas.openxmlformats.org/officeDocument/2006/relationships" xmlns:p="http://schemas.openxmlformats.org/presentationml/2006/main">
+  <p:cSld>
+    <p:spTree>
+      <p:nvGrpSpPr>
+        <p:cNvPr id="1" name=""/>
+        <p:cNvGrpSpPr/>
+        <p:nvPr/>
+      </p:nvGrpSpPr>
+      <p:grpSpPr>
+        <a:xfrm>
+          <a:off x="0" y="0"/>
+          <a:ext cx="0" cy="0"/>
+          <a:chOff x="0" y="0"/>
+          <a:chExt cx="0" cy="0"/>
+        </a:xfrm>
+      </p:grpSpPr>
+      <p:sp>
+        <p:nvSpPr>
+          <p:cNvPr id="2" name="Title 1"/>
+          <p:cNvSpPr>
+            <a:spLocks noGrp="1"/>
+          </p:cNvSpPr>
+          <p:nvPr>
+            <p:ph type="title"/>
+          </p:nvPr>
+        </p:nvSpPr>
+        <p:spPr/>
+        <p:txBody>
+          <a:bodyPr/>
+          <a:lstStyle/>
+          <a:p>
+            <a:r>
+              <a:rPr lang="en-US" dirty="0"/>
               <a:t>Planned lessons</a:t>
             </a:r>
           </a:p>
@@ -10744,7 +11525,7 @@
           <a:p>
             <a:fld id="{B30C84D9-7A41-4FEB-892B-80917372DB87}" type="slidenum">
               <a:rPr lang="en-US" smtClean="0"/>
-              <a:t>8</a:t>
+              <a:t>9</a:t>
             </a:fld>
             <a:endParaRPr lang="en-US"/>
           </a:p>
@@ -11362,571 +12143,6 @@
       <p:bldP spid="6" grpId="0"/>
       <p:bldP spid="14" grpId="0"/>
       <p:bldP spid="15" grpId="0"/>
-    </p:bldLst>
-  </p:timing>
-</p:sld>
-</file>
-
-<file path=ppt/slides/slide9.xml><?xml version="1.0" encoding="utf-8"?>
-<p:sld xmlns:a="http://schemas.openxmlformats.org/drawingml/2006/main" xmlns:r="http://schemas.openxmlformats.org/officeDocument/2006/relationships" xmlns:p="http://schemas.openxmlformats.org/presentationml/2006/main">
-  <p:cSld>
-    <p:spTree>
-      <p:nvGrpSpPr>
-        <p:cNvPr id="1" name=""/>
-        <p:cNvGrpSpPr/>
-        <p:nvPr/>
-      </p:nvGrpSpPr>
-      <p:grpSpPr>
-        <a:xfrm>
-          <a:off x="0" y="0"/>
-          <a:ext cx="0" cy="0"/>
-          <a:chOff x="0" y="0"/>
-          <a:chExt cx="0" cy="0"/>
-        </a:xfrm>
-      </p:grpSpPr>
-      <p:sp>
-        <p:nvSpPr>
-          <p:cNvPr id="2" name="Title 1"/>
-          <p:cNvSpPr>
-            <a:spLocks noGrp="1"/>
-          </p:cNvSpPr>
-          <p:nvPr>
-            <p:ph type="title"/>
-          </p:nvPr>
-        </p:nvSpPr>
-        <p:spPr/>
-        <p:txBody>
-          <a:bodyPr/>
-          <a:lstStyle/>
-          <a:p>
-            <a:r>
-              <a:rPr lang="en-US" dirty="0"/>
-              <a:t>Planned lessons</a:t>
-            </a:r>
-          </a:p>
-        </p:txBody>
-      </p:sp>
-      <p:sp>
-        <p:nvSpPr>
-          <p:cNvPr id="7" name="Content Placeholder 6"/>
-          <p:cNvSpPr>
-            <a:spLocks noGrp="1"/>
-          </p:cNvSpPr>
-          <p:nvPr>
-            <p:ph sz="half" idx="1"/>
-          </p:nvPr>
-        </p:nvSpPr>
-        <p:spPr/>
-        <p:txBody>
-          <a:bodyPr/>
-          <a:lstStyle/>
-          <a:p>
-            <a:r>
-              <a:rPr lang="en-US" dirty="0">
-                <a:solidFill>
-                  <a:schemeClr val="bg1">
-                    <a:lumMod val="65000"/>
-                  </a:schemeClr>
-                </a:solidFill>
-              </a:rPr>
-              <a:t>Data representation &amp; arithmetic</a:t>
-            </a:r>
-          </a:p>
-          <a:p>
-            <a:r>
-              <a:rPr lang="en-US" dirty="0"/>
-              <a:t>Assembly language</a:t>
-            </a:r>
-          </a:p>
-        </p:txBody>
-      </p:sp>
-      <p:sp>
-        <p:nvSpPr>
-          <p:cNvPr id="8" name="Content Placeholder 7"/>
-          <p:cNvSpPr>
-            <a:spLocks noGrp="1"/>
-          </p:cNvSpPr>
-          <p:nvPr>
-            <p:ph sz="half" idx="2"/>
-          </p:nvPr>
-        </p:nvSpPr>
-        <p:spPr/>
-        <p:txBody>
-          <a:bodyPr>
-            <a:normAutofit/>
-          </a:bodyPr>
-          <a:lstStyle/>
-          <a:p>
-            <a:r>
-              <a:rPr lang="en-US" dirty="0"/>
-              <a:t>ALGOL, BASIC, COBOL, FORTRAN, Pascal, and PL/I</a:t>
-            </a:r>
-            <a:br>
-              <a:rPr lang="en-US" dirty="0"/>
-            </a:br>
-            <a:r>
-              <a:rPr lang="en-US" dirty="0"/>
-              <a:t>count 1,2,3…</a:t>
-            </a:r>
-            <a:br>
-              <a:rPr lang="en-US" dirty="0"/>
-            </a:br>
-            <a:r>
-              <a:rPr lang="en-US" sz="2000" dirty="0"/>
-              <a:t>(or allow arbitrary array ranges)</a:t>
-            </a:r>
-            <a:endParaRPr lang="en-US" dirty="0"/>
-          </a:p>
-          <a:p>
-            <a:r>
-              <a:rPr lang="en-US" dirty="0"/>
-              <a:t>Why does C count 0,1,2…?</a:t>
-            </a:r>
-          </a:p>
-          <a:p>
-            <a:r>
-              <a:rPr lang="en-US" dirty="0"/>
-              <a:t>Why do C strings end in </a:t>
-            </a:r>
-            <a:r>
-              <a:rPr lang="en-US" b="1" dirty="0"/>
-              <a:t>\0</a:t>
-            </a:r>
-            <a:r>
-              <a:rPr lang="en-US" dirty="0"/>
-              <a:t> ?</a:t>
-            </a:r>
-          </a:p>
-          <a:p>
-            <a:r>
-              <a:rPr lang="en-US" dirty="0"/>
-              <a:t>Why does C have an increment operator (</a:t>
-            </a:r>
-            <a:r>
-              <a:rPr lang="en-US" b="1" dirty="0" err="1"/>
-              <a:t>i</a:t>
-            </a:r>
-            <a:r>
-              <a:rPr lang="en-US" b="1" dirty="0"/>
-              <a:t>++</a:t>
-            </a:r>
-            <a:r>
-              <a:rPr lang="en-US" dirty="0"/>
-              <a:t>)?</a:t>
-            </a:r>
-          </a:p>
-          <a:p>
-            <a:r>
-              <a:rPr lang="en-US" dirty="0"/>
-              <a:t>Why does C have the ternary operator? (</a:t>
-            </a:r>
-            <a:r>
-              <a:rPr lang="en-US" b="1" dirty="0"/>
-              <a:t>x = x&lt;y ? x : y</a:t>
-            </a:r>
-            <a:r>
-              <a:rPr lang="en-US" dirty="0"/>
-              <a:t>)</a:t>
-            </a:r>
-          </a:p>
-        </p:txBody>
-      </p:sp>
-      <p:sp>
-        <p:nvSpPr>
-          <p:cNvPr id="4" name="Footer Placeholder 3"/>
-          <p:cNvSpPr>
-            <a:spLocks noGrp="1"/>
-          </p:cNvSpPr>
-          <p:nvPr>
-            <p:ph type="ftr" sz="quarter" idx="11"/>
-          </p:nvPr>
-        </p:nvSpPr>
-        <p:spPr/>
-        <p:txBody>
-          <a:bodyPr/>
-          <a:lstStyle/>
-          <a:p>
-            <a:r>
-              <a:rPr lang="en-US"/>
-              <a:t>Programming at the Hardware/Software Interface</a:t>
-            </a:r>
-            <a:endParaRPr lang="en-US" dirty="0"/>
-          </a:p>
-        </p:txBody>
-      </p:sp>
-      <p:sp>
-        <p:nvSpPr>
-          <p:cNvPr id="5" name="Slide Number Placeholder 4"/>
-          <p:cNvSpPr>
-            <a:spLocks noGrp="1"/>
-          </p:cNvSpPr>
-          <p:nvPr>
-            <p:ph type="sldNum" sz="quarter" idx="12"/>
-          </p:nvPr>
-        </p:nvSpPr>
-        <p:spPr/>
-        <p:txBody>
-          <a:bodyPr/>
-          <a:lstStyle/>
-          <a:p>
-            <a:fld id="{B30C84D9-7A41-4FEB-892B-80917372DB87}" type="slidenum">
-              <a:rPr lang="en-US" smtClean="0"/>
-              <a:t>9</a:t>
-            </a:fld>
-            <a:endParaRPr lang="en-US"/>
-          </a:p>
-        </p:txBody>
-      </p:sp>
-      <p:sp>
-        <p:nvSpPr>
-          <p:cNvPr id="9" name="Text Placeholder 8"/>
-          <p:cNvSpPr>
-            <a:spLocks noGrp="1"/>
-          </p:cNvSpPr>
-          <p:nvPr>
-            <p:ph type="body" sz="quarter" idx="13"/>
-          </p:nvPr>
-        </p:nvSpPr>
-        <p:spPr/>
-        <p:txBody>
-          <a:bodyPr/>
-          <a:lstStyle/>
-          <a:p>
-            <a:r>
-              <a:rPr lang="en-US" dirty="0"/>
-              <a:t>Slide by Bohn</a:t>
-            </a:r>
-          </a:p>
-        </p:txBody>
-      </p:sp>
-    </p:spTree>
-    <p:extLst>
-      <p:ext uri="{BB962C8B-B14F-4D97-AF65-F5344CB8AC3E}">
-        <p14:creationId xmlns:p14="http://schemas.microsoft.com/office/powerpoint/2010/main" val="1737821417"/>
-      </p:ext>
-    </p:extLst>
-  </p:cSld>
-  <p:clrMapOvr>
-    <a:masterClrMapping/>
-  </p:clrMapOvr>
-  <p:timing>
-    <p:tnLst>
-      <p:par>
-        <p:cTn id="1" dur="indefinite" restart="never" nodeType="tmRoot">
-          <p:childTnLst>
-            <p:seq concurrent="1" nextAc="seek">
-              <p:cTn id="2" dur="indefinite" nodeType="mainSeq">
-                <p:childTnLst>
-                  <p:par>
-                    <p:cTn id="3" fill="hold">
-                      <p:stCondLst>
-                        <p:cond delay="indefinite"/>
-                      </p:stCondLst>
-                      <p:childTnLst>
-                        <p:par>
-                          <p:cTn id="4" fill="hold">
-                            <p:stCondLst>
-                              <p:cond delay="0"/>
-                            </p:stCondLst>
-                            <p:childTnLst>
-                              <p:par>
-                                <p:cTn id="5" presetID="10" presetClass="entr" presetSubtype="0" fill="hold" grpId="0" nodeType="clickEffect">
-                                  <p:stCondLst>
-                                    <p:cond delay="0"/>
-                                  </p:stCondLst>
-                                  <p:childTnLst>
-                                    <p:set>
-                                      <p:cBhvr>
-                                        <p:cTn id="6" dur="1" fill="hold">
-                                          <p:stCondLst>
-                                            <p:cond delay="0"/>
-                                          </p:stCondLst>
-                                        </p:cTn>
-                                        <p:tgtEl>
-                                          <p:spTgt spid="8">
-                                            <p:txEl>
-                                              <p:pRg st="0" end="0"/>
-                                            </p:txEl>
-                                          </p:spTgt>
-                                        </p:tgtEl>
-                                        <p:attrNameLst>
-                                          <p:attrName>style.visibility</p:attrName>
-                                        </p:attrNameLst>
-                                      </p:cBhvr>
-                                      <p:to>
-                                        <p:strVal val="visible"/>
-                                      </p:to>
-                                    </p:set>
-                                    <p:animEffect transition="in" filter="fade">
-                                      <p:cBhvr>
-                                        <p:cTn id="7" dur="500"/>
-                                        <p:tgtEl>
-                                          <p:spTgt spid="8">
-                                            <p:txEl>
-                                              <p:pRg st="0" end="0"/>
-                                            </p:txEl>
-                                          </p:spTgt>
-                                        </p:tgtEl>
-                                      </p:cBhvr>
-                                    </p:animEffect>
-                                  </p:childTnLst>
-                                </p:cTn>
-                              </p:par>
-                              <p:par>
-                                <p:cTn id="8" presetID="10" presetClass="entr" presetSubtype="0" fill="hold" grpId="0" nodeType="withEffect">
-                                  <p:stCondLst>
-                                    <p:cond delay="0"/>
-                                  </p:stCondLst>
-                                  <p:childTnLst>
-                                    <p:set>
-                                      <p:cBhvr>
-                                        <p:cTn id="9" dur="1" fill="hold">
-                                          <p:stCondLst>
-                                            <p:cond delay="0"/>
-                                          </p:stCondLst>
-                                        </p:cTn>
-                                        <p:tgtEl>
-                                          <p:spTgt spid="8">
-                                            <p:txEl>
-                                              <p:pRg st="1" end="1"/>
-                                            </p:txEl>
-                                          </p:spTgt>
-                                        </p:tgtEl>
-                                        <p:attrNameLst>
-                                          <p:attrName>style.visibility</p:attrName>
-                                        </p:attrNameLst>
-                                      </p:cBhvr>
-                                      <p:to>
-                                        <p:strVal val="visible"/>
-                                      </p:to>
-                                    </p:set>
-                                    <p:animEffect transition="in" filter="fade">
-                                      <p:cBhvr>
-                                        <p:cTn id="10" dur="500"/>
-                                        <p:tgtEl>
-                                          <p:spTgt spid="8">
-                                            <p:txEl>
-                                              <p:pRg st="1" end="1"/>
-                                            </p:txEl>
-                                          </p:spTgt>
-                                        </p:tgtEl>
-                                      </p:cBhvr>
-                                    </p:animEffect>
-                                  </p:childTnLst>
-                                </p:cTn>
-                              </p:par>
-                            </p:childTnLst>
-                          </p:cTn>
-                        </p:par>
-                      </p:childTnLst>
-                    </p:cTn>
-                  </p:par>
-                  <p:par>
-                    <p:cTn id="11" fill="hold">
-                      <p:stCondLst>
-                        <p:cond delay="indefinite"/>
-                      </p:stCondLst>
-                      <p:childTnLst>
-                        <p:par>
-                          <p:cTn id="12" fill="hold">
-                            <p:stCondLst>
-                              <p:cond delay="0"/>
-                            </p:stCondLst>
-                            <p:childTnLst>
-                              <p:par>
-                                <p:cTn id="13" presetID="10" presetClass="entr" presetSubtype="0" fill="hold" grpId="0" nodeType="clickEffect">
-                                  <p:stCondLst>
-                                    <p:cond delay="0"/>
-                                  </p:stCondLst>
-                                  <p:childTnLst>
-                                    <p:set>
-                                      <p:cBhvr>
-                                        <p:cTn id="14" dur="1" fill="hold">
-                                          <p:stCondLst>
-                                            <p:cond delay="0"/>
-                                          </p:stCondLst>
-                                        </p:cTn>
-                                        <p:tgtEl>
-                                          <p:spTgt spid="8">
-                                            <p:txEl>
-                                              <p:pRg st="2" end="2"/>
-                                            </p:txEl>
-                                          </p:spTgt>
-                                        </p:tgtEl>
-                                        <p:attrNameLst>
-                                          <p:attrName>style.visibility</p:attrName>
-                                        </p:attrNameLst>
-                                      </p:cBhvr>
-                                      <p:to>
-                                        <p:strVal val="visible"/>
-                                      </p:to>
-                                    </p:set>
-                                    <p:animEffect transition="in" filter="fade">
-                                      <p:cBhvr>
-                                        <p:cTn id="15" dur="500"/>
-                                        <p:tgtEl>
-                                          <p:spTgt spid="8">
-                                            <p:txEl>
-                                              <p:pRg st="2" end="2"/>
-                                            </p:txEl>
-                                          </p:spTgt>
-                                        </p:tgtEl>
-                                      </p:cBhvr>
-                                    </p:animEffect>
-                                  </p:childTnLst>
-                                </p:cTn>
-                              </p:par>
-                            </p:childTnLst>
-                          </p:cTn>
-                        </p:par>
-                      </p:childTnLst>
-                    </p:cTn>
-                  </p:par>
-                  <p:par>
-                    <p:cTn id="16" fill="hold">
-                      <p:stCondLst>
-                        <p:cond delay="indefinite"/>
-                      </p:stCondLst>
-                      <p:childTnLst>
-                        <p:par>
-                          <p:cTn id="17" fill="hold">
-                            <p:stCondLst>
-                              <p:cond delay="0"/>
-                            </p:stCondLst>
-                            <p:childTnLst>
-                              <p:par>
-                                <p:cTn id="18" presetID="10" presetClass="entr" presetSubtype="0" fill="hold" grpId="0" nodeType="clickEffect">
-                                  <p:stCondLst>
-                                    <p:cond delay="0"/>
-                                  </p:stCondLst>
-                                  <p:childTnLst>
-                                    <p:set>
-                                      <p:cBhvr>
-                                        <p:cTn id="19" dur="1" fill="hold">
-                                          <p:stCondLst>
-                                            <p:cond delay="0"/>
-                                          </p:stCondLst>
-                                        </p:cTn>
-                                        <p:tgtEl>
-                                          <p:spTgt spid="8">
-                                            <p:txEl>
-                                              <p:pRg st="3" end="3"/>
-                                            </p:txEl>
-                                          </p:spTgt>
-                                        </p:tgtEl>
-                                        <p:attrNameLst>
-                                          <p:attrName>style.visibility</p:attrName>
-                                        </p:attrNameLst>
-                                      </p:cBhvr>
-                                      <p:to>
-                                        <p:strVal val="visible"/>
-                                      </p:to>
-                                    </p:set>
-                                    <p:animEffect transition="in" filter="fade">
-                                      <p:cBhvr>
-                                        <p:cTn id="20" dur="500"/>
-                                        <p:tgtEl>
-                                          <p:spTgt spid="8">
-                                            <p:txEl>
-                                              <p:pRg st="3" end="3"/>
-                                            </p:txEl>
-                                          </p:spTgt>
-                                        </p:tgtEl>
-                                      </p:cBhvr>
-                                    </p:animEffect>
-                                  </p:childTnLst>
-                                </p:cTn>
-                              </p:par>
-                            </p:childTnLst>
-                          </p:cTn>
-                        </p:par>
-                      </p:childTnLst>
-                    </p:cTn>
-                  </p:par>
-                  <p:par>
-                    <p:cTn id="21" fill="hold">
-                      <p:stCondLst>
-                        <p:cond delay="indefinite"/>
-                      </p:stCondLst>
-                      <p:childTnLst>
-                        <p:par>
-                          <p:cTn id="22" fill="hold">
-                            <p:stCondLst>
-                              <p:cond delay="0"/>
-                            </p:stCondLst>
-                            <p:childTnLst>
-                              <p:par>
-                                <p:cTn id="23" presetID="10" presetClass="entr" presetSubtype="0" fill="hold" grpId="0" nodeType="clickEffect">
-                                  <p:stCondLst>
-                                    <p:cond delay="0"/>
-                                  </p:stCondLst>
-                                  <p:childTnLst>
-                                    <p:set>
-                                      <p:cBhvr>
-                                        <p:cTn id="24" dur="1" fill="hold">
-                                          <p:stCondLst>
-                                            <p:cond delay="0"/>
-                                          </p:stCondLst>
-                                        </p:cTn>
-                                        <p:tgtEl>
-                                          <p:spTgt spid="8">
-                                            <p:txEl>
-                                              <p:pRg st="4" end="4"/>
-                                            </p:txEl>
-                                          </p:spTgt>
-                                        </p:tgtEl>
-                                        <p:attrNameLst>
-                                          <p:attrName>style.visibility</p:attrName>
-                                        </p:attrNameLst>
-                                      </p:cBhvr>
-                                      <p:to>
-                                        <p:strVal val="visible"/>
-                                      </p:to>
-                                    </p:set>
-                                    <p:animEffect transition="in" filter="fade">
-                                      <p:cBhvr>
-                                        <p:cTn id="25" dur="500"/>
-                                        <p:tgtEl>
-                                          <p:spTgt spid="8">
-                                            <p:txEl>
-                                              <p:pRg st="4" end="4"/>
-                                            </p:txEl>
-                                          </p:spTgt>
-                                        </p:tgtEl>
-                                      </p:cBhvr>
-                                    </p:animEffect>
-                                  </p:childTnLst>
-                                </p:cTn>
-                              </p:par>
-                            </p:childTnLst>
-                          </p:cTn>
-                        </p:par>
-                      </p:childTnLst>
-                    </p:cTn>
-                  </p:par>
-                </p:childTnLst>
-              </p:cTn>
-              <p:prevCondLst>
-                <p:cond evt="onPrev" delay="0">
-                  <p:tgtEl>
-                    <p:sldTgt/>
-                  </p:tgtEl>
-                </p:cond>
-              </p:prevCondLst>
-              <p:nextCondLst>
-                <p:cond evt="onNext" delay="0">
-                  <p:tgtEl>
-                    <p:sldTgt/>
-                  </p:tgtEl>
-                </p:cond>
-              </p:nextCondLst>
-            </p:seq>
-          </p:childTnLst>
-        </p:cTn>
-      </p:par>
-    </p:tnLst>
-    <p:bldLst>
-      <p:bldP spid="8" grpId="0" build="p"/>
     </p:bldLst>
   </p:timing>
 </p:sld>

</xml_diff>

<commit_message>
More examples for chapter 6 recitation
</commit_message>
<xml_diff>
--- a/chap01.pptx
+++ b/chap01.pptx
@@ -214,7 +214,7 @@
           <a:p>
             <a:fld id="{F22450E9-715D-42D8-9747-C0402EEB663B}" type="datetimeFigureOut">
               <a:rPr lang="en-US" smtClean="0"/>
-              <a:t>9/30/22</a:t>
+              <a:t>12/30/22</a:t>
             </a:fld>
             <a:endParaRPr lang="en-US"/>
           </a:p>
@@ -819,7 +819,7 @@
           <a:p>
             <a:fld id="{085D2B30-53B0-FF44-AD2E-D4C00B5F0D07}" type="datetime1">
               <a:rPr lang="en-US" smtClean="0"/>
-              <a:t>9/30/22</a:t>
+              <a:t>12/30/22</a:t>
             </a:fld>
             <a:endParaRPr lang="en-US"/>
           </a:p>
@@ -991,7 +991,7 @@
           <a:p>
             <a:fld id="{D9BC79DF-1E81-8E43-818F-0368D173919E}" type="datetime1">
               <a:rPr lang="en-US" smtClean="0"/>
-              <a:t>9/30/22</a:t>
+              <a:t>12/30/22</a:t>
             </a:fld>
             <a:endParaRPr lang="en-US"/>
           </a:p>
@@ -1255,7 +1255,7 @@
           <a:p>
             <a:fld id="{26F2BF60-4963-D247-82AD-5F0039621502}" type="datetime1">
               <a:rPr lang="en-US" smtClean="0"/>
-              <a:t>9/30/22</a:t>
+              <a:t>12/30/22</a:t>
             </a:fld>
             <a:endParaRPr lang="en-US"/>
           </a:p>
@@ -1652,7 +1652,7 @@
           <a:p>
             <a:fld id="{892056E5-B551-3347-86B6-60A1CDFCD73F}" type="datetime1">
               <a:rPr lang="en-US" smtClean="0"/>
-              <a:t>9/30/22</a:t>
+              <a:t>12/30/22</a:t>
             </a:fld>
             <a:endParaRPr lang="en-US"/>
           </a:p>
@@ -2071,7 +2071,7 @@
           <a:p>
             <a:fld id="{0EB98D53-3742-E34B-BFE8-2899DEF3906D}" type="datetime1">
               <a:rPr lang="en-US" smtClean="0"/>
-              <a:t>9/30/22</a:t>
+              <a:t>12/30/22</a:t>
             </a:fld>
             <a:endParaRPr lang="en-US"/>
           </a:p>
@@ -2243,7 +2243,7 @@
           <a:p>
             <a:fld id="{D7741631-EBCE-024F-9D78-CF06A260D182}" type="datetime1">
               <a:rPr lang="en-US" smtClean="0"/>
-              <a:t>9/30/22</a:t>
+              <a:t>12/30/22</a:t>
             </a:fld>
             <a:endParaRPr lang="en-US"/>
           </a:p>
@@ -2393,7 +2393,7 @@
           <a:p>
             <a:fld id="{27BB9E86-5687-1A40-8327-458B60AB9A4C}" type="datetime1">
               <a:rPr lang="en-US" smtClean="0"/>
-              <a:t>9/30/22</a:t>
+              <a:t>12/30/22</a:t>
             </a:fld>
             <a:endParaRPr lang="en-US"/>
           </a:p>
@@ -2723,7 +2723,7 @@
           <a:p>
             <a:fld id="{035049FA-2FE8-F14F-A250-6231AACB4152}" type="datetime1">
               <a:rPr lang="en-US" smtClean="0"/>
-              <a:t>9/30/22</a:t>
+              <a:t>12/30/22</a:t>
             </a:fld>
             <a:endParaRPr lang="en-US"/>
           </a:p>
@@ -3030,7 +3030,7 @@
           <a:p>
             <a:fld id="{CABEF1DE-0106-6945-9FDC-9F265DADF1B8}" type="datetime1">
               <a:rPr lang="en-US" smtClean="0"/>
-              <a:t>9/30/22</a:t>
+              <a:t>12/30/22</a:t>
             </a:fld>
             <a:endParaRPr lang="en-US"/>
           </a:p>
@@ -3485,7 +3485,7 @@
           <a:p>
             <a:fld id="{490BEB36-C871-9444-8A7B-5727C7452DEF}" type="datetime1">
               <a:rPr lang="en-US" smtClean="0"/>
-              <a:t>9/30/22</a:t>
+              <a:t>12/30/22</a:t>
             </a:fld>
             <a:endParaRPr lang="en-US"/>
           </a:p>
@@ -5772,7 +5772,7 @@
           <a:p>
             <a:r>
               <a:rPr lang="en-US" dirty="0"/>
-              <a:t>Exception control flow</a:t>
+              <a:t>Exceptional control flow</a:t>
             </a:r>
           </a:p>
         </p:txBody>
@@ -9484,9 +9484,16 @@
             <p:ph idx="1"/>
           </p:nvPr>
         </p:nvSpPr>
-        <p:spPr/>
-        <p:txBody>
-          <a:bodyPr/>
+        <p:spPr>
+          <a:xfrm>
+            <a:off x="838200" y="1825624"/>
+            <a:ext cx="10515600" cy="4530725"/>
+          </a:xfrm>
+        </p:spPr>
+        <p:txBody>
+          <a:bodyPr>
+            <a:normAutofit lnSpcReduction="10000"/>
+          </a:bodyPr>
           <a:lstStyle/>
           <a:p>
             <a:pPr marL="0" indent="0">
@@ -9499,6 +9506,12 @@
           </a:p>
           <a:p>
             <a:endParaRPr lang="en-US" dirty="0"/>
+          </a:p>
+          <a:p>
+            <a:r>
+              <a:rPr lang="en-US" dirty="0"/>
+              <a:t>I have all of the submission from students who are taking this course</a:t>
+            </a:r>
           </a:p>
           <a:p>
             <a:r>

</xml_diff>